<commit_message>
Ghosts now change appearance based on state.
The FrightenedTimer resource no longer gets added and removed per Commands (to unstable due to frame delay).
Updated TODOs
</commit_message>
<xml_diff>
--- a/assets/textures.pptx
+++ b/assets/textures.pptx
@@ -15,6 +15,7 @@
     <p:sldId id="263" r:id="rId9"/>
     <p:sldId id="264" r:id="rId10"/>
     <p:sldId id="265" r:id="rId11"/>
+    <p:sldId id="266" r:id="rId12"/>
   </p:sldIdLst>
   <p:sldSz cx="12192000" cy="6858000"/>
   <p:notesSz cx="6858000" cy="9144000"/>
@@ -113,6 +114,11 @@
       </a:defRPr>
     </a:lvl9pPr>
   </p:defaultTextStyle>
+  <p:extLst>
+    <p:ext uri="{EFAFB233-063F-42B5-8137-9DF3F51BA10A}">
+      <p15:sldGuideLst xmlns:p15="http://schemas.microsoft.com/office/powerpoint/2012/main"/>
+    </p:ext>
+  </p:extLst>
 </p:presentation>
 </file>
 
@@ -263,7 +269,7 @@
           <a:p>
             <a:fld id="{08F585A2-760E-46F2-B064-85F0DFCDA2A3}" type="datetimeFigureOut">
               <a:rPr lang="de-DE" smtClean="0"/>
-              <a:t>29.05.2022</a:t>
+              <a:t>30.05.2022</a:t>
             </a:fld>
             <a:endParaRPr lang="de-DE"/>
           </a:p>
@@ -461,7 +467,7 @@
           <a:p>
             <a:fld id="{08F585A2-760E-46F2-B064-85F0DFCDA2A3}" type="datetimeFigureOut">
               <a:rPr lang="de-DE" smtClean="0"/>
-              <a:t>29.05.2022</a:t>
+              <a:t>30.05.2022</a:t>
             </a:fld>
             <a:endParaRPr lang="de-DE"/>
           </a:p>
@@ -669,7 +675,7 @@
           <a:p>
             <a:fld id="{08F585A2-760E-46F2-B064-85F0DFCDA2A3}" type="datetimeFigureOut">
               <a:rPr lang="de-DE" smtClean="0"/>
-              <a:t>29.05.2022</a:t>
+              <a:t>30.05.2022</a:t>
             </a:fld>
             <a:endParaRPr lang="de-DE"/>
           </a:p>
@@ -867,7 +873,7 @@
           <a:p>
             <a:fld id="{08F585A2-760E-46F2-B064-85F0DFCDA2A3}" type="datetimeFigureOut">
               <a:rPr lang="de-DE" smtClean="0"/>
-              <a:t>29.05.2022</a:t>
+              <a:t>30.05.2022</a:t>
             </a:fld>
             <a:endParaRPr lang="de-DE"/>
           </a:p>
@@ -1142,7 +1148,7 @@
           <a:p>
             <a:fld id="{08F585A2-760E-46F2-B064-85F0DFCDA2A3}" type="datetimeFigureOut">
               <a:rPr lang="de-DE" smtClean="0"/>
-              <a:t>29.05.2022</a:t>
+              <a:t>30.05.2022</a:t>
             </a:fld>
             <a:endParaRPr lang="de-DE"/>
           </a:p>
@@ -1407,7 +1413,7 @@
           <a:p>
             <a:fld id="{08F585A2-760E-46F2-B064-85F0DFCDA2A3}" type="datetimeFigureOut">
               <a:rPr lang="de-DE" smtClean="0"/>
-              <a:t>29.05.2022</a:t>
+              <a:t>30.05.2022</a:t>
             </a:fld>
             <a:endParaRPr lang="de-DE"/>
           </a:p>
@@ -1819,7 +1825,7 @@
           <a:p>
             <a:fld id="{08F585A2-760E-46F2-B064-85F0DFCDA2A3}" type="datetimeFigureOut">
               <a:rPr lang="de-DE" smtClean="0"/>
-              <a:t>29.05.2022</a:t>
+              <a:t>30.05.2022</a:t>
             </a:fld>
             <a:endParaRPr lang="de-DE"/>
           </a:p>
@@ -1960,7 +1966,7 @@
           <a:p>
             <a:fld id="{08F585A2-760E-46F2-B064-85F0DFCDA2A3}" type="datetimeFigureOut">
               <a:rPr lang="de-DE" smtClean="0"/>
-              <a:t>29.05.2022</a:t>
+              <a:t>30.05.2022</a:t>
             </a:fld>
             <a:endParaRPr lang="de-DE"/>
           </a:p>
@@ -2073,7 +2079,7 @@
           <a:p>
             <a:fld id="{08F585A2-760E-46F2-B064-85F0DFCDA2A3}" type="datetimeFigureOut">
               <a:rPr lang="de-DE" smtClean="0"/>
-              <a:t>29.05.2022</a:t>
+              <a:t>30.05.2022</a:t>
             </a:fld>
             <a:endParaRPr lang="de-DE"/>
           </a:p>
@@ -2384,7 +2390,7 @@
           <a:p>
             <a:fld id="{08F585A2-760E-46F2-B064-85F0DFCDA2A3}" type="datetimeFigureOut">
               <a:rPr lang="de-DE" smtClean="0"/>
-              <a:t>29.05.2022</a:t>
+              <a:t>30.05.2022</a:t>
             </a:fld>
             <a:endParaRPr lang="de-DE"/>
           </a:p>
@@ -2672,7 +2678,7 @@
           <a:p>
             <a:fld id="{08F585A2-760E-46F2-B064-85F0DFCDA2A3}" type="datetimeFigureOut">
               <a:rPr lang="de-DE" smtClean="0"/>
-              <a:t>29.05.2022</a:t>
+              <a:t>30.05.2022</a:t>
             </a:fld>
             <a:endParaRPr lang="de-DE"/>
           </a:p>
@@ -2913,7 +2919,7 @@
           <a:p>
             <a:fld id="{08F585A2-760E-46F2-B064-85F0DFCDA2A3}" type="datetimeFigureOut">
               <a:rPr lang="de-DE" smtClean="0"/>
-              <a:t>29.05.2022</a:t>
+              <a:t>30.05.2022</a:t>
             </a:fld>
             <a:endParaRPr lang="de-DE"/>
           </a:p>
@@ -6631,6 +6637,1210 @@
 </p:sld>
 </file>
 
+<file path=ppt/slides/slide11.xml><?xml version="1.0" encoding="utf-8"?>
+<p:sld xmlns:a="http://schemas.openxmlformats.org/drawingml/2006/main" xmlns:r="http://schemas.openxmlformats.org/officeDocument/2006/relationships" xmlns:p="http://schemas.openxmlformats.org/presentationml/2006/main">
+  <p:cSld>
+    <p:bg>
+      <p:bgPr>
+        <a:solidFill>
+          <a:schemeClr val="accent6"/>
+        </a:solidFill>
+        <a:effectLst/>
+      </p:bgPr>
+    </p:bg>
+    <p:spTree>
+      <p:nvGrpSpPr>
+        <p:cNvPr id="1" name=""/>
+        <p:cNvGrpSpPr/>
+        <p:nvPr/>
+      </p:nvGrpSpPr>
+      <p:grpSpPr>
+        <a:xfrm>
+          <a:off x="0" y="0"/>
+          <a:ext cx="0" cy="0"/>
+          <a:chOff x="0" y="0"/>
+          <a:chExt cx="0" cy="0"/>
+        </a:xfrm>
+      </p:grpSpPr>
+      <p:pic>
+        <p:nvPicPr>
+          <p:cNvPr id="5" name="Grafik 4" descr="Ein Bild, das Text, ClipArt, Vektorgrafiken enthält.&#10;&#10;Automatisch generierte Beschreibung">
+            <a:extLst>
+              <a:ext uri="{FF2B5EF4-FFF2-40B4-BE49-F238E27FC236}">
+                <a16:creationId xmlns:a16="http://schemas.microsoft.com/office/drawing/2014/main" id="{7D74FD1D-131E-4F79-9F01-42C401CCEFBD}"/>
+              </a:ext>
+            </a:extLst>
+          </p:cNvPr>
+          <p:cNvPicPr>
+            <a:picLocks noChangeAspect="1"/>
+          </p:cNvPicPr>
+          <p:nvPr/>
+        </p:nvPicPr>
+        <p:blipFill>
+          <a:blip r:embed="rId2">
+            <a:extLst>
+              <a:ext uri="{28A0092B-C50C-407E-A947-70E740481C1C}">
+                <a14:useLocalDpi xmlns:a14="http://schemas.microsoft.com/office/drawing/2010/main" val="0"/>
+              </a:ext>
+            </a:extLst>
+          </a:blip>
+          <a:stretch>
+            <a:fillRect/>
+          </a:stretch>
+        </p:blipFill>
+        <p:spPr>
+          <a:xfrm>
+            <a:off x="10587823" y="0"/>
+            <a:ext cx="1905266" cy="1971950"/>
+          </a:xfrm>
+          <a:prstGeom prst="rect">
+            <a:avLst/>
+          </a:prstGeom>
+        </p:spPr>
+      </p:pic>
+      <p:grpSp>
+        <p:nvGrpSpPr>
+          <p:cNvPr id="22" name="Gruppieren 21">
+            <a:extLst>
+              <a:ext uri="{FF2B5EF4-FFF2-40B4-BE49-F238E27FC236}">
+                <a16:creationId xmlns:a16="http://schemas.microsoft.com/office/drawing/2014/main" id="{A6F74904-E6C8-4AE1-9C0D-0153A202D950}"/>
+              </a:ext>
+            </a:extLst>
+          </p:cNvPr>
+          <p:cNvGrpSpPr/>
+          <p:nvPr/>
+        </p:nvGrpSpPr>
+        <p:grpSpPr>
+          <a:xfrm>
+            <a:off x="966617" y="652454"/>
+            <a:ext cx="5866503" cy="5168921"/>
+            <a:chOff x="1784598" y="801743"/>
+            <a:chExt cx="5866503" cy="5168921"/>
+          </a:xfrm>
+          <a:solidFill>
+            <a:srgbClr val="0000F8"/>
+          </a:solidFill>
+        </p:grpSpPr>
+        <p:grpSp>
+          <p:nvGrpSpPr>
+            <p:cNvPr id="23" name="Gruppieren 22">
+              <a:extLst>
+                <a:ext uri="{FF2B5EF4-FFF2-40B4-BE49-F238E27FC236}">
+                  <a16:creationId xmlns:a16="http://schemas.microsoft.com/office/drawing/2014/main" id="{9520A9F3-455C-451F-AE75-00A454385584}"/>
+                </a:ext>
+              </a:extLst>
+            </p:cNvPr>
+            <p:cNvGrpSpPr/>
+            <p:nvPr/>
+          </p:nvGrpSpPr>
+          <p:grpSpPr>
+            <a:xfrm>
+              <a:off x="1784598" y="5300696"/>
+              <a:ext cx="1676144" cy="669968"/>
+              <a:chOff x="1134631" y="4456166"/>
+              <a:chExt cx="2160000" cy="936000"/>
+            </a:xfrm>
+            <a:grpFill/>
+          </p:grpSpPr>
+          <p:sp>
+            <p:nvSpPr>
+              <p:cNvPr id="36" name="Rechteck 35">
+                <a:extLst>
+                  <a:ext uri="{FF2B5EF4-FFF2-40B4-BE49-F238E27FC236}">
+                    <a16:creationId xmlns:a16="http://schemas.microsoft.com/office/drawing/2014/main" id="{7C50B6CA-92CD-4C0E-A88C-8151A8C4CB94}"/>
+                  </a:ext>
+                </a:extLst>
+              </p:cNvPr>
+              <p:cNvSpPr/>
+              <p:nvPr/>
+            </p:nvSpPr>
+            <p:spPr>
+              <a:xfrm>
+                <a:off x="1674631" y="4924166"/>
+                <a:ext cx="1080000" cy="468000"/>
+              </a:xfrm>
+              <a:prstGeom prst="rect">
+                <a:avLst/>
+              </a:prstGeom>
+              <a:grpFill/>
+              <a:ln>
+                <a:noFill/>
+              </a:ln>
+            </p:spPr>
+            <p:style>
+              <a:lnRef idx="2">
+                <a:schemeClr val="accent1">
+                  <a:shade val="50000"/>
+                </a:schemeClr>
+              </a:lnRef>
+              <a:fillRef idx="1">
+                <a:schemeClr val="accent1"/>
+              </a:fillRef>
+              <a:effectRef idx="0">
+                <a:schemeClr val="accent1"/>
+              </a:effectRef>
+              <a:fontRef idx="minor">
+                <a:schemeClr val="lt1"/>
+              </a:fontRef>
+            </p:style>
+            <p:txBody>
+              <a:bodyPr rtlCol="0" anchor="ctr"/>
+              <a:lstStyle/>
+              <a:p>
+                <a:pPr algn="ctr"/>
+                <a:endParaRPr lang="de-DE"/>
+              </a:p>
+            </p:txBody>
+          </p:sp>
+          <p:sp>
+            <p:nvSpPr>
+              <p:cNvPr id="37" name="Rechteck 36">
+                <a:extLst>
+                  <a:ext uri="{FF2B5EF4-FFF2-40B4-BE49-F238E27FC236}">
+                    <a16:creationId xmlns:a16="http://schemas.microsoft.com/office/drawing/2014/main" id="{88DF3D44-CA28-43BA-9818-4B8A851D038F}"/>
+                  </a:ext>
+                </a:extLst>
+              </p:cNvPr>
+              <p:cNvSpPr/>
+              <p:nvPr/>
+            </p:nvSpPr>
+            <p:spPr>
+              <a:xfrm>
+                <a:off x="1134631" y="4456166"/>
+                <a:ext cx="2160000" cy="468000"/>
+              </a:xfrm>
+              <a:prstGeom prst="rect">
+                <a:avLst/>
+              </a:prstGeom>
+              <a:grpFill/>
+              <a:ln>
+                <a:noFill/>
+              </a:ln>
+            </p:spPr>
+            <p:style>
+              <a:lnRef idx="2">
+                <a:schemeClr val="accent1">
+                  <a:shade val="50000"/>
+                </a:schemeClr>
+              </a:lnRef>
+              <a:fillRef idx="1">
+                <a:schemeClr val="accent1"/>
+              </a:fillRef>
+              <a:effectRef idx="0">
+                <a:schemeClr val="accent1"/>
+              </a:effectRef>
+              <a:fontRef idx="minor">
+                <a:schemeClr val="lt1"/>
+              </a:fontRef>
+            </p:style>
+            <p:txBody>
+              <a:bodyPr rtlCol="0" anchor="ctr"/>
+              <a:lstStyle/>
+              <a:p>
+                <a:pPr algn="ctr"/>
+                <a:endParaRPr lang="de-DE" dirty="0"/>
+              </a:p>
+            </p:txBody>
+          </p:sp>
+        </p:grpSp>
+        <p:grpSp>
+          <p:nvGrpSpPr>
+            <p:cNvPr id="24" name="Gruppieren 23">
+              <a:extLst>
+                <a:ext uri="{FF2B5EF4-FFF2-40B4-BE49-F238E27FC236}">
+                  <a16:creationId xmlns:a16="http://schemas.microsoft.com/office/drawing/2014/main" id="{313D0485-7F98-4C08-9453-1414046BBFB1}"/>
+                </a:ext>
+              </a:extLst>
+            </p:cNvPr>
+            <p:cNvGrpSpPr/>
+            <p:nvPr/>
+          </p:nvGrpSpPr>
+          <p:grpSpPr>
+            <a:xfrm>
+              <a:off x="3879778" y="5300696"/>
+              <a:ext cx="1676144" cy="669968"/>
+              <a:chOff x="1134631" y="4456166"/>
+              <a:chExt cx="2160000" cy="936000"/>
+            </a:xfrm>
+            <a:grpFill/>
+          </p:grpSpPr>
+          <p:sp>
+            <p:nvSpPr>
+              <p:cNvPr id="34" name="Rechteck 33">
+                <a:extLst>
+                  <a:ext uri="{FF2B5EF4-FFF2-40B4-BE49-F238E27FC236}">
+                    <a16:creationId xmlns:a16="http://schemas.microsoft.com/office/drawing/2014/main" id="{745EED46-377D-4C15-AEE5-E410ECC117CA}"/>
+                  </a:ext>
+                </a:extLst>
+              </p:cNvPr>
+              <p:cNvSpPr/>
+              <p:nvPr/>
+            </p:nvSpPr>
+            <p:spPr>
+              <a:xfrm>
+                <a:off x="1674631" y="4924166"/>
+                <a:ext cx="1080000" cy="468000"/>
+              </a:xfrm>
+              <a:prstGeom prst="rect">
+                <a:avLst/>
+              </a:prstGeom>
+              <a:grpFill/>
+              <a:ln>
+                <a:noFill/>
+              </a:ln>
+            </p:spPr>
+            <p:style>
+              <a:lnRef idx="2">
+                <a:schemeClr val="accent1">
+                  <a:shade val="50000"/>
+                </a:schemeClr>
+              </a:lnRef>
+              <a:fillRef idx="1">
+                <a:schemeClr val="accent1"/>
+              </a:fillRef>
+              <a:effectRef idx="0">
+                <a:schemeClr val="accent1"/>
+              </a:effectRef>
+              <a:fontRef idx="minor">
+                <a:schemeClr val="lt1"/>
+              </a:fontRef>
+            </p:style>
+            <p:txBody>
+              <a:bodyPr rtlCol="0" anchor="ctr"/>
+              <a:lstStyle/>
+              <a:p>
+                <a:pPr algn="ctr"/>
+                <a:endParaRPr lang="de-DE"/>
+              </a:p>
+            </p:txBody>
+          </p:sp>
+          <p:sp>
+            <p:nvSpPr>
+              <p:cNvPr id="35" name="Rechteck 34">
+                <a:extLst>
+                  <a:ext uri="{FF2B5EF4-FFF2-40B4-BE49-F238E27FC236}">
+                    <a16:creationId xmlns:a16="http://schemas.microsoft.com/office/drawing/2014/main" id="{3C4BF288-2183-4432-B6DC-C4E1C4F4A589}"/>
+                  </a:ext>
+                </a:extLst>
+              </p:cNvPr>
+              <p:cNvSpPr/>
+              <p:nvPr/>
+            </p:nvSpPr>
+            <p:spPr>
+              <a:xfrm>
+                <a:off x="1134631" y="4456166"/>
+                <a:ext cx="2160000" cy="468000"/>
+              </a:xfrm>
+              <a:prstGeom prst="rect">
+                <a:avLst/>
+              </a:prstGeom>
+              <a:grpFill/>
+              <a:ln>
+                <a:noFill/>
+              </a:ln>
+            </p:spPr>
+            <p:style>
+              <a:lnRef idx="2">
+                <a:schemeClr val="accent1">
+                  <a:shade val="50000"/>
+                </a:schemeClr>
+              </a:lnRef>
+              <a:fillRef idx="1">
+                <a:schemeClr val="accent1"/>
+              </a:fillRef>
+              <a:effectRef idx="0">
+                <a:schemeClr val="accent1"/>
+              </a:effectRef>
+              <a:fontRef idx="minor">
+                <a:schemeClr val="lt1"/>
+              </a:fontRef>
+            </p:style>
+            <p:txBody>
+              <a:bodyPr rtlCol="0" anchor="ctr"/>
+              <a:lstStyle/>
+              <a:p>
+                <a:pPr algn="ctr"/>
+                <a:endParaRPr lang="de-DE"/>
+              </a:p>
+            </p:txBody>
+          </p:sp>
+        </p:grpSp>
+        <p:grpSp>
+          <p:nvGrpSpPr>
+            <p:cNvPr id="25" name="Gruppieren 24">
+              <a:extLst>
+                <a:ext uri="{FF2B5EF4-FFF2-40B4-BE49-F238E27FC236}">
+                  <a16:creationId xmlns:a16="http://schemas.microsoft.com/office/drawing/2014/main" id="{FC3A41BC-F7B9-4388-B0FC-EFEEAA047A2E}"/>
+                </a:ext>
+              </a:extLst>
+            </p:cNvPr>
+            <p:cNvGrpSpPr/>
+            <p:nvPr/>
+          </p:nvGrpSpPr>
+          <p:grpSpPr>
+            <a:xfrm>
+              <a:off x="5974957" y="5300696"/>
+              <a:ext cx="1676144" cy="669968"/>
+              <a:chOff x="1134631" y="4456166"/>
+              <a:chExt cx="2160000" cy="936000"/>
+            </a:xfrm>
+            <a:grpFill/>
+          </p:grpSpPr>
+          <p:sp>
+            <p:nvSpPr>
+              <p:cNvPr id="32" name="Rechteck 31">
+                <a:extLst>
+                  <a:ext uri="{FF2B5EF4-FFF2-40B4-BE49-F238E27FC236}">
+                    <a16:creationId xmlns:a16="http://schemas.microsoft.com/office/drawing/2014/main" id="{517E22FA-F977-4778-A3FE-F72A181C913D}"/>
+                  </a:ext>
+                </a:extLst>
+              </p:cNvPr>
+              <p:cNvSpPr/>
+              <p:nvPr/>
+            </p:nvSpPr>
+            <p:spPr>
+              <a:xfrm>
+                <a:off x="1674631" y="4924166"/>
+                <a:ext cx="1080000" cy="468000"/>
+              </a:xfrm>
+              <a:prstGeom prst="rect">
+                <a:avLst/>
+              </a:prstGeom>
+              <a:grpFill/>
+              <a:ln>
+                <a:noFill/>
+              </a:ln>
+            </p:spPr>
+            <p:style>
+              <a:lnRef idx="2">
+                <a:schemeClr val="accent1">
+                  <a:shade val="50000"/>
+                </a:schemeClr>
+              </a:lnRef>
+              <a:fillRef idx="1">
+                <a:schemeClr val="accent1"/>
+              </a:fillRef>
+              <a:effectRef idx="0">
+                <a:schemeClr val="accent1"/>
+              </a:effectRef>
+              <a:fontRef idx="minor">
+                <a:schemeClr val="lt1"/>
+              </a:fontRef>
+            </p:style>
+            <p:txBody>
+              <a:bodyPr rtlCol="0" anchor="ctr"/>
+              <a:lstStyle/>
+              <a:p>
+                <a:pPr algn="ctr"/>
+                <a:endParaRPr lang="de-DE"/>
+              </a:p>
+            </p:txBody>
+          </p:sp>
+          <p:sp>
+            <p:nvSpPr>
+              <p:cNvPr id="33" name="Rechteck 32">
+                <a:extLst>
+                  <a:ext uri="{FF2B5EF4-FFF2-40B4-BE49-F238E27FC236}">
+                    <a16:creationId xmlns:a16="http://schemas.microsoft.com/office/drawing/2014/main" id="{38631E3F-4687-4C19-89B2-1B73F160046A}"/>
+                  </a:ext>
+                </a:extLst>
+              </p:cNvPr>
+              <p:cNvSpPr/>
+              <p:nvPr/>
+            </p:nvSpPr>
+            <p:spPr>
+              <a:xfrm>
+                <a:off x="1134631" y="4456166"/>
+                <a:ext cx="2160000" cy="468000"/>
+              </a:xfrm>
+              <a:prstGeom prst="rect">
+                <a:avLst/>
+              </a:prstGeom>
+              <a:grpFill/>
+              <a:ln>
+                <a:noFill/>
+              </a:ln>
+            </p:spPr>
+            <p:style>
+              <a:lnRef idx="2">
+                <a:schemeClr val="accent1">
+                  <a:shade val="50000"/>
+                </a:schemeClr>
+              </a:lnRef>
+              <a:fillRef idx="1">
+                <a:schemeClr val="accent1"/>
+              </a:fillRef>
+              <a:effectRef idx="0">
+                <a:schemeClr val="accent1"/>
+              </a:effectRef>
+              <a:fontRef idx="minor">
+                <a:schemeClr val="lt1"/>
+              </a:fontRef>
+            </p:style>
+            <p:txBody>
+              <a:bodyPr rtlCol="0" anchor="ctr"/>
+              <a:lstStyle/>
+              <a:p>
+                <a:pPr algn="ctr"/>
+                <a:endParaRPr lang="de-DE"/>
+              </a:p>
+            </p:txBody>
+          </p:sp>
+        </p:grpSp>
+        <p:sp>
+          <p:nvSpPr>
+            <p:cNvPr id="26" name="Rechteck 25">
+              <a:extLst>
+                <a:ext uri="{FF2B5EF4-FFF2-40B4-BE49-F238E27FC236}">
+                  <a16:creationId xmlns:a16="http://schemas.microsoft.com/office/drawing/2014/main" id="{465E7849-7E76-4A9C-95C2-28CEE8A03CD0}"/>
+                </a:ext>
+              </a:extLst>
+            </p:cNvPr>
+            <p:cNvSpPr/>
+            <p:nvPr/>
+          </p:nvSpPr>
+          <p:spPr>
+            <a:xfrm>
+              <a:off x="1784598" y="3273155"/>
+              <a:ext cx="5866503" cy="2027541"/>
+            </a:xfrm>
+            <a:prstGeom prst="rect">
+              <a:avLst/>
+            </a:prstGeom>
+            <a:grpFill/>
+            <a:ln>
+              <a:noFill/>
+            </a:ln>
+          </p:spPr>
+          <p:style>
+            <a:lnRef idx="2">
+              <a:schemeClr val="accent1">
+                <a:shade val="50000"/>
+              </a:schemeClr>
+            </a:lnRef>
+            <a:fillRef idx="1">
+              <a:schemeClr val="accent1"/>
+            </a:fillRef>
+            <a:effectRef idx="0">
+              <a:schemeClr val="accent1"/>
+            </a:effectRef>
+            <a:fontRef idx="minor">
+              <a:schemeClr val="lt1"/>
+            </a:fontRef>
+          </p:style>
+          <p:txBody>
+            <a:bodyPr rtlCol="0" anchor="ctr"/>
+            <a:lstStyle/>
+            <a:p>
+              <a:pPr algn="ctr"/>
+              <a:endParaRPr lang="de-DE"/>
+            </a:p>
+          </p:txBody>
+        </p:sp>
+        <p:grpSp>
+          <p:nvGrpSpPr>
+            <p:cNvPr id="27" name="Gruppieren 26">
+              <a:extLst>
+                <a:ext uri="{FF2B5EF4-FFF2-40B4-BE49-F238E27FC236}">
+                  <a16:creationId xmlns:a16="http://schemas.microsoft.com/office/drawing/2014/main" id="{229C6570-2F11-403E-BDCD-8EBAE4C967D1}"/>
+                </a:ext>
+              </a:extLst>
+            </p:cNvPr>
+            <p:cNvGrpSpPr/>
+            <p:nvPr/>
+          </p:nvGrpSpPr>
+          <p:grpSpPr>
+            <a:xfrm>
+              <a:off x="2203634" y="801743"/>
+              <a:ext cx="5028431" cy="3334286"/>
+              <a:chOff x="1421478" y="183857"/>
+              <a:chExt cx="7025127" cy="4658268"/>
+            </a:xfrm>
+            <a:grpFill/>
+          </p:grpSpPr>
+          <p:sp>
+            <p:nvSpPr>
+              <p:cNvPr id="28" name="Rechteck 27">
+                <a:extLst>
+                  <a:ext uri="{FF2B5EF4-FFF2-40B4-BE49-F238E27FC236}">
+                    <a16:creationId xmlns:a16="http://schemas.microsoft.com/office/drawing/2014/main" id="{39AD0531-F925-467E-BB51-36E6323ABCEF}"/>
+                  </a:ext>
+                </a:extLst>
+              </p:cNvPr>
+              <p:cNvSpPr/>
+              <p:nvPr/>
+            </p:nvSpPr>
+            <p:spPr>
+              <a:xfrm>
+                <a:off x="1421478" y="2009485"/>
+                <a:ext cx="7025127" cy="2832640"/>
+              </a:xfrm>
+              <a:prstGeom prst="rect">
+                <a:avLst/>
+              </a:prstGeom>
+              <a:grpFill/>
+              <a:ln>
+                <a:noFill/>
+              </a:ln>
+            </p:spPr>
+            <p:style>
+              <a:lnRef idx="2">
+                <a:schemeClr val="accent1">
+                  <a:shade val="50000"/>
+                </a:schemeClr>
+              </a:lnRef>
+              <a:fillRef idx="1">
+                <a:schemeClr val="accent1"/>
+              </a:fillRef>
+              <a:effectRef idx="0">
+                <a:schemeClr val="accent1"/>
+              </a:effectRef>
+              <a:fontRef idx="minor">
+                <a:schemeClr val="lt1"/>
+              </a:fontRef>
+            </p:style>
+            <p:txBody>
+              <a:bodyPr rtlCol="0" anchor="ctr"/>
+              <a:lstStyle/>
+              <a:p>
+                <a:pPr algn="ctr"/>
+                <a:endParaRPr lang="de-DE"/>
+              </a:p>
+            </p:txBody>
+          </p:sp>
+          <p:sp>
+            <p:nvSpPr>
+              <p:cNvPr id="29" name="Rechteck 28">
+                <a:extLst>
+                  <a:ext uri="{FF2B5EF4-FFF2-40B4-BE49-F238E27FC236}">
+                    <a16:creationId xmlns:a16="http://schemas.microsoft.com/office/drawing/2014/main" id="{E53FCB00-EF92-4FD9-AECC-0083B95E5A2E}"/>
+                  </a:ext>
+                </a:extLst>
+              </p:cNvPr>
+              <p:cNvSpPr/>
+              <p:nvPr/>
+            </p:nvSpPr>
+            <p:spPr>
+              <a:xfrm>
+                <a:off x="2006905" y="1384042"/>
+                <a:ext cx="5853348" cy="2832640"/>
+              </a:xfrm>
+              <a:prstGeom prst="rect">
+                <a:avLst/>
+              </a:prstGeom>
+              <a:grpFill/>
+              <a:ln>
+                <a:noFill/>
+              </a:ln>
+            </p:spPr>
+            <p:style>
+              <a:lnRef idx="2">
+                <a:schemeClr val="accent1">
+                  <a:shade val="50000"/>
+                </a:schemeClr>
+              </a:lnRef>
+              <a:fillRef idx="1">
+                <a:schemeClr val="accent1"/>
+              </a:fillRef>
+              <a:effectRef idx="0">
+                <a:schemeClr val="accent1"/>
+              </a:effectRef>
+              <a:fontRef idx="minor">
+                <a:schemeClr val="lt1"/>
+              </a:fontRef>
+            </p:style>
+            <p:txBody>
+              <a:bodyPr rtlCol="0" anchor="ctr"/>
+              <a:lstStyle/>
+              <a:p>
+                <a:pPr algn="ctr"/>
+                <a:endParaRPr lang="de-DE"/>
+              </a:p>
+            </p:txBody>
+          </p:sp>
+          <p:sp>
+            <p:nvSpPr>
+              <p:cNvPr id="30" name="Rechteck 29">
+                <a:extLst>
+                  <a:ext uri="{FF2B5EF4-FFF2-40B4-BE49-F238E27FC236}">
+                    <a16:creationId xmlns:a16="http://schemas.microsoft.com/office/drawing/2014/main" id="{76893B0E-3A56-4503-8BE3-455342B6978A}"/>
+                  </a:ext>
+                </a:extLst>
+              </p:cNvPr>
+              <p:cNvSpPr/>
+              <p:nvPr/>
+            </p:nvSpPr>
+            <p:spPr>
+              <a:xfrm>
+                <a:off x="2592333" y="827165"/>
+                <a:ext cx="4683418" cy="2832640"/>
+              </a:xfrm>
+              <a:prstGeom prst="rect">
+                <a:avLst/>
+              </a:prstGeom>
+              <a:grpFill/>
+              <a:ln>
+                <a:noFill/>
+              </a:ln>
+            </p:spPr>
+            <p:style>
+              <a:lnRef idx="2">
+                <a:schemeClr val="accent1">
+                  <a:shade val="50000"/>
+                </a:schemeClr>
+              </a:lnRef>
+              <a:fillRef idx="1">
+                <a:schemeClr val="accent1"/>
+              </a:fillRef>
+              <a:effectRef idx="0">
+                <a:schemeClr val="accent1"/>
+              </a:effectRef>
+              <a:fontRef idx="minor">
+                <a:schemeClr val="lt1"/>
+              </a:fontRef>
+            </p:style>
+            <p:txBody>
+              <a:bodyPr rtlCol="0" anchor="ctr"/>
+              <a:lstStyle/>
+              <a:p>
+                <a:pPr algn="ctr"/>
+                <a:endParaRPr lang="de-DE"/>
+              </a:p>
+            </p:txBody>
+          </p:sp>
+          <p:sp>
+            <p:nvSpPr>
+              <p:cNvPr id="31" name="Rechteck 30">
+                <a:extLst>
+                  <a:ext uri="{FF2B5EF4-FFF2-40B4-BE49-F238E27FC236}">
+                    <a16:creationId xmlns:a16="http://schemas.microsoft.com/office/drawing/2014/main" id="{D5C56DA6-D92A-4194-94A0-9B7DDC798BBA}"/>
+                  </a:ext>
+                </a:extLst>
+              </p:cNvPr>
+              <p:cNvSpPr/>
+              <p:nvPr/>
+            </p:nvSpPr>
+            <p:spPr>
+              <a:xfrm>
+                <a:off x="3763187" y="183857"/>
+                <a:ext cx="2341709" cy="2832640"/>
+              </a:xfrm>
+              <a:prstGeom prst="rect">
+                <a:avLst/>
+              </a:prstGeom>
+              <a:grpFill/>
+              <a:ln>
+                <a:noFill/>
+              </a:ln>
+            </p:spPr>
+            <p:style>
+              <a:lnRef idx="2">
+                <a:schemeClr val="accent1">
+                  <a:shade val="50000"/>
+                </a:schemeClr>
+              </a:lnRef>
+              <a:fillRef idx="1">
+                <a:schemeClr val="accent1"/>
+              </a:fillRef>
+              <a:effectRef idx="0">
+                <a:schemeClr val="accent1"/>
+              </a:effectRef>
+              <a:fontRef idx="minor">
+                <a:schemeClr val="lt1"/>
+              </a:fontRef>
+            </p:style>
+            <p:txBody>
+              <a:bodyPr rtlCol="0" anchor="ctr"/>
+              <a:lstStyle/>
+              <a:p>
+                <a:pPr algn="ctr"/>
+                <a:endParaRPr lang="de-DE"/>
+              </a:p>
+            </p:txBody>
+          </p:sp>
+        </p:grpSp>
+      </p:grpSp>
+      <p:sp>
+        <p:nvSpPr>
+          <p:cNvPr id="38" name="Rechteck 37">
+            <a:extLst>
+              <a:ext uri="{FF2B5EF4-FFF2-40B4-BE49-F238E27FC236}">
+                <a16:creationId xmlns:a16="http://schemas.microsoft.com/office/drawing/2014/main" id="{B75658F0-BE9E-4A49-B43D-2C07EC481721}"/>
+              </a:ext>
+            </a:extLst>
+          </p:cNvPr>
+          <p:cNvSpPr/>
+          <p:nvPr/>
+        </p:nvSpPr>
+        <p:spPr>
+          <a:xfrm>
+            <a:off x="2642099" y="2401463"/>
+            <a:ext cx="751823" cy="774837"/>
+          </a:xfrm>
+          <a:prstGeom prst="rect">
+            <a:avLst/>
+          </a:prstGeom>
+          <a:solidFill>
+            <a:schemeClr val="bg1"/>
+          </a:solidFill>
+          <a:ln>
+            <a:noFill/>
+          </a:ln>
+        </p:spPr>
+        <p:style>
+          <a:lnRef idx="2">
+            <a:schemeClr val="accent1">
+              <a:shade val="50000"/>
+            </a:schemeClr>
+          </a:lnRef>
+          <a:fillRef idx="1">
+            <a:schemeClr val="accent1"/>
+          </a:fillRef>
+          <a:effectRef idx="0">
+            <a:schemeClr val="accent1"/>
+          </a:effectRef>
+          <a:fontRef idx="minor">
+            <a:schemeClr val="lt1"/>
+          </a:fontRef>
+        </p:style>
+        <p:txBody>
+          <a:bodyPr rtlCol="0" anchor="ctr"/>
+          <a:lstStyle/>
+          <a:p>
+            <a:pPr algn="ctr"/>
+            <a:endParaRPr lang="de-DE"/>
+          </a:p>
+        </p:txBody>
+      </p:sp>
+      <p:sp>
+        <p:nvSpPr>
+          <p:cNvPr id="40" name="Rechteck 39">
+            <a:extLst>
+              <a:ext uri="{FF2B5EF4-FFF2-40B4-BE49-F238E27FC236}">
+                <a16:creationId xmlns:a16="http://schemas.microsoft.com/office/drawing/2014/main" id="{6692FF2E-A92E-4263-95AD-B0683FD2A67A}"/>
+              </a:ext>
+            </a:extLst>
+          </p:cNvPr>
+          <p:cNvSpPr/>
+          <p:nvPr/>
+        </p:nvSpPr>
+        <p:spPr>
+          <a:xfrm>
+            <a:off x="1849027" y="4207210"/>
+            <a:ext cx="340510" cy="350933"/>
+          </a:xfrm>
+          <a:prstGeom prst="rect">
+            <a:avLst/>
+          </a:prstGeom>
+          <a:solidFill>
+            <a:schemeClr val="bg1"/>
+          </a:solidFill>
+          <a:ln>
+            <a:noFill/>
+          </a:ln>
+        </p:spPr>
+        <p:style>
+          <a:lnRef idx="2">
+            <a:schemeClr val="accent1">
+              <a:shade val="50000"/>
+            </a:schemeClr>
+          </a:lnRef>
+          <a:fillRef idx="1">
+            <a:schemeClr val="accent1"/>
+          </a:fillRef>
+          <a:effectRef idx="0">
+            <a:schemeClr val="accent1"/>
+          </a:effectRef>
+          <a:fontRef idx="minor">
+            <a:schemeClr val="lt1"/>
+          </a:fontRef>
+        </p:style>
+        <p:txBody>
+          <a:bodyPr rtlCol="0" anchor="ctr"/>
+          <a:lstStyle/>
+          <a:p>
+            <a:pPr algn="ctr"/>
+            <a:endParaRPr lang="de-DE"/>
+          </a:p>
+        </p:txBody>
+      </p:sp>
+      <p:sp>
+        <p:nvSpPr>
+          <p:cNvPr id="44" name="Rechteck 43">
+            <a:extLst>
+              <a:ext uri="{FF2B5EF4-FFF2-40B4-BE49-F238E27FC236}">
+                <a16:creationId xmlns:a16="http://schemas.microsoft.com/office/drawing/2014/main" id="{8D845A52-D281-4357-A88E-D7C99CAEB5A2}"/>
+              </a:ext>
+            </a:extLst>
+          </p:cNvPr>
+          <p:cNvSpPr/>
+          <p:nvPr/>
+        </p:nvSpPr>
+        <p:spPr>
+          <a:xfrm>
+            <a:off x="3557537" y="3874046"/>
+            <a:ext cx="684000" cy="350933"/>
+          </a:xfrm>
+          <a:prstGeom prst="rect">
+            <a:avLst/>
+          </a:prstGeom>
+          <a:solidFill>
+            <a:schemeClr val="bg1"/>
+          </a:solidFill>
+          <a:ln>
+            <a:noFill/>
+          </a:ln>
+        </p:spPr>
+        <p:style>
+          <a:lnRef idx="2">
+            <a:schemeClr val="accent1">
+              <a:shade val="50000"/>
+            </a:schemeClr>
+          </a:lnRef>
+          <a:fillRef idx="1">
+            <a:schemeClr val="accent1"/>
+          </a:fillRef>
+          <a:effectRef idx="0">
+            <a:schemeClr val="accent1"/>
+          </a:effectRef>
+          <a:fontRef idx="minor">
+            <a:schemeClr val="lt1"/>
+          </a:fontRef>
+        </p:style>
+        <p:txBody>
+          <a:bodyPr rtlCol="0" anchor="ctr"/>
+          <a:lstStyle/>
+          <a:p>
+            <a:pPr algn="ctr"/>
+            <a:endParaRPr lang="de-DE"/>
+          </a:p>
+        </p:txBody>
+      </p:sp>
+      <p:sp>
+        <p:nvSpPr>
+          <p:cNvPr id="45" name="Rechteck 44">
+            <a:extLst>
+              <a:ext uri="{FF2B5EF4-FFF2-40B4-BE49-F238E27FC236}">
+                <a16:creationId xmlns:a16="http://schemas.microsoft.com/office/drawing/2014/main" id="{110C0345-0208-4278-A32E-0288B066AB5A}"/>
+              </a:ext>
+            </a:extLst>
+          </p:cNvPr>
+          <p:cNvSpPr/>
+          <p:nvPr/>
+        </p:nvSpPr>
+        <p:spPr>
+          <a:xfrm>
+            <a:off x="4241537" y="4224547"/>
+            <a:ext cx="684000" cy="350933"/>
+          </a:xfrm>
+          <a:prstGeom prst="rect">
+            <a:avLst/>
+          </a:prstGeom>
+          <a:solidFill>
+            <a:schemeClr val="bg1"/>
+          </a:solidFill>
+          <a:ln>
+            <a:noFill/>
+          </a:ln>
+        </p:spPr>
+        <p:style>
+          <a:lnRef idx="2">
+            <a:schemeClr val="accent1">
+              <a:shade val="50000"/>
+            </a:schemeClr>
+          </a:lnRef>
+          <a:fillRef idx="1">
+            <a:schemeClr val="accent1"/>
+          </a:fillRef>
+          <a:effectRef idx="0">
+            <a:schemeClr val="accent1"/>
+          </a:effectRef>
+          <a:fontRef idx="minor">
+            <a:schemeClr val="lt1"/>
+          </a:fontRef>
+        </p:style>
+        <p:txBody>
+          <a:bodyPr rtlCol="0" anchor="ctr"/>
+          <a:lstStyle/>
+          <a:p>
+            <a:pPr algn="ctr"/>
+            <a:endParaRPr lang="de-DE"/>
+          </a:p>
+        </p:txBody>
+      </p:sp>
+      <p:sp>
+        <p:nvSpPr>
+          <p:cNvPr id="46" name="Rechteck 45">
+            <a:extLst>
+              <a:ext uri="{FF2B5EF4-FFF2-40B4-BE49-F238E27FC236}">
+                <a16:creationId xmlns:a16="http://schemas.microsoft.com/office/drawing/2014/main" id="{A6415125-42C1-4389-ADEE-5179B56AECCF}"/>
+              </a:ext>
+            </a:extLst>
+          </p:cNvPr>
+          <p:cNvSpPr/>
+          <p:nvPr/>
+        </p:nvSpPr>
+        <p:spPr>
+          <a:xfrm>
+            <a:off x="2873537" y="4208641"/>
+            <a:ext cx="684000" cy="350933"/>
+          </a:xfrm>
+          <a:prstGeom prst="rect">
+            <a:avLst/>
+          </a:prstGeom>
+          <a:solidFill>
+            <a:schemeClr val="bg1"/>
+          </a:solidFill>
+          <a:ln>
+            <a:noFill/>
+          </a:ln>
+        </p:spPr>
+        <p:style>
+          <a:lnRef idx="2">
+            <a:schemeClr val="accent1">
+              <a:shade val="50000"/>
+            </a:schemeClr>
+          </a:lnRef>
+          <a:fillRef idx="1">
+            <a:schemeClr val="accent1"/>
+          </a:fillRef>
+          <a:effectRef idx="0">
+            <a:schemeClr val="accent1"/>
+          </a:effectRef>
+          <a:fontRef idx="minor">
+            <a:schemeClr val="lt1"/>
+          </a:fontRef>
+        </p:style>
+        <p:txBody>
+          <a:bodyPr rtlCol="0" anchor="ctr"/>
+          <a:lstStyle/>
+          <a:p>
+            <a:pPr algn="ctr"/>
+            <a:endParaRPr lang="de-DE"/>
+          </a:p>
+        </p:txBody>
+      </p:sp>
+      <p:sp>
+        <p:nvSpPr>
+          <p:cNvPr id="47" name="Rechteck 46">
+            <a:extLst>
+              <a:ext uri="{FF2B5EF4-FFF2-40B4-BE49-F238E27FC236}">
+                <a16:creationId xmlns:a16="http://schemas.microsoft.com/office/drawing/2014/main" id="{6F706023-42CE-4EAC-AE5B-BBE67EB4DCDA}"/>
+              </a:ext>
+            </a:extLst>
+          </p:cNvPr>
+          <p:cNvSpPr/>
+          <p:nvPr/>
+        </p:nvSpPr>
+        <p:spPr>
+          <a:xfrm>
+            <a:off x="2189537" y="3857319"/>
+            <a:ext cx="684000" cy="350933"/>
+          </a:xfrm>
+          <a:prstGeom prst="rect">
+            <a:avLst/>
+          </a:prstGeom>
+          <a:solidFill>
+            <a:schemeClr val="bg1"/>
+          </a:solidFill>
+          <a:ln>
+            <a:noFill/>
+          </a:ln>
+        </p:spPr>
+        <p:style>
+          <a:lnRef idx="2">
+            <a:schemeClr val="accent1">
+              <a:shade val="50000"/>
+            </a:schemeClr>
+          </a:lnRef>
+          <a:fillRef idx="1">
+            <a:schemeClr val="accent1"/>
+          </a:fillRef>
+          <a:effectRef idx="0">
+            <a:schemeClr val="accent1"/>
+          </a:effectRef>
+          <a:fontRef idx="minor">
+            <a:schemeClr val="lt1"/>
+          </a:fontRef>
+        </p:style>
+        <p:txBody>
+          <a:bodyPr rtlCol="0" anchor="ctr"/>
+          <a:lstStyle/>
+          <a:p>
+            <a:pPr algn="ctr"/>
+            <a:endParaRPr lang="de-DE"/>
+          </a:p>
+        </p:txBody>
+      </p:sp>
+      <p:sp>
+        <p:nvSpPr>
+          <p:cNvPr id="48" name="Rechteck 47">
+            <a:extLst>
+              <a:ext uri="{FF2B5EF4-FFF2-40B4-BE49-F238E27FC236}">
+                <a16:creationId xmlns:a16="http://schemas.microsoft.com/office/drawing/2014/main" id="{E810C1F1-A175-4C80-AC4C-8ECE1E2345BC}"/>
+              </a:ext>
+            </a:extLst>
+          </p:cNvPr>
+          <p:cNvSpPr/>
+          <p:nvPr/>
+        </p:nvSpPr>
+        <p:spPr>
+          <a:xfrm>
+            <a:off x="4920322" y="3868458"/>
+            <a:ext cx="684000" cy="350933"/>
+          </a:xfrm>
+          <a:prstGeom prst="rect">
+            <a:avLst/>
+          </a:prstGeom>
+          <a:solidFill>
+            <a:schemeClr val="bg1"/>
+          </a:solidFill>
+          <a:ln>
+            <a:noFill/>
+          </a:ln>
+        </p:spPr>
+        <p:style>
+          <a:lnRef idx="2">
+            <a:schemeClr val="accent1">
+              <a:shade val="50000"/>
+            </a:schemeClr>
+          </a:lnRef>
+          <a:fillRef idx="1">
+            <a:schemeClr val="accent1"/>
+          </a:fillRef>
+          <a:effectRef idx="0">
+            <a:schemeClr val="accent1"/>
+          </a:effectRef>
+          <a:fontRef idx="minor">
+            <a:schemeClr val="lt1"/>
+          </a:fontRef>
+        </p:style>
+        <p:txBody>
+          <a:bodyPr rtlCol="0" anchor="ctr"/>
+          <a:lstStyle/>
+          <a:p>
+            <a:pPr algn="ctr"/>
+            <a:endParaRPr lang="de-DE"/>
+          </a:p>
+        </p:txBody>
+      </p:sp>
+      <p:sp>
+        <p:nvSpPr>
+          <p:cNvPr id="49" name="Rechteck 48">
+            <a:extLst>
+              <a:ext uri="{FF2B5EF4-FFF2-40B4-BE49-F238E27FC236}">
+                <a16:creationId xmlns:a16="http://schemas.microsoft.com/office/drawing/2014/main" id="{229B1496-D4CD-4E1B-9D6A-62A806FA74F7}"/>
+              </a:ext>
+            </a:extLst>
+          </p:cNvPr>
+          <p:cNvSpPr/>
+          <p:nvPr/>
+        </p:nvSpPr>
+        <p:spPr>
+          <a:xfrm>
+            <a:off x="5612374" y="4210320"/>
+            <a:ext cx="340510" cy="350933"/>
+          </a:xfrm>
+          <a:prstGeom prst="rect">
+            <a:avLst/>
+          </a:prstGeom>
+          <a:solidFill>
+            <a:schemeClr val="bg1"/>
+          </a:solidFill>
+          <a:ln>
+            <a:noFill/>
+          </a:ln>
+        </p:spPr>
+        <p:style>
+          <a:lnRef idx="2">
+            <a:schemeClr val="accent1">
+              <a:shade val="50000"/>
+            </a:schemeClr>
+          </a:lnRef>
+          <a:fillRef idx="1">
+            <a:schemeClr val="accent1"/>
+          </a:fillRef>
+          <a:effectRef idx="0">
+            <a:schemeClr val="accent1"/>
+          </a:effectRef>
+          <a:fontRef idx="minor">
+            <a:schemeClr val="lt1"/>
+          </a:fontRef>
+        </p:style>
+        <p:txBody>
+          <a:bodyPr rtlCol="0" anchor="ctr"/>
+          <a:lstStyle/>
+          <a:p>
+            <a:pPr algn="ctr"/>
+            <a:endParaRPr lang="de-DE"/>
+          </a:p>
+        </p:txBody>
+      </p:sp>
+      <p:sp>
+        <p:nvSpPr>
+          <p:cNvPr id="50" name="Rechteck 49">
+            <a:extLst>
+              <a:ext uri="{FF2B5EF4-FFF2-40B4-BE49-F238E27FC236}">
+                <a16:creationId xmlns:a16="http://schemas.microsoft.com/office/drawing/2014/main" id="{5A46D269-51DE-4E48-9379-558F451433F3}"/>
+              </a:ext>
+            </a:extLst>
+          </p:cNvPr>
+          <p:cNvSpPr/>
+          <p:nvPr/>
+        </p:nvSpPr>
+        <p:spPr>
+          <a:xfrm>
+            <a:off x="4405153" y="2401462"/>
+            <a:ext cx="751823" cy="774837"/>
+          </a:xfrm>
+          <a:prstGeom prst="rect">
+            <a:avLst/>
+          </a:prstGeom>
+          <a:solidFill>
+            <a:schemeClr val="bg1"/>
+          </a:solidFill>
+          <a:ln>
+            <a:noFill/>
+          </a:ln>
+        </p:spPr>
+        <p:style>
+          <a:lnRef idx="2">
+            <a:schemeClr val="accent1">
+              <a:shade val="50000"/>
+            </a:schemeClr>
+          </a:lnRef>
+          <a:fillRef idx="1">
+            <a:schemeClr val="accent1"/>
+          </a:fillRef>
+          <a:effectRef idx="0">
+            <a:schemeClr val="accent1"/>
+          </a:effectRef>
+          <a:fontRef idx="minor">
+            <a:schemeClr val="lt1"/>
+          </a:fontRef>
+        </p:style>
+        <p:txBody>
+          <a:bodyPr rtlCol="0" anchor="ctr"/>
+          <a:lstStyle/>
+          <a:p>
+            <a:pPr algn="ctr"/>
+            <a:endParaRPr lang="de-DE"/>
+          </a:p>
+        </p:txBody>
+      </p:sp>
+    </p:spTree>
+    <p:extLst>
+      <p:ext uri="{BB962C8B-B14F-4D97-AF65-F5344CB8AC3E}">
+        <p14:creationId xmlns:p14="http://schemas.microsoft.com/office/powerpoint/2010/main" val="2320133472"/>
+      </p:ext>
+    </p:extLst>
+  </p:cSld>
+  <p:clrMapOvr>
+    <a:masterClrMapping/>
+  </p:clrMapOvr>
+</p:sld>
+</file>
+
 <file path=ppt/slides/slide2.xml><?xml version="1.0" encoding="utf-8"?>
 <p:sld xmlns:a="http://schemas.openxmlformats.org/drawingml/2006/main" xmlns:r="http://schemas.openxmlformats.org/officeDocument/2006/relationships" xmlns:p="http://schemas.openxmlformats.org/presentationml/2006/main">
   <p:cSld>

</xml_diff>

<commit_message>
Added wall textures. Currently, only one kind of texture exists.
Changed eaten texture so the eyes are now normally sized.
</commit_message>
<xml_diff>
--- a/assets/textures.pptx
+++ b/assets/textures.pptx
@@ -16,6 +16,9 @@
     <p:sldId id="264" r:id="rId10"/>
     <p:sldId id="265" r:id="rId11"/>
     <p:sldId id="266" r:id="rId12"/>
+    <p:sldId id="267" r:id="rId13"/>
+    <p:sldId id="268" r:id="rId14"/>
+    <p:sldId id="269" r:id="rId15"/>
   </p:sldIdLst>
   <p:sldSz cx="12192000" cy="6858000"/>
   <p:notesSz cx="6858000" cy="9144000"/>
@@ -269,7 +272,7 @@
           <a:p>
             <a:fld id="{08F585A2-760E-46F2-B064-85F0DFCDA2A3}" type="datetimeFigureOut">
               <a:rPr lang="de-DE" smtClean="0"/>
-              <a:t>30.05.2022</a:t>
+              <a:t>30.06.2022</a:t>
             </a:fld>
             <a:endParaRPr lang="de-DE"/>
           </a:p>
@@ -467,7 +470,7 @@
           <a:p>
             <a:fld id="{08F585A2-760E-46F2-B064-85F0DFCDA2A3}" type="datetimeFigureOut">
               <a:rPr lang="de-DE" smtClean="0"/>
-              <a:t>30.05.2022</a:t>
+              <a:t>30.06.2022</a:t>
             </a:fld>
             <a:endParaRPr lang="de-DE"/>
           </a:p>
@@ -675,7 +678,7 @@
           <a:p>
             <a:fld id="{08F585A2-760E-46F2-B064-85F0DFCDA2A3}" type="datetimeFigureOut">
               <a:rPr lang="de-DE" smtClean="0"/>
-              <a:t>30.05.2022</a:t>
+              <a:t>30.06.2022</a:t>
             </a:fld>
             <a:endParaRPr lang="de-DE"/>
           </a:p>
@@ -873,7 +876,7 @@
           <a:p>
             <a:fld id="{08F585A2-760E-46F2-B064-85F0DFCDA2A3}" type="datetimeFigureOut">
               <a:rPr lang="de-DE" smtClean="0"/>
-              <a:t>30.05.2022</a:t>
+              <a:t>30.06.2022</a:t>
             </a:fld>
             <a:endParaRPr lang="de-DE"/>
           </a:p>
@@ -1148,7 +1151,7 @@
           <a:p>
             <a:fld id="{08F585A2-760E-46F2-B064-85F0DFCDA2A3}" type="datetimeFigureOut">
               <a:rPr lang="de-DE" smtClean="0"/>
-              <a:t>30.05.2022</a:t>
+              <a:t>30.06.2022</a:t>
             </a:fld>
             <a:endParaRPr lang="de-DE"/>
           </a:p>
@@ -1413,7 +1416,7 @@
           <a:p>
             <a:fld id="{08F585A2-760E-46F2-B064-85F0DFCDA2A3}" type="datetimeFigureOut">
               <a:rPr lang="de-DE" smtClean="0"/>
-              <a:t>30.05.2022</a:t>
+              <a:t>30.06.2022</a:t>
             </a:fld>
             <a:endParaRPr lang="de-DE"/>
           </a:p>
@@ -1825,7 +1828,7 @@
           <a:p>
             <a:fld id="{08F585A2-760E-46F2-B064-85F0DFCDA2A3}" type="datetimeFigureOut">
               <a:rPr lang="de-DE" smtClean="0"/>
-              <a:t>30.05.2022</a:t>
+              <a:t>30.06.2022</a:t>
             </a:fld>
             <a:endParaRPr lang="de-DE"/>
           </a:p>
@@ -1966,7 +1969,7 @@
           <a:p>
             <a:fld id="{08F585A2-760E-46F2-B064-85F0DFCDA2A3}" type="datetimeFigureOut">
               <a:rPr lang="de-DE" smtClean="0"/>
-              <a:t>30.05.2022</a:t>
+              <a:t>30.06.2022</a:t>
             </a:fld>
             <a:endParaRPr lang="de-DE"/>
           </a:p>
@@ -2079,7 +2082,7 @@
           <a:p>
             <a:fld id="{08F585A2-760E-46F2-B064-85F0DFCDA2A3}" type="datetimeFigureOut">
               <a:rPr lang="de-DE" smtClean="0"/>
-              <a:t>30.05.2022</a:t>
+              <a:t>30.06.2022</a:t>
             </a:fld>
             <a:endParaRPr lang="de-DE"/>
           </a:p>
@@ -2390,7 +2393,7 @@
           <a:p>
             <a:fld id="{08F585A2-760E-46F2-B064-85F0DFCDA2A3}" type="datetimeFigureOut">
               <a:rPr lang="de-DE" smtClean="0"/>
-              <a:t>30.05.2022</a:t>
+              <a:t>30.06.2022</a:t>
             </a:fld>
             <a:endParaRPr lang="de-DE"/>
           </a:p>
@@ -2678,7 +2681,7 @@
           <a:p>
             <a:fld id="{08F585A2-760E-46F2-B064-85F0DFCDA2A3}" type="datetimeFigureOut">
               <a:rPr lang="de-DE" smtClean="0"/>
-              <a:t>30.05.2022</a:t>
+              <a:t>30.06.2022</a:t>
             </a:fld>
             <a:endParaRPr lang="de-DE"/>
           </a:p>
@@ -2919,7 +2922,7 @@
           <a:p>
             <a:fld id="{08F585A2-760E-46F2-B064-85F0DFCDA2A3}" type="datetimeFigureOut">
               <a:rPr lang="de-DE" smtClean="0"/>
-              <a:t>30.05.2022</a:t>
+              <a:t>30.06.2022</a:t>
             </a:fld>
             <a:endParaRPr lang="de-DE"/>
           </a:p>
@@ -7841,6 +7844,4809 @@
 </p:sld>
 </file>
 
+<file path=ppt/slides/slide12.xml><?xml version="1.0" encoding="utf-8"?>
+<p:sld xmlns:a="http://schemas.openxmlformats.org/drawingml/2006/main" xmlns:r="http://schemas.openxmlformats.org/officeDocument/2006/relationships" xmlns:p="http://schemas.openxmlformats.org/presentationml/2006/main">
+  <p:cSld>
+    <p:spTree>
+      <p:nvGrpSpPr>
+        <p:cNvPr id="1" name=""/>
+        <p:cNvGrpSpPr/>
+        <p:nvPr/>
+      </p:nvGrpSpPr>
+      <p:grpSpPr>
+        <a:xfrm>
+          <a:off x="0" y="0"/>
+          <a:ext cx="0" cy="0"/>
+          <a:chOff x="0" y="0"/>
+          <a:chExt cx="0" cy="0"/>
+        </a:xfrm>
+      </p:grpSpPr>
+      <p:grpSp>
+        <p:nvGrpSpPr>
+          <p:cNvPr id="56" name="Gruppieren 55">
+            <a:extLst>
+              <a:ext uri="{FF2B5EF4-FFF2-40B4-BE49-F238E27FC236}">
+                <a16:creationId xmlns:a16="http://schemas.microsoft.com/office/drawing/2014/main" id="{B228427E-5262-1AA7-B0D4-02AEA66F8503}"/>
+              </a:ext>
+            </a:extLst>
+          </p:cNvPr>
+          <p:cNvGrpSpPr/>
+          <p:nvPr/>
+        </p:nvGrpSpPr>
+        <p:grpSpPr>
+          <a:xfrm>
+            <a:off x="229497" y="353874"/>
+            <a:ext cx="5866503" cy="5168921"/>
+            <a:chOff x="229497" y="353874"/>
+            <a:chExt cx="5866503" cy="5168921"/>
+          </a:xfrm>
+        </p:grpSpPr>
+        <p:grpSp>
+          <p:nvGrpSpPr>
+            <p:cNvPr id="4" name="Gruppieren 3">
+              <a:extLst>
+                <a:ext uri="{FF2B5EF4-FFF2-40B4-BE49-F238E27FC236}">
+                  <a16:creationId xmlns:a16="http://schemas.microsoft.com/office/drawing/2014/main" id="{434D89C5-6260-3C21-6AB3-25B988C47E40}"/>
+                </a:ext>
+              </a:extLst>
+            </p:cNvPr>
+            <p:cNvGrpSpPr/>
+            <p:nvPr/>
+          </p:nvGrpSpPr>
+          <p:grpSpPr>
+            <a:xfrm>
+              <a:off x="229497" y="353874"/>
+              <a:ext cx="5866503" cy="5168921"/>
+              <a:chOff x="1784598" y="801743"/>
+              <a:chExt cx="5866503" cy="5168921"/>
+            </a:xfrm>
+            <a:noFill/>
+          </p:grpSpPr>
+          <p:grpSp>
+            <p:nvGrpSpPr>
+              <p:cNvPr id="5" name="Gruppieren 4">
+                <a:extLst>
+                  <a:ext uri="{FF2B5EF4-FFF2-40B4-BE49-F238E27FC236}">
+                    <a16:creationId xmlns:a16="http://schemas.microsoft.com/office/drawing/2014/main" id="{E801D501-2C34-4A63-5021-0F6DA5F40120}"/>
+                  </a:ext>
+                </a:extLst>
+              </p:cNvPr>
+              <p:cNvGrpSpPr/>
+              <p:nvPr/>
+            </p:nvGrpSpPr>
+            <p:grpSpPr>
+              <a:xfrm>
+                <a:off x="1784598" y="5300696"/>
+                <a:ext cx="1676144" cy="669968"/>
+                <a:chOff x="1134631" y="4456166"/>
+                <a:chExt cx="2160000" cy="936000"/>
+              </a:xfrm>
+              <a:grpFill/>
+            </p:grpSpPr>
+            <p:sp>
+              <p:nvSpPr>
+                <p:cNvPr id="18" name="Rechteck 17">
+                  <a:extLst>
+                    <a:ext uri="{FF2B5EF4-FFF2-40B4-BE49-F238E27FC236}">
+                      <a16:creationId xmlns:a16="http://schemas.microsoft.com/office/drawing/2014/main" id="{771638C0-9236-057D-3901-AAC1E96802A0}"/>
+                    </a:ext>
+                  </a:extLst>
+                </p:cNvPr>
+                <p:cNvSpPr/>
+                <p:nvPr/>
+              </p:nvSpPr>
+              <p:spPr>
+                <a:xfrm>
+                  <a:off x="1674631" y="4924166"/>
+                  <a:ext cx="1080000" cy="468000"/>
+                </a:xfrm>
+                <a:prstGeom prst="rect">
+                  <a:avLst/>
+                </a:prstGeom>
+                <a:grpFill/>
+                <a:ln>
+                  <a:noFill/>
+                </a:ln>
+              </p:spPr>
+              <p:style>
+                <a:lnRef idx="2">
+                  <a:schemeClr val="accent1">
+                    <a:shade val="50000"/>
+                  </a:schemeClr>
+                </a:lnRef>
+                <a:fillRef idx="1">
+                  <a:schemeClr val="accent1"/>
+                </a:fillRef>
+                <a:effectRef idx="0">
+                  <a:schemeClr val="accent1"/>
+                </a:effectRef>
+                <a:fontRef idx="minor">
+                  <a:schemeClr val="lt1"/>
+                </a:fontRef>
+              </p:style>
+              <p:txBody>
+                <a:bodyPr rtlCol="0" anchor="ctr"/>
+                <a:lstStyle/>
+                <a:p>
+                  <a:pPr algn="ctr"/>
+                  <a:endParaRPr lang="de-DE"/>
+                </a:p>
+              </p:txBody>
+            </p:sp>
+            <p:sp>
+              <p:nvSpPr>
+                <p:cNvPr id="19" name="Rechteck 18">
+                  <a:extLst>
+                    <a:ext uri="{FF2B5EF4-FFF2-40B4-BE49-F238E27FC236}">
+                      <a16:creationId xmlns:a16="http://schemas.microsoft.com/office/drawing/2014/main" id="{A00A1D24-9457-0211-F2EF-BAD4B0656D9A}"/>
+                    </a:ext>
+                  </a:extLst>
+                </p:cNvPr>
+                <p:cNvSpPr/>
+                <p:nvPr/>
+              </p:nvSpPr>
+              <p:spPr>
+                <a:xfrm>
+                  <a:off x="1134631" y="4456166"/>
+                  <a:ext cx="2160000" cy="468000"/>
+                </a:xfrm>
+                <a:prstGeom prst="rect">
+                  <a:avLst/>
+                </a:prstGeom>
+                <a:grpFill/>
+                <a:ln>
+                  <a:noFill/>
+                </a:ln>
+              </p:spPr>
+              <p:style>
+                <a:lnRef idx="2">
+                  <a:schemeClr val="accent1">
+                    <a:shade val="50000"/>
+                  </a:schemeClr>
+                </a:lnRef>
+                <a:fillRef idx="1">
+                  <a:schemeClr val="accent1"/>
+                </a:fillRef>
+                <a:effectRef idx="0">
+                  <a:schemeClr val="accent1"/>
+                </a:effectRef>
+                <a:fontRef idx="minor">
+                  <a:schemeClr val="lt1"/>
+                </a:fontRef>
+              </p:style>
+              <p:txBody>
+                <a:bodyPr rtlCol="0" anchor="ctr"/>
+                <a:lstStyle/>
+                <a:p>
+                  <a:pPr algn="ctr"/>
+                  <a:endParaRPr lang="de-DE" dirty="0"/>
+                </a:p>
+              </p:txBody>
+            </p:sp>
+          </p:grpSp>
+          <p:grpSp>
+            <p:nvGrpSpPr>
+              <p:cNvPr id="6" name="Gruppieren 5">
+                <a:extLst>
+                  <a:ext uri="{FF2B5EF4-FFF2-40B4-BE49-F238E27FC236}">
+                    <a16:creationId xmlns:a16="http://schemas.microsoft.com/office/drawing/2014/main" id="{FC97BC73-CAA5-2DE5-BF94-4997C437EC8D}"/>
+                  </a:ext>
+                </a:extLst>
+              </p:cNvPr>
+              <p:cNvGrpSpPr/>
+              <p:nvPr/>
+            </p:nvGrpSpPr>
+            <p:grpSpPr>
+              <a:xfrm>
+                <a:off x="3879778" y="5300696"/>
+                <a:ext cx="1676144" cy="669968"/>
+                <a:chOff x="1134631" y="4456166"/>
+                <a:chExt cx="2160000" cy="936000"/>
+              </a:xfrm>
+              <a:grpFill/>
+            </p:grpSpPr>
+            <p:sp>
+              <p:nvSpPr>
+                <p:cNvPr id="16" name="Rechteck 15">
+                  <a:extLst>
+                    <a:ext uri="{FF2B5EF4-FFF2-40B4-BE49-F238E27FC236}">
+                      <a16:creationId xmlns:a16="http://schemas.microsoft.com/office/drawing/2014/main" id="{D5F21DF4-BBCD-FED8-E79C-F8ACE0550680}"/>
+                    </a:ext>
+                  </a:extLst>
+                </p:cNvPr>
+                <p:cNvSpPr/>
+                <p:nvPr/>
+              </p:nvSpPr>
+              <p:spPr>
+                <a:xfrm>
+                  <a:off x="1674631" y="4924166"/>
+                  <a:ext cx="1080000" cy="468000"/>
+                </a:xfrm>
+                <a:prstGeom prst="rect">
+                  <a:avLst/>
+                </a:prstGeom>
+                <a:grpFill/>
+                <a:ln>
+                  <a:noFill/>
+                </a:ln>
+              </p:spPr>
+              <p:style>
+                <a:lnRef idx="2">
+                  <a:schemeClr val="accent1">
+                    <a:shade val="50000"/>
+                  </a:schemeClr>
+                </a:lnRef>
+                <a:fillRef idx="1">
+                  <a:schemeClr val="accent1"/>
+                </a:fillRef>
+                <a:effectRef idx="0">
+                  <a:schemeClr val="accent1"/>
+                </a:effectRef>
+                <a:fontRef idx="minor">
+                  <a:schemeClr val="lt1"/>
+                </a:fontRef>
+              </p:style>
+              <p:txBody>
+                <a:bodyPr rtlCol="0" anchor="ctr"/>
+                <a:lstStyle/>
+                <a:p>
+                  <a:pPr algn="ctr"/>
+                  <a:endParaRPr lang="de-DE"/>
+                </a:p>
+              </p:txBody>
+            </p:sp>
+            <p:sp>
+              <p:nvSpPr>
+                <p:cNvPr id="17" name="Rechteck 16">
+                  <a:extLst>
+                    <a:ext uri="{FF2B5EF4-FFF2-40B4-BE49-F238E27FC236}">
+                      <a16:creationId xmlns:a16="http://schemas.microsoft.com/office/drawing/2014/main" id="{6C7CFE8B-0757-C7B3-1EC4-0B12480D9E21}"/>
+                    </a:ext>
+                  </a:extLst>
+                </p:cNvPr>
+                <p:cNvSpPr/>
+                <p:nvPr/>
+              </p:nvSpPr>
+              <p:spPr>
+                <a:xfrm>
+                  <a:off x="1134631" y="4456166"/>
+                  <a:ext cx="2160000" cy="468000"/>
+                </a:xfrm>
+                <a:prstGeom prst="rect">
+                  <a:avLst/>
+                </a:prstGeom>
+                <a:grpFill/>
+                <a:ln>
+                  <a:noFill/>
+                </a:ln>
+              </p:spPr>
+              <p:style>
+                <a:lnRef idx="2">
+                  <a:schemeClr val="accent1">
+                    <a:shade val="50000"/>
+                  </a:schemeClr>
+                </a:lnRef>
+                <a:fillRef idx="1">
+                  <a:schemeClr val="accent1"/>
+                </a:fillRef>
+                <a:effectRef idx="0">
+                  <a:schemeClr val="accent1"/>
+                </a:effectRef>
+                <a:fontRef idx="minor">
+                  <a:schemeClr val="lt1"/>
+                </a:fontRef>
+              </p:style>
+              <p:txBody>
+                <a:bodyPr rtlCol="0" anchor="ctr"/>
+                <a:lstStyle/>
+                <a:p>
+                  <a:pPr algn="ctr"/>
+                  <a:endParaRPr lang="de-DE"/>
+                </a:p>
+              </p:txBody>
+            </p:sp>
+          </p:grpSp>
+          <p:grpSp>
+            <p:nvGrpSpPr>
+              <p:cNvPr id="7" name="Gruppieren 6">
+                <a:extLst>
+                  <a:ext uri="{FF2B5EF4-FFF2-40B4-BE49-F238E27FC236}">
+                    <a16:creationId xmlns:a16="http://schemas.microsoft.com/office/drawing/2014/main" id="{3D37C26B-7840-E622-28C2-6D91B2CA7D0F}"/>
+                  </a:ext>
+                </a:extLst>
+              </p:cNvPr>
+              <p:cNvGrpSpPr/>
+              <p:nvPr/>
+            </p:nvGrpSpPr>
+            <p:grpSpPr>
+              <a:xfrm>
+                <a:off x="5974957" y="5300696"/>
+                <a:ext cx="1676144" cy="669968"/>
+                <a:chOff x="1134631" y="4456166"/>
+                <a:chExt cx="2160000" cy="936000"/>
+              </a:xfrm>
+              <a:grpFill/>
+            </p:grpSpPr>
+            <p:sp>
+              <p:nvSpPr>
+                <p:cNvPr id="14" name="Rechteck 13">
+                  <a:extLst>
+                    <a:ext uri="{FF2B5EF4-FFF2-40B4-BE49-F238E27FC236}">
+                      <a16:creationId xmlns:a16="http://schemas.microsoft.com/office/drawing/2014/main" id="{BF1CA58F-9B5E-5595-FAA5-B1C9E3CFB8E2}"/>
+                    </a:ext>
+                  </a:extLst>
+                </p:cNvPr>
+                <p:cNvSpPr/>
+                <p:nvPr/>
+              </p:nvSpPr>
+              <p:spPr>
+                <a:xfrm>
+                  <a:off x="1674631" y="4924166"/>
+                  <a:ext cx="1080000" cy="468000"/>
+                </a:xfrm>
+                <a:prstGeom prst="rect">
+                  <a:avLst/>
+                </a:prstGeom>
+                <a:grpFill/>
+                <a:ln>
+                  <a:noFill/>
+                </a:ln>
+              </p:spPr>
+              <p:style>
+                <a:lnRef idx="2">
+                  <a:schemeClr val="accent1">
+                    <a:shade val="50000"/>
+                  </a:schemeClr>
+                </a:lnRef>
+                <a:fillRef idx="1">
+                  <a:schemeClr val="accent1"/>
+                </a:fillRef>
+                <a:effectRef idx="0">
+                  <a:schemeClr val="accent1"/>
+                </a:effectRef>
+                <a:fontRef idx="minor">
+                  <a:schemeClr val="lt1"/>
+                </a:fontRef>
+              </p:style>
+              <p:txBody>
+                <a:bodyPr rtlCol="0" anchor="ctr"/>
+                <a:lstStyle/>
+                <a:p>
+                  <a:pPr algn="ctr"/>
+                  <a:endParaRPr lang="de-DE"/>
+                </a:p>
+              </p:txBody>
+            </p:sp>
+            <p:sp>
+              <p:nvSpPr>
+                <p:cNvPr id="15" name="Rechteck 14">
+                  <a:extLst>
+                    <a:ext uri="{FF2B5EF4-FFF2-40B4-BE49-F238E27FC236}">
+                      <a16:creationId xmlns:a16="http://schemas.microsoft.com/office/drawing/2014/main" id="{10A30CC3-8779-E5A5-8185-B6E02ECFE6AB}"/>
+                    </a:ext>
+                  </a:extLst>
+                </p:cNvPr>
+                <p:cNvSpPr/>
+                <p:nvPr/>
+              </p:nvSpPr>
+              <p:spPr>
+                <a:xfrm>
+                  <a:off x="1134631" y="4456166"/>
+                  <a:ext cx="2160000" cy="468000"/>
+                </a:xfrm>
+                <a:prstGeom prst="rect">
+                  <a:avLst/>
+                </a:prstGeom>
+                <a:grpFill/>
+                <a:ln>
+                  <a:noFill/>
+                </a:ln>
+              </p:spPr>
+              <p:style>
+                <a:lnRef idx="2">
+                  <a:schemeClr val="accent1">
+                    <a:shade val="50000"/>
+                  </a:schemeClr>
+                </a:lnRef>
+                <a:fillRef idx="1">
+                  <a:schemeClr val="accent1"/>
+                </a:fillRef>
+                <a:effectRef idx="0">
+                  <a:schemeClr val="accent1"/>
+                </a:effectRef>
+                <a:fontRef idx="minor">
+                  <a:schemeClr val="lt1"/>
+                </a:fontRef>
+              </p:style>
+              <p:txBody>
+                <a:bodyPr rtlCol="0" anchor="ctr"/>
+                <a:lstStyle/>
+                <a:p>
+                  <a:pPr algn="ctr"/>
+                  <a:endParaRPr lang="de-DE"/>
+                </a:p>
+              </p:txBody>
+            </p:sp>
+          </p:grpSp>
+          <p:sp>
+            <p:nvSpPr>
+              <p:cNvPr id="8" name="Rechteck 7">
+                <a:extLst>
+                  <a:ext uri="{FF2B5EF4-FFF2-40B4-BE49-F238E27FC236}">
+                    <a16:creationId xmlns:a16="http://schemas.microsoft.com/office/drawing/2014/main" id="{2975A00D-D194-15BC-0C02-1A2659BE04EC}"/>
+                  </a:ext>
+                </a:extLst>
+              </p:cNvPr>
+              <p:cNvSpPr/>
+              <p:nvPr/>
+            </p:nvSpPr>
+            <p:spPr>
+              <a:xfrm>
+                <a:off x="1784598" y="3273155"/>
+                <a:ext cx="5866503" cy="2027541"/>
+              </a:xfrm>
+              <a:prstGeom prst="rect">
+                <a:avLst/>
+              </a:prstGeom>
+              <a:grpFill/>
+              <a:ln>
+                <a:noFill/>
+              </a:ln>
+            </p:spPr>
+            <p:style>
+              <a:lnRef idx="2">
+                <a:schemeClr val="accent1">
+                  <a:shade val="50000"/>
+                </a:schemeClr>
+              </a:lnRef>
+              <a:fillRef idx="1">
+                <a:schemeClr val="accent1"/>
+              </a:fillRef>
+              <a:effectRef idx="0">
+                <a:schemeClr val="accent1"/>
+              </a:effectRef>
+              <a:fontRef idx="minor">
+                <a:schemeClr val="lt1"/>
+              </a:fontRef>
+            </p:style>
+            <p:txBody>
+              <a:bodyPr rtlCol="0" anchor="ctr"/>
+              <a:lstStyle/>
+              <a:p>
+                <a:pPr algn="ctr"/>
+                <a:endParaRPr lang="de-DE"/>
+              </a:p>
+            </p:txBody>
+          </p:sp>
+          <p:grpSp>
+            <p:nvGrpSpPr>
+              <p:cNvPr id="9" name="Gruppieren 8">
+                <a:extLst>
+                  <a:ext uri="{FF2B5EF4-FFF2-40B4-BE49-F238E27FC236}">
+                    <a16:creationId xmlns:a16="http://schemas.microsoft.com/office/drawing/2014/main" id="{A9BDB43C-5A39-F90B-701E-2A85AD364550}"/>
+                  </a:ext>
+                </a:extLst>
+              </p:cNvPr>
+              <p:cNvGrpSpPr/>
+              <p:nvPr/>
+            </p:nvGrpSpPr>
+            <p:grpSpPr>
+              <a:xfrm>
+                <a:off x="2203634" y="801743"/>
+                <a:ext cx="5028431" cy="3334286"/>
+                <a:chOff x="1421478" y="183857"/>
+                <a:chExt cx="7025127" cy="4658268"/>
+              </a:xfrm>
+              <a:grpFill/>
+            </p:grpSpPr>
+            <p:sp>
+              <p:nvSpPr>
+                <p:cNvPr id="10" name="Rechteck 9">
+                  <a:extLst>
+                    <a:ext uri="{FF2B5EF4-FFF2-40B4-BE49-F238E27FC236}">
+                      <a16:creationId xmlns:a16="http://schemas.microsoft.com/office/drawing/2014/main" id="{E81AF31A-6B10-1A20-3EC8-E291FDBA7D5D}"/>
+                    </a:ext>
+                  </a:extLst>
+                </p:cNvPr>
+                <p:cNvSpPr/>
+                <p:nvPr/>
+              </p:nvSpPr>
+              <p:spPr>
+                <a:xfrm>
+                  <a:off x="1421478" y="2009485"/>
+                  <a:ext cx="7025127" cy="2832640"/>
+                </a:xfrm>
+                <a:prstGeom prst="rect">
+                  <a:avLst/>
+                </a:prstGeom>
+                <a:grpFill/>
+                <a:ln>
+                  <a:noFill/>
+                </a:ln>
+              </p:spPr>
+              <p:style>
+                <a:lnRef idx="2">
+                  <a:schemeClr val="accent1">
+                    <a:shade val="50000"/>
+                  </a:schemeClr>
+                </a:lnRef>
+                <a:fillRef idx="1">
+                  <a:schemeClr val="accent1"/>
+                </a:fillRef>
+                <a:effectRef idx="0">
+                  <a:schemeClr val="accent1"/>
+                </a:effectRef>
+                <a:fontRef idx="minor">
+                  <a:schemeClr val="lt1"/>
+                </a:fontRef>
+              </p:style>
+              <p:txBody>
+                <a:bodyPr rtlCol="0" anchor="ctr"/>
+                <a:lstStyle/>
+                <a:p>
+                  <a:pPr algn="ctr"/>
+                  <a:endParaRPr lang="de-DE"/>
+                </a:p>
+              </p:txBody>
+            </p:sp>
+            <p:sp>
+              <p:nvSpPr>
+                <p:cNvPr id="11" name="Rechteck 10">
+                  <a:extLst>
+                    <a:ext uri="{FF2B5EF4-FFF2-40B4-BE49-F238E27FC236}">
+                      <a16:creationId xmlns:a16="http://schemas.microsoft.com/office/drawing/2014/main" id="{AD4630FD-F143-1696-E9B7-16C5B24F1BF7}"/>
+                    </a:ext>
+                  </a:extLst>
+                </p:cNvPr>
+                <p:cNvSpPr/>
+                <p:nvPr/>
+              </p:nvSpPr>
+              <p:spPr>
+                <a:xfrm>
+                  <a:off x="2006905" y="1384042"/>
+                  <a:ext cx="5853348" cy="2832640"/>
+                </a:xfrm>
+                <a:prstGeom prst="rect">
+                  <a:avLst/>
+                </a:prstGeom>
+                <a:grpFill/>
+                <a:ln>
+                  <a:noFill/>
+                </a:ln>
+              </p:spPr>
+              <p:style>
+                <a:lnRef idx="2">
+                  <a:schemeClr val="accent1">
+                    <a:shade val="50000"/>
+                  </a:schemeClr>
+                </a:lnRef>
+                <a:fillRef idx="1">
+                  <a:schemeClr val="accent1"/>
+                </a:fillRef>
+                <a:effectRef idx="0">
+                  <a:schemeClr val="accent1"/>
+                </a:effectRef>
+                <a:fontRef idx="minor">
+                  <a:schemeClr val="lt1"/>
+                </a:fontRef>
+              </p:style>
+              <p:txBody>
+                <a:bodyPr rtlCol="0" anchor="ctr"/>
+                <a:lstStyle/>
+                <a:p>
+                  <a:pPr algn="ctr"/>
+                  <a:endParaRPr lang="de-DE"/>
+                </a:p>
+              </p:txBody>
+            </p:sp>
+            <p:sp>
+              <p:nvSpPr>
+                <p:cNvPr id="12" name="Rechteck 11">
+                  <a:extLst>
+                    <a:ext uri="{FF2B5EF4-FFF2-40B4-BE49-F238E27FC236}">
+                      <a16:creationId xmlns:a16="http://schemas.microsoft.com/office/drawing/2014/main" id="{41285CC5-E551-48AE-5F56-2CCAB736A1B3}"/>
+                    </a:ext>
+                  </a:extLst>
+                </p:cNvPr>
+                <p:cNvSpPr/>
+                <p:nvPr/>
+              </p:nvSpPr>
+              <p:spPr>
+                <a:xfrm>
+                  <a:off x="2592333" y="827165"/>
+                  <a:ext cx="4683418" cy="2832640"/>
+                </a:xfrm>
+                <a:prstGeom prst="rect">
+                  <a:avLst/>
+                </a:prstGeom>
+                <a:grpFill/>
+                <a:ln>
+                  <a:noFill/>
+                </a:ln>
+              </p:spPr>
+              <p:style>
+                <a:lnRef idx="2">
+                  <a:schemeClr val="accent1">
+                    <a:shade val="50000"/>
+                  </a:schemeClr>
+                </a:lnRef>
+                <a:fillRef idx="1">
+                  <a:schemeClr val="accent1"/>
+                </a:fillRef>
+                <a:effectRef idx="0">
+                  <a:schemeClr val="accent1"/>
+                </a:effectRef>
+                <a:fontRef idx="minor">
+                  <a:schemeClr val="lt1"/>
+                </a:fontRef>
+              </p:style>
+              <p:txBody>
+                <a:bodyPr rtlCol="0" anchor="ctr"/>
+                <a:lstStyle/>
+                <a:p>
+                  <a:pPr algn="ctr"/>
+                  <a:endParaRPr lang="de-DE"/>
+                </a:p>
+              </p:txBody>
+            </p:sp>
+            <p:sp>
+              <p:nvSpPr>
+                <p:cNvPr id="13" name="Rechteck 12">
+                  <a:extLst>
+                    <a:ext uri="{FF2B5EF4-FFF2-40B4-BE49-F238E27FC236}">
+                      <a16:creationId xmlns:a16="http://schemas.microsoft.com/office/drawing/2014/main" id="{3109B8F4-88FC-73E0-6889-E6FD3B284739}"/>
+                    </a:ext>
+                  </a:extLst>
+                </p:cNvPr>
+                <p:cNvSpPr/>
+                <p:nvPr/>
+              </p:nvSpPr>
+              <p:spPr>
+                <a:xfrm>
+                  <a:off x="3763187" y="183857"/>
+                  <a:ext cx="2341709" cy="2832640"/>
+                </a:xfrm>
+                <a:prstGeom prst="rect">
+                  <a:avLst/>
+                </a:prstGeom>
+                <a:grpFill/>
+                <a:ln>
+                  <a:noFill/>
+                </a:ln>
+              </p:spPr>
+              <p:style>
+                <a:lnRef idx="2">
+                  <a:schemeClr val="accent1">
+                    <a:shade val="50000"/>
+                  </a:schemeClr>
+                </a:lnRef>
+                <a:fillRef idx="1">
+                  <a:schemeClr val="accent1"/>
+                </a:fillRef>
+                <a:effectRef idx="0">
+                  <a:schemeClr val="accent1"/>
+                </a:effectRef>
+                <a:fontRef idx="minor">
+                  <a:schemeClr val="lt1"/>
+                </a:fontRef>
+              </p:style>
+              <p:txBody>
+                <a:bodyPr rtlCol="0" anchor="ctr"/>
+                <a:lstStyle/>
+                <a:p>
+                  <a:pPr algn="ctr"/>
+                  <a:endParaRPr lang="de-DE"/>
+                </a:p>
+              </p:txBody>
+            </p:sp>
+          </p:grpSp>
+        </p:grpSp>
+        <p:grpSp>
+          <p:nvGrpSpPr>
+            <p:cNvPr id="20" name="Gruppieren 19">
+              <a:extLst>
+                <a:ext uri="{FF2B5EF4-FFF2-40B4-BE49-F238E27FC236}">
+                  <a16:creationId xmlns:a16="http://schemas.microsoft.com/office/drawing/2014/main" id="{407C4EB5-3AF8-3372-B5D4-0F1865359C31}"/>
+                </a:ext>
+              </a:extLst>
+            </p:cNvPr>
+            <p:cNvGrpSpPr/>
+            <p:nvPr/>
+          </p:nvGrpSpPr>
+          <p:grpSpPr>
+            <a:xfrm>
+              <a:off x="4001664" y="1654095"/>
+              <a:ext cx="1676144" cy="2028796"/>
+              <a:chOff x="2824321" y="131816"/>
+              <a:chExt cx="1676144" cy="2028796"/>
+            </a:xfrm>
+          </p:grpSpPr>
+          <p:grpSp>
+            <p:nvGrpSpPr>
+              <p:cNvPr id="21" name="Gruppieren 20">
+                <a:extLst>
+                  <a:ext uri="{FF2B5EF4-FFF2-40B4-BE49-F238E27FC236}">
+                    <a16:creationId xmlns:a16="http://schemas.microsoft.com/office/drawing/2014/main" id="{8067CD81-59E6-EDCB-1770-4E10FE6EB20F}"/>
+                  </a:ext>
+                </a:extLst>
+              </p:cNvPr>
+              <p:cNvGrpSpPr/>
+              <p:nvPr/>
+            </p:nvGrpSpPr>
+            <p:grpSpPr>
+              <a:xfrm>
+                <a:off x="2824321" y="131816"/>
+                <a:ext cx="1676144" cy="2028796"/>
+                <a:chOff x="1572639" y="2721713"/>
+                <a:chExt cx="2736000" cy="3311640"/>
+              </a:xfrm>
+            </p:grpSpPr>
+            <p:sp>
+              <p:nvSpPr>
+                <p:cNvPr id="23" name="Rechteck 22">
+                  <a:extLst>
+                    <a:ext uri="{FF2B5EF4-FFF2-40B4-BE49-F238E27FC236}">
+                      <a16:creationId xmlns:a16="http://schemas.microsoft.com/office/drawing/2014/main" id="{4D10053A-E2CB-EA31-C9DE-7B0C028AF6B6}"/>
+                    </a:ext>
+                  </a:extLst>
+                </p:cNvPr>
+                <p:cNvSpPr/>
+                <p:nvPr/>
+              </p:nvSpPr>
+              <p:spPr>
+                <a:xfrm>
+                  <a:off x="2256639" y="2721713"/>
+                  <a:ext cx="1368000" cy="3311640"/>
+                </a:xfrm>
+                <a:prstGeom prst="rect">
+                  <a:avLst/>
+                </a:prstGeom>
+                <a:solidFill>
+                  <a:schemeClr val="bg1"/>
+                </a:solidFill>
+                <a:ln>
+                  <a:noFill/>
+                </a:ln>
+              </p:spPr>
+              <p:style>
+                <a:lnRef idx="2">
+                  <a:schemeClr val="accent1">
+                    <a:shade val="50000"/>
+                  </a:schemeClr>
+                </a:lnRef>
+                <a:fillRef idx="1">
+                  <a:schemeClr val="accent1"/>
+                </a:fillRef>
+                <a:effectRef idx="0">
+                  <a:schemeClr val="accent1"/>
+                </a:effectRef>
+                <a:fontRef idx="minor">
+                  <a:schemeClr val="lt1"/>
+                </a:fontRef>
+              </p:style>
+              <p:txBody>
+                <a:bodyPr rtlCol="0" anchor="ctr"/>
+                <a:lstStyle/>
+                <a:p>
+                  <a:pPr algn="ctr"/>
+                  <a:endParaRPr lang="de-DE"/>
+                </a:p>
+              </p:txBody>
+            </p:sp>
+            <p:sp>
+              <p:nvSpPr>
+                <p:cNvPr id="24" name="Rechteck 23">
+                  <a:extLst>
+                    <a:ext uri="{FF2B5EF4-FFF2-40B4-BE49-F238E27FC236}">
+                      <a16:creationId xmlns:a16="http://schemas.microsoft.com/office/drawing/2014/main" id="{A46CDBE6-D78E-6551-F137-A38F4A36BB60}"/>
+                    </a:ext>
+                  </a:extLst>
+                </p:cNvPr>
+                <p:cNvSpPr/>
+                <p:nvPr/>
+              </p:nvSpPr>
+              <p:spPr>
+                <a:xfrm>
+                  <a:off x="1572639" y="3257603"/>
+                  <a:ext cx="2736000" cy="2239861"/>
+                </a:xfrm>
+                <a:prstGeom prst="rect">
+                  <a:avLst/>
+                </a:prstGeom>
+                <a:solidFill>
+                  <a:schemeClr val="bg1"/>
+                </a:solidFill>
+                <a:ln>
+                  <a:noFill/>
+                </a:ln>
+              </p:spPr>
+              <p:style>
+                <a:lnRef idx="2">
+                  <a:schemeClr val="accent1">
+                    <a:shade val="50000"/>
+                  </a:schemeClr>
+                </a:lnRef>
+                <a:fillRef idx="1">
+                  <a:schemeClr val="accent1"/>
+                </a:fillRef>
+                <a:effectRef idx="0">
+                  <a:schemeClr val="accent1"/>
+                </a:effectRef>
+                <a:fontRef idx="minor">
+                  <a:schemeClr val="lt1"/>
+                </a:fontRef>
+              </p:style>
+              <p:txBody>
+                <a:bodyPr rtlCol="0" anchor="ctr"/>
+                <a:lstStyle/>
+                <a:p>
+                  <a:pPr algn="ctr"/>
+                  <a:endParaRPr lang="de-DE" dirty="0"/>
+                </a:p>
+              </p:txBody>
+            </p:sp>
+          </p:grpSp>
+          <p:sp>
+            <p:nvSpPr>
+              <p:cNvPr id="22" name="Rechteck 21">
+                <a:extLst>
+                  <a:ext uri="{FF2B5EF4-FFF2-40B4-BE49-F238E27FC236}">
+                    <a16:creationId xmlns:a16="http://schemas.microsoft.com/office/drawing/2014/main" id="{3789A1E5-1BD1-463F-D5DE-03872CCAD9A1}"/>
+                  </a:ext>
+                </a:extLst>
+              </p:cNvPr>
+              <p:cNvSpPr/>
+              <p:nvPr/>
+            </p:nvSpPr>
+            <p:spPr>
+              <a:xfrm>
+                <a:off x="3659297" y="1046583"/>
+                <a:ext cx="841167" cy="785729"/>
+              </a:xfrm>
+              <a:prstGeom prst="rect">
+                <a:avLst/>
+              </a:prstGeom>
+              <a:solidFill>
+                <a:schemeClr val="tx1"/>
+              </a:solidFill>
+              <a:ln>
+                <a:noFill/>
+              </a:ln>
+            </p:spPr>
+            <p:style>
+              <a:lnRef idx="2">
+                <a:schemeClr val="accent1">
+                  <a:shade val="50000"/>
+                </a:schemeClr>
+              </a:lnRef>
+              <a:fillRef idx="1">
+                <a:schemeClr val="accent1"/>
+              </a:fillRef>
+              <a:effectRef idx="0">
+                <a:schemeClr val="accent1"/>
+              </a:effectRef>
+              <a:fontRef idx="minor">
+                <a:schemeClr val="lt1"/>
+              </a:fontRef>
+            </p:style>
+            <p:txBody>
+              <a:bodyPr rtlCol="0" anchor="ctr"/>
+              <a:lstStyle/>
+              <a:p>
+                <a:pPr algn="ctr"/>
+                <a:endParaRPr lang="de-DE"/>
+              </a:p>
+            </p:txBody>
+          </p:sp>
+        </p:grpSp>
+        <p:grpSp>
+          <p:nvGrpSpPr>
+            <p:cNvPr id="25" name="Gruppieren 24">
+              <a:extLst>
+                <a:ext uri="{FF2B5EF4-FFF2-40B4-BE49-F238E27FC236}">
+                  <a16:creationId xmlns:a16="http://schemas.microsoft.com/office/drawing/2014/main" id="{9F677130-2AEF-5799-6BDE-2F11C76CF443}"/>
+                </a:ext>
+              </a:extLst>
+            </p:cNvPr>
+            <p:cNvGrpSpPr/>
+            <p:nvPr/>
+          </p:nvGrpSpPr>
+          <p:grpSpPr>
+            <a:xfrm>
+              <a:off x="1487449" y="1648512"/>
+              <a:ext cx="1687022" cy="2028796"/>
+              <a:chOff x="310106" y="135564"/>
+              <a:chExt cx="1687022" cy="2028796"/>
+            </a:xfrm>
+          </p:grpSpPr>
+          <p:grpSp>
+            <p:nvGrpSpPr>
+              <p:cNvPr id="26" name="Gruppieren 25">
+                <a:extLst>
+                  <a:ext uri="{FF2B5EF4-FFF2-40B4-BE49-F238E27FC236}">
+                    <a16:creationId xmlns:a16="http://schemas.microsoft.com/office/drawing/2014/main" id="{7BF33804-07D0-9F48-97C4-F23B924EF0E9}"/>
+                  </a:ext>
+                </a:extLst>
+              </p:cNvPr>
+              <p:cNvGrpSpPr/>
+              <p:nvPr/>
+            </p:nvGrpSpPr>
+            <p:grpSpPr>
+              <a:xfrm>
+                <a:off x="310106" y="135564"/>
+                <a:ext cx="1676144" cy="2028796"/>
+                <a:chOff x="1572639" y="2721713"/>
+                <a:chExt cx="2736000" cy="3311640"/>
+              </a:xfrm>
+            </p:grpSpPr>
+            <p:sp>
+              <p:nvSpPr>
+                <p:cNvPr id="28" name="Rechteck 27">
+                  <a:extLst>
+                    <a:ext uri="{FF2B5EF4-FFF2-40B4-BE49-F238E27FC236}">
+                      <a16:creationId xmlns:a16="http://schemas.microsoft.com/office/drawing/2014/main" id="{6E80D70D-2D44-474C-F98A-48A2616CB14E}"/>
+                    </a:ext>
+                  </a:extLst>
+                </p:cNvPr>
+                <p:cNvSpPr/>
+                <p:nvPr/>
+              </p:nvSpPr>
+              <p:spPr>
+                <a:xfrm>
+                  <a:off x="2256639" y="2721713"/>
+                  <a:ext cx="1368000" cy="3311640"/>
+                </a:xfrm>
+                <a:prstGeom prst="rect">
+                  <a:avLst/>
+                </a:prstGeom>
+                <a:solidFill>
+                  <a:schemeClr val="bg1"/>
+                </a:solidFill>
+                <a:ln>
+                  <a:noFill/>
+                </a:ln>
+              </p:spPr>
+              <p:style>
+                <a:lnRef idx="2">
+                  <a:schemeClr val="accent1">
+                    <a:shade val="50000"/>
+                  </a:schemeClr>
+                </a:lnRef>
+                <a:fillRef idx="1">
+                  <a:schemeClr val="accent1"/>
+                </a:fillRef>
+                <a:effectRef idx="0">
+                  <a:schemeClr val="accent1"/>
+                </a:effectRef>
+                <a:fontRef idx="minor">
+                  <a:schemeClr val="lt1"/>
+                </a:fontRef>
+              </p:style>
+              <p:txBody>
+                <a:bodyPr rtlCol="0" anchor="ctr"/>
+                <a:lstStyle/>
+                <a:p>
+                  <a:pPr algn="ctr"/>
+                  <a:endParaRPr lang="de-DE"/>
+                </a:p>
+              </p:txBody>
+            </p:sp>
+            <p:sp>
+              <p:nvSpPr>
+                <p:cNvPr id="29" name="Rechteck 28">
+                  <a:extLst>
+                    <a:ext uri="{FF2B5EF4-FFF2-40B4-BE49-F238E27FC236}">
+                      <a16:creationId xmlns:a16="http://schemas.microsoft.com/office/drawing/2014/main" id="{692F500B-BE2A-D794-BE2F-0C9B5514ABEE}"/>
+                    </a:ext>
+                  </a:extLst>
+                </p:cNvPr>
+                <p:cNvSpPr/>
+                <p:nvPr/>
+              </p:nvSpPr>
+              <p:spPr>
+                <a:xfrm>
+                  <a:off x="1572639" y="3257603"/>
+                  <a:ext cx="2736000" cy="2239861"/>
+                </a:xfrm>
+                <a:prstGeom prst="rect">
+                  <a:avLst/>
+                </a:prstGeom>
+                <a:solidFill>
+                  <a:schemeClr val="bg1"/>
+                </a:solidFill>
+                <a:ln>
+                  <a:noFill/>
+                </a:ln>
+              </p:spPr>
+              <p:style>
+                <a:lnRef idx="2">
+                  <a:schemeClr val="accent1">
+                    <a:shade val="50000"/>
+                  </a:schemeClr>
+                </a:lnRef>
+                <a:fillRef idx="1">
+                  <a:schemeClr val="accent1"/>
+                </a:fillRef>
+                <a:effectRef idx="0">
+                  <a:schemeClr val="accent1"/>
+                </a:effectRef>
+                <a:fontRef idx="minor">
+                  <a:schemeClr val="lt1"/>
+                </a:fontRef>
+              </p:style>
+              <p:txBody>
+                <a:bodyPr rtlCol="0" anchor="ctr"/>
+                <a:lstStyle/>
+                <a:p>
+                  <a:pPr algn="ctr"/>
+                  <a:endParaRPr lang="de-DE"/>
+                </a:p>
+              </p:txBody>
+            </p:sp>
+          </p:grpSp>
+          <p:sp>
+            <p:nvSpPr>
+              <p:cNvPr id="27" name="Rechteck 26">
+                <a:extLst>
+                  <a:ext uri="{FF2B5EF4-FFF2-40B4-BE49-F238E27FC236}">
+                    <a16:creationId xmlns:a16="http://schemas.microsoft.com/office/drawing/2014/main" id="{5A5A9C61-45F2-F073-0A2D-1A07C4B47123}"/>
+                  </a:ext>
+                </a:extLst>
+              </p:cNvPr>
+              <p:cNvSpPr/>
+              <p:nvPr/>
+            </p:nvSpPr>
+            <p:spPr>
+              <a:xfrm>
+                <a:off x="1155961" y="1055913"/>
+                <a:ext cx="841167" cy="785729"/>
+              </a:xfrm>
+              <a:prstGeom prst="rect">
+                <a:avLst/>
+              </a:prstGeom>
+              <a:solidFill>
+                <a:schemeClr val="tx1"/>
+              </a:solidFill>
+              <a:ln>
+                <a:noFill/>
+              </a:ln>
+            </p:spPr>
+            <p:style>
+              <a:lnRef idx="2">
+                <a:schemeClr val="accent1">
+                  <a:shade val="50000"/>
+                </a:schemeClr>
+              </a:lnRef>
+              <a:fillRef idx="1">
+                <a:schemeClr val="accent1"/>
+              </a:fillRef>
+              <a:effectRef idx="0">
+                <a:schemeClr val="accent1"/>
+              </a:effectRef>
+              <a:fontRef idx="minor">
+                <a:schemeClr val="lt1"/>
+              </a:fontRef>
+            </p:style>
+            <p:txBody>
+              <a:bodyPr rtlCol="0" anchor="ctr"/>
+              <a:lstStyle/>
+              <a:p>
+                <a:pPr algn="ctr"/>
+                <a:endParaRPr lang="de-DE"/>
+              </a:p>
+            </p:txBody>
+          </p:sp>
+        </p:grpSp>
+      </p:grpSp>
+      <p:grpSp>
+        <p:nvGrpSpPr>
+          <p:cNvPr id="57" name="Gruppieren 56">
+            <a:extLst>
+              <a:ext uri="{FF2B5EF4-FFF2-40B4-BE49-F238E27FC236}">
+                <a16:creationId xmlns:a16="http://schemas.microsoft.com/office/drawing/2014/main" id="{22725551-785E-00DB-B59C-AE1D257F2738}"/>
+              </a:ext>
+            </a:extLst>
+          </p:cNvPr>
+          <p:cNvGrpSpPr/>
+          <p:nvPr/>
+        </p:nvGrpSpPr>
+        <p:grpSpPr>
+          <a:xfrm>
+            <a:off x="6232191" y="377264"/>
+            <a:ext cx="5866503" cy="5168921"/>
+            <a:chOff x="6232191" y="377264"/>
+            <a:chExt cx="5866503" cy="5168921"/>
+          </a:xfrm>
+        </p:grpSpPr>
+        <p:grpSp>
+          <p:nvGrpSpPr>
+            <p:cNvPr id="30" name="Gruppieren 29">
+              <a:extLst>
+                <a:ext uri="{FF2B5EF4-FFF2-40B4-BE49-F238E27FC236}">
+                  <a16:creationId xmlns:a16="http://schemas.microsoft.com/office/drawing/2014/main" id="{CF7B0052-A245-D40F-3B79-1BAE8C7C3AA8}"/>
+                </a:ext>
+              </a:extLst>
+            </p:cNvPr>
+            <p:cNvGrpSpPr/>
+            <p:nvPr/>
+          </p:nvGrpSpPr>
+          <p:grpSpPr>
+            <a:xfrm>
+              <a:off x="6232191" y="377264"/>
+              <a:ext cx="5866503" cy="5168921"/>
+              <a:chOff x="1784598" y="801743"/>
+              <a:chExt cx="5866503" cy="5168921"/>
+            </a:xfrm>
+            <a:noFill/>
+          </p:grpSpPr>
+          <p:grpSp>
+            <p:nvGrpSpPr>
+              <p:cNvPr id="31" name="Gruppieren 30">
+                <a:extLst>
+                  <a:ext uri="{FF2B5EF4-FFF2-40B4-BE49-F238E27FC236}">
+                    <a16:creationId xmlns:a16="http://schemas.microsoft.com/office/drawing/2014/main" id="{7DBF663E-F7E0-DF5C-8A59-EE8BFB0C269F}"/>
+                  </a:ext>
+                </a:extLst>
+              </p:cNvPr>
+              <p:cNvGrpSpPr/>
+              <p:nvPr/>
+            </p:nvGrpSpPr>
+            <p:grpSpPr>
+              <a:xfrm>
+                <a:off x="1784598" y="5300696"/>
+                <a:ext cx="1676144" cy="669968"/>
+                <a:chOff x="1134631" y="4456166"/>
+                <a:chExt cx="2160000" cy="936000"/>
+              </a:xfrm>
+              <a:grpFill/>
+            </p:grpSpPr>
+            <p:sp>
+              <p:nvSpPr>
+                <p:cNvPr id="44" name="Rechteck 43">
+                  <a:extLst>
+                    <a:ext uri="{FF2B5EF4-FFF2-40B4-BE49-F238E27FC236}">
+                      <a16:creationId xmlns:a16="http://schemas.microsoft.com/office/drawing/2014/main" id="{631F1AE8-F386-FC79-B5C2-26C8B40350C2}"/>
+                    </a:ext>
+                  </a:extLst>
+                </p:cNvPr>
+                <p:cNvSpPr/>
+                <p:nvPr/>
+              </p:nvSpPr>
+              <p:spPr>
+                <a:xfrm>
+                  <a:off x="1674631" y="4924166"/>
+                  <a:ext cx="1080000" cy="468000"/>
+                </a:xfrm>
+                <a:prstGeom prst="rect">
+                  <a:avLst/>
+                </a:prstGeom>
+                <a:grpFill/>
+                <a:ln>
+                  <a:noFill/>
+                </a:ln>
+              </p:spPr>
+              <p:style>
+                <a:lnRef idx="2">
+                  <a:schemeClr val="accent1">
+                    <a:shade val="50000"/>
+                  </a:schemeClr>
+                </a:lnRef>
+                <a:fillRef idx="1">
+                  <a:schemeClr val="accent1"/>
+                </a:fillRef>
+                <a:effectRef idx="0">
+                  <a:schemeClr val="accent1"/>
+                </a:effectRef>
+                <a:fontRef idx="minor">
+                  <a:schemeClr val="lt1"/>
+                </a:fontRef>
+              </p:style>
+              <p:txBody>
+                <a:bodyPr rtlCol="0" anchor="ctr"/>
+                <a:lstStyle/>
+                <a:p>
+                  <a:pPr algn="ctr"/>
+                  <a:endParaRPr lang="de-DE"/>
+                </a:p>
+              </p:txBody>
+            </p:sp>
+            <p:sp>
+              <p:nvSpPr>
+                <p:cNvPr id="45" name="Rechteck 44">
+                  <a:extLst>
+                    <a:ext uri="{FF2B5EF4-FFF2-40B4-BE49-F238E27FC236}">
+                      <a16:creationId xmlns:a16="http://schemas.microsoft.com/office/drawing/2014/main" id="{58B8C691-0BA7-D7E0-DB7A-58B86FC734EE}"/>
+                    </a:ext>
+                  </a:extLst>
+                </p:cNvPr>
+                <p:cNvSpPr/>
+                <p:nvPr/>
+              </p:nvSpPr>
+              <p:spPr>
+                <a:xfrm>
+                  <a:off x="1134631" y="4456166"/>
+                  <a:ext cx="2160000" cy="468000"/>
+                </a:xfrm>
+                <a:prstGeom prst="rect">
+                  <a:avLst/>
+                </a:prstGeom>
+                <a:grpFill/>
+                <a:ln>
+                  <a:noFill/>
+                </a:ln>
+              </p:spPr>
+              <p:style>
+                <a:lnRef idx="2">
+                  <a:schemeClr val="accent1">
+                    <a:shade val="50000"/>
+                  </a:schemeClr>
+                </a:lnRef>
+                <a:fillRef idx="1">
+                  <a:schemeClr val="accent1"/>
+                </a:fillRef>
+                <a:effectRef idx="0">
+                  <a:schemeClr val="accent1"/>
+                </a:effectRef>
+                <a:fontRef idx="minor">
+                  <a:schemeClr val="lt1"/>
+                </a:fontRef>
+              </p:style>
+              <p:txBody>
+                <a:bodyPr rtlCol="0" anchor="ctr"/>
+                <a:lstStyle/>
+                <a:p>
+                  <a:pPr algn="ctr"/>
+                  <a:endParaRPr lang="de-DE" dirty="0"/>
+                </a:p>
+              </p:txBody>
+            </p:sp>
+          </p:grpSp>
+          <p:grpSp>
+            <p:nvGrpSpPr>
+              <p:cNvPr id="32" name="Gruppieren 31">
+                <a:extLst>
+                  <a:ext uri="{FF2B5EF4-FFF2-40B4-BE49-F238E27FC236}">
+                    <a16:creationId xmlns:a16="http://schemas.microsoft.com/office/drawing/2014/main" id="{1FB98F10-A42A-4573-3C4D-AFACC792E85B}"/>
+                  </a:ext>
+                </a:extLst>
+              </p:cNvPr>
+              <p:cNvGrpSpPr/>
+              <p:nvPr/>
+            </p:nvGrpSpPr>
+            <p:grpSpPr>
+              <a:xfrm>
+                <a:off x="3879778" y="5300696"/>
+                <a:ext cx="1676144" cy="669968"/>
+                <a:chOff x="1134631" y="4456166"/>
+                <a:chExt cx="2160000" cy="936000"/>
+              </a:xfrm>
+              <a:grpFill/>
+            </p:grpSpPr>
+            <p:sp>
+              <p:nvSpPr>
+                <p:cNvPr id="42" name="Rechteck 41">
+                  <a:extLst>
+                    <a:ext uri="{FF2B5EF4-FFF2-40B4-BE49-F238E27FC236}">
+                      <a16:creationId xmlns:a16="http://schemas.microsoft.com/office/drawing/2014/main" id="{5F116EEE-C4AB-0E5D-4246-508E8F917611}"/>
+                    </a:ext>
+                  </a:extLst>
+                </p:cNvPr>
+                <p:cNvSpPr/>
+                <p:nvPr/>
+              </p:nvSpPr>
+              <p:spPr>
+                <a:xfrm>
+                  <a:off x="1674631" y="4924166"/>
+                  <a:ext cx="1080000" cy="468000"/>
+                </a:xfrm>
+                <a:prstGeom prst="rect">
+                  <a:avLst/>
+                </a:prstGeom>
+                <a:grpFill/>
+                <a:ln>
+                  <a:noFill/>
+                </a:ln>
+              </p:spPr>
+              <p:style>
+                <a:lnRef idx="2">
+                  <a:schemeClr val="accent1">
+                    <a:shade val="50000"/>
+                  </a:schemeClr>
+                </a:lnRef>
+                <a:fillRef idx="1">
+                  <a:schemeClr val="accent1"/>
+                </a:fillRef>
+                <a:effectRef idx="0">
+                  <a:schemeClr val="accent1"/>
+                </a:effectRef>
+                <a:fontRef idx="minor">
+                  <a:schemeClr val="lt1"/>
+                </a:fontRef>
+              </p:style>
+              <p:txBody>
+                <a:bodyPr rtlCol="0" anchor="ctr"/>
+                <a:lstStyle/>
+                <a:p>
+                  <a:pPr algn="ctr"/>
+                  <a:endParaRPr lang="de-DE"/>
+                </a:p>
+              </p:txBody>
+            </p:sp>
+            <p:sp>
+              <p:nvSpPr>
+                <p:cNvPr id="43" name="Rechteck 42">
+                  <a:extLst>
+                    <a:ext uri="{FF2B5EF4-FFF2-40B4-BE49-F238E27FC236}">
+                      <a16:creationId xmlns:a16="http://schemas.microsoft.com/office/drawing/2014/main" id="{EFB6795F-BAF0-B94D-F2BB-C484886F038E}"/>
+                    </a:ext>
+                  </a:extLst>
+                </p:cNvPr>
+                <p:cNvSpPr/>
+                <p:nvPr/>
+              </p:nvSpPr>
+              <p:spPr>
+                <a:xfrm>
+                  <a:off x="1134631" y="4456166"/>
+                  <a:ext cx="2160000" cy="468000"/>
+                </a:xfrm>
+                <a:prstGeom prst="rect">
+                  <a:avLst/>
+                </a:prstGeom>
+                <a:grpFill/>
+                <a:ln>
+                  <a:noFill/>
+                </a:ln>
+              </p:spPr>
+              <p:style>
+                <a:lnRef idx="2">
+                  <a:schemeClr val="accent1">
+                    <a:shade val="50000"/>
+                  </a:schemeClr>
+                </a:lnRef>
+                <a:fillRef idx="1">
+                  <a:schemeClr val="accent1"/>
+                </a:fillRef>
+                <a:effectRef idx="0">
+                  <a:schemeClr val="accent1"/>
+                </a:effectRef>
+                <a:fontRef idx="minor">
+                  <a:schemeClr val="lt1"/>
+                </a:fontRef>
+              </p:style>
+              <p:txBody>
+                <a:bodyPr rtlCol="0" anchor="ctr"/>
+                <a:lstStyle/>
+                <a:p>
+                  <a:pPr algn="ctr"/>
+                  <a:endParaRPr lang="de-DE"/>
+                </a:p>
+              </p:txBody>
+            </p:sp>
+          </p:grpSp>
+          <p:grpSp>
+            <p:nvGrpSpPr>
+              <p:cNvPr id="33" name="Gruppieren 32">
+                <a:extLst>
+                  <a:ext uri="{FF2B5EF4-FFF2-40B4-BE49-F238E27FC236}">
+                    <a16:creationId xmlns:a16="http://schemas.microsoft.com/office/drawing/2014/main" id="{E7A97446-4020-4108-253F-8DA1AD9E8392}"/>
+                  </a:ext>
+                </a:extLst>
+              </p:cNvPr>
+              <p:cNvGrpSpPr/>
+              <p:nvPr/>
+            </p:nvGrpSpPr>
+            <p:grpSpPr>
+              <a:xfrm>
+                <a:off x="5974957" y="5300696"/>
+                <a:ext cx="1676144" cy="669968"/>
+                <a:chOff x="1134631" y="4456166"/>
+                <a:chExt cx="2160000" cy="936000"/>
+              </a:xfrm>
+              <a:grpFill/>
+            </p:grpSpPr>
+            <p:sp>
+              <p:nvSpPr>
+                <p:cNvPr id="40" name="Rechteck 39">
+                  <a:extLst>
+                    <a:ext uri="{FF2B5EF4-FFF2-40B4-BE49-F238E27FC236}">
+                      <a16:creationId xmlns:a16="http://schemas.microsoft.com/office/drawing/2014/main" id="{95BDE43D-5FAE-D2B2-9C8A-F75540004EBB}"/>
+                    </a:ext>
+                  </a:extLst>
+                </p:cNvPr>
+                <p:cNvSpPr/>
+                <p:nvPr/>
+              </p:nvSpPr>
+              <p:spPr>
+                <a:xfrm>
+                  <a:off x="1674631" y="4924166"/>
+                  <a:ext cx="1080000" cy="468000"/>
+                </a:xfrm>
+                <a:prstGeom prst="rect">
+                  <a:avLst/>
+                </a:prstGeom>
+                <a:grpFill/>
+                <a:ln>
+                  <a:noFill/>
+                </a:ln>
+              </p:spPr>
+              <p:style>
+                <a:lnRef idx="2">
+                  <a:schemeClr val="accent1">
+                    <a:shade val="50000"/>
+                  </a:schemeClr>
+                </a:lnRef>
+                <a:fillRef idx="1">
+                  <a:schemeClr val="accent1"/>
+                </a:fillRef>
+                <a:effectRef idx="0">
+                  <a:schemeClr val="accent1"/>
+                </a:effectRef>
+                <a:fontRef idx="minor">
+                  <a:schemeClr val="lt1"/>
+                </a:fontRef>
+              </p:style>
+              <p:txBody>
+                <a:bodyPr rtlCol="0" anchor="ctr"/>
+                <a:lstStyle/>
+                <a:p>
+                  <a:pPr algn="ctr"/>
+                  <a:endParaRPr lang="de-DE"/>
+                </a:p>
+              </p:txBody>
+            </p:sp>
+            <p:sp>
+              <p:nvSpPr>
+                <p:cNvPr id="41" name="Rechteck 40">
+                  <a:extLst>
+                    <a:ext uri="{FF2B5EF4-FFF2-40B4-BE49-F238E27FC236}">
+                      <a16:creationId xmlns:a16="http://schemas.microsoft.com/office/drawing/2014/main" id="{E63576DF-EEB0-4112-733D-DBB1C52DE01F}"/>
+                    </a:ext>
+                  </a:extLst>
+                </p:cNvPr>
+                <p:cNvSpPr/>
+                <p:nvPr/>
+              </p:nvSpPr>
+              <p:spPr>
+                <a:xfrm>
+                  <a:off x="1134631" y="4456166"/>
+                  <a:ext cx="2160000" cy="468000"/>
+                </a:xfrm>
+                <a:prstGeom prst="rect">
+                  <a:avLst/>
+                </a:prstGeom>
+                <a:grpFill/>
+                <a:ln>
+                  <a:noFill/>
+                </a:ln>
+              </p:spPr>
+              <p:style>
+                <a:lnRef idx="2">
+                  <a:schemeClr val="accent1">
+                    <a:shade val="50000"/>
+                  </a:schemeClr>
+                </a:lnRef>
+                <a:fillRef idx="1">
+                  <a:schemeClr val="accent1"/>
+                </a:fillRef>
+                <a:effectRef idx="0">
+                  <a:schemeClr val="accent1"/>
+                </a:effectRef>
+                <a:fontRef idx="minor">
+                  <a:schemeClr val="lt1"/>
+                </a:fontRef>
+              </p:style>
+              <p:txBody>
+                <a:bodyPr rtlCol="0" anchor="ctr"/>
+                <a:lstStyle/>
+                <a:p>
+                  <a:pPr algn="ctr"/>
+                  <a:endParaRPr lang="de-DE"/>
+                </a:p>
+              </p:txBody>
+            </p:sp>
+          </p:grpSp>
+          <p:sp>
+            <p:nvSpPr>
+              <p:cNvPr id="34" name="Rechteck 33">
+                <a:extLst>
+                  <a:ext uri="{FF2B5EF4-FFF2-40B4-BE49-F238E27FC236}">
+                    <a16:creationId xmlns:a16="http://schemas.microsoft.com/office/drawing/2014/main" id="{4DFE1F68-5EA7-13C9-14A4-ED9B4F40D569}"/>
+                  </a:ext>
+                </a:extLst>
+              </p:cNvPr>
+              <p:cNvSpPr/>
+              <p:nvPr/>
+            </p:nvSpPr>
+            <p:spPr>
+              <a:xfrm>
+                <a:off x="1784598" y="3273155"/>
+                <a:ext cx="5866503" cy="2027541"/>
+              </a:xfrm>
+              <a:prstGeom prst="rect">
+                <a:avLst/>
+              </a:prstGeom>
+              <a:grpFill/>
+              <a:ln>
+                <a:noFill/>
+              </a:ln>
+            </p:spPr>
+            <p:style>
+              <a:lnRef idx="2">
+                <a:schemeClr val="accent1">
+                  <a:shade val="50000"/>
+                </a:schemeClr>
+              </a:lnRef>
+              <a:fillRef idx="1">
+                <a:schemeClr val="accent1"/>
+              </a:fillRef>
+              <a:effectRef idx="0">
+                <a:schemeClr val="accent1"/>
+              </a:effectRef>
+              <a:fontRef idx="minor">
+                <a:schemeClr val="lt1"/>
+              </a:fontRef>
+            </p:style>
+            <p:txBody>
+              <a:bodyPr rtlCol="0" anchor="ctr"/>
+              <a:lstStyle/>
+              <a:p>
+                <a:pPr algn="ctr"/>
+                <a:endParaRPr lang="de-DE"/>
+              </a:p>
+            </p:txBody>
+          </p:sp>
+          <p:grpSp>
+            <p:nvGrpSpPr>
+              <p:cNvPr id="35" name="Gruppieren 34">
+                <a:extLst>
+                  <a:ext uri="{FF2B5EF4-FFF2-40B4-BE49-F238E27FC236}">
+                    <a16:creationId xmlns:a16="http://schemas.microsoft.com/office/drawing/2014/main" id="{DCC19CC6-0DAC-5742-07CE-B1F213D4F733}"/>
+                  </a:ext>
+                </a:extLst>
+              </p:cNvPr>
+              <p:cNvGrpSpPr/>
+              <p:nvPr/>
+            </p:nvGrpSpPr>
+            <p:grpSpPr>
+              <a:xfrm>
+                <a:off x="2203634" y="801743"/>
+                <a:ext cx="5028431" cy="3334286"/>
+                <a:chOff x="1421478" y="183857"/>
+                <a:chExt cx="7025127" cy="4658268"/>
+              </a:xfrm>
+              <a:grpFill/>
+            </p:grpSpPr>
+            <p:sp>
+              <p:nvSpPr>
+                <p:cNvPr id="36" name="Rechteck 35">
+                  <a:extLst>
+                    <a:ext uri="{FF2B5EF4-FFF2-40B4-BE49-F238E27FC236}">
+                      <a16:creationId xmlns:a16="http://schemas.microsoft.com/office/drawing/2014/main" id="{B87B413B-C935-ACCA-CF4E-01057C2B0C7D}"/>
+                    </a:ext>
+                  </a:extLst>
+                </p:cNvPr>
+                <p:cNvSpPr/>
+                <p:nvPr/>
+              </p:nvSpPr>
+              <p:spPr>
+                <a:xfrm>
+                  <a:off x="1421478" y="2009485"/>
+                  <a:ext cx="7025127" cy="2832640"/>
+                </a:xfrm>
+                <a:prstGeom prst="rect">
+                  <a:avLst/>
+                </a:prstGeom>
+                <a:grpFill/>
+                <a:ln>
+                  <a:noFill/>
+                </a:ln>
+              </p:spPr>
+              <p:style>
+                <a:lnRef idx="2">
+                  <a:schemeClr val="accent1">
+                    <a:shade val="50000"/>
+                  </a:schemeClr>
+                </a:lnRef>
+                <a:fillRef idx="1">
+                  <a:schemeClr val="accent1"/>
+                </a:fillRef>
+                <a:effectRef idx="0">
+                  <a:schemeClr val="accent1"/>
+                </a:effectRef>
+                <a:fontRef idx="minor">
+                  <a:schemeClr val="lt1"/>
+                </a:fontRef>
+              </p:style>
+              <p:txBody>
+                <a:bodyPr rtlCol="0" anchor="ctr"/>
+                <a:lstStyle/>
+                <a:p>
+                  <a:pPr algn="ctr"/>
+                  <a:endParaRPr lang="de-DE"/>
+                </a:p>
+              </p:txBody>
+            </p:sp>
+            <p:sp>
+              <p:nvSpPr>
+                <p:cNvPr id="37" name="Rechteck 36">
+                  <a:extLst>
+                    <a:ext uri="{FF2B5EF4-FFF2-40B4-BE49-F238E27FC236}">
+                      <a16:creationId xmlns:a16="http://schemas.microsoft.com/office/drawing/2014/main" id="{77020F23-F98C-DC47-03BA-2F4E7E10D4A4}"/>
+                    </a:ext>
+                  </a:extLst>
+                </p:cNvPr>
+                <p:cNvSpPr/>
+                <p:nvPr/>
+              </p:nvSpPr>
+              <p:spPr>
+                <a:xfrm>
+                  <a:off x="2006905" y="1384042"/>
+                  <a:ext cx="5853348" cy="2832640"/>
+                </a:xfrm>
+                <a:prstGeom prst="rect">
+                  <a:avLst/>
+                </a:prstGeom>
+                <a:grpFill/>
+                <a:ln>
+                  <a:noFill/>
+                </a:ln>
+              </p:spPr>
+              <p:style>
+                <a:lnRef idx="2">
+                  <a:schemeClr val="accent1">
+                    <a:shade val="50000"/>
+                  </a:schemeClr>
+                </a:lnRef>
+                <a:fillRef idx="1">
+                  <a:schemeClr val="accent1"/>
+                </a:fillRef>
+                <a:effectRef idx="0">
+                  <a:schemeClr val="accent1"/>
+                </a:effectRef>
+                <a:fontRef idx="minor">
+                  <a:schemeClr val="lt1"/>
+                </a:fontRef>
+              </p:style>
+              <p:txBody>
+                <a:bodyPr rtlCol="0" anchor="ctr"/>
+                <a:lstStyle/>
+                <a:p>
+                  <a:pPr algn="ctr"/>
+                  <a:endParaRPr lang="de-DE"/>
+                </a:p>
+              </p:txBody>
+            </p:sp>
+            <p:sp>
+              <p:nvSpPr>
+                <p:cNvPr id="38" name="Rechteck 37">
+                  <a:extLst>
+                    <a:ext uri="{FF2B5EF4-FFF2-40B4-BE49-F238E27FC236}">
+                      <a16:creationId xmlns:a16="http://schemas.microsoft.com/office/drawing/2014/main" id="{DDA80811-36DE-FDB0-E881-FF8FE15534B8}"/>
+                    </a:ext>
+                  </a:extLst>
+                </p:cNvPr>
+                <p:cNvSpPr/>
+                <p:nvPr/>
+              </p:nvSpPr>
+              <p:spPr>
+                <a:xfrm>
+                  <a:off x="2592333" y="827165"/>
+                  <a:ext cx="4683418" cy="2832640"/>
+                </a:xfrm>
+                <a:prstGeom prst="rect">
+                  <a:avLst/>
+                </a:prstGeom>
+                <a:grpFill/>
+                <a:ln>
+                  <a:noFill/>
+                </a:ln>
+              </p:spPr>
+              <p:style>
+                <a:lnRef idx="2">
+                  <a:schemeClr val="accent1">
+                    <a:shade val="50000"/>
+                  </a:schemeClr>
+                </a:lnRef>
+                <a:fillRef idx="1">
+                  <a:schemeClr val="accent1"/>
+                </a:fillRef>
+                <a:effectRef idx="0">
+                  <a:schemeClr val="accent1"/>
+                </a:effectRef>
+                <a:fontRef idx="minor">
+                  <a:schemeClr val="lt1"/>
+                </a:fontRef>
+              </p:style>
+              <p:txBody>
+                <a:bodyPr rtlCol="0" anchor="ctr"/>
+                <a:lstStyle/>
+                <a:p>
+                  <a:pPr algn="ctr"/>
+                  <a:endParaRPr lang="de-DE"/>
+                </a:p>
+              </p:txBody>
+            </p:sp>
+            <p:sp>
+              <p:nvSpPr>
+                <p:cNvPr id="39" name="Rechteck 38">
+                  <a:extLst>
+                    <a:ext uri="{FF2B5EF4-FFF2-40B4-BE49-F238E27FC236}">
+                      <a16:creationId xmlns:a16="http://schemas.microsoft.com/office/drawing/2014/main" id="{B9C8CA52-B567-DEA9-4FC7-CC1740344701}"/>
+                    </a:ext>
+                  </a:extLst>
+                </p:cNvPr>
+                <p:cNvSpPr/>
+                <p:nvPr/>
+              </p:nvSpPr>
+              <p:spPr>
+                <a:xfrm>
+                  <a:off x="3763187" y="183857"/>
+                  <a:ext cx="2341709" cy="2832640"/>
+                </a:xfrm>
+                <a:prstGeom prst="rect">
+                  <a:avLst/>
+                </a:prstGeom>
+                <a:grpFill/>
+                <a:ln>
+                  <a:noFill/>
+                </a:ln>
+              </p:spPr>
+              <p:style>
+                <a:lnRef idx="2">
+                  <a:schemeClr val="accent1">
+                    <a:shade val="50000"/>
+                  </a:schemeClr>
+                </a:lnRef>
+                <a:fillRef idx="1">
+                  <a:schemeClr val="accent1"/>
+                </a:fillRef>
+                <a:effectRef idx="0">
+                  <a:schemeClr val="accent1"/>
+                </a:effectRef>
+                <a:fontRef idx="minor">
+                  <a:schemeClr val="lt1"/>
+                </a:fontRef>
+              </p:style>
+              <p:txBody>
+                <a:bodyPr rtlCol="0" anchor="ctr"/>
+                <a:lstStyle/>
+                <a:p>
+                  <a:pPr algn="ctr"/>
+                  <a:endParaRPr lang="de-DE"/>
+                </a:p>
+              </p:txBody>
+            </p:sp>
+          </p:grpSp>
+        </p:grpSp>
+        <p:grpSp>
+          <p:nvGrpSpPr>
+            <p:cNvPr id="46" name="Gruppieren 45">
+              <a:extLst>
+                <a:ext uri="{FF2B5EF4-FFF2-40B4-BE49-F238E27FC236}">
+                  <a16:creationId xmlns:a16="http://schemas.microsoft.com/office/drawing/2014/main" id="{D9048847-6AE1-75F0-6DE1-AEA54D13FE9F}"/>
+                </a:ext>
+              </a:extLst>
+            </p:cNvPr>
+            <p:cNvGrpSpPr/>
+            <p:nvPr/>
+          </p:nvGrpSpPr>
+          <p:grpSpPr>
+            <a:xfrm>
+              <a:off x="9163050" y="1633676"/>
+              <a:ext cx="1680931" cy="2028796"/>
+              <a:chOff x="2830412" y="2410854"/>
+              <a:chExt cx="1680931" cy="2028796"/>
+            </a:xfrm>
+          </p:grpSpPr>
+          <p:grpSp>
+            <p:nvGrpSpPr>
+              <p:cNvPr id="47" name="Gruppieren 46">
+                <a:extLst>
+                  <a:ext uri="{FF2B5EF4-FFF2-40B4-BE49-F238E27FC236}">
+                    <a16:creationId xmlns:a16="http://schemas.microsoft.com/office/drawing/2014/main" id="{14CD695A-E6F5-7746-5653-D3343B54AEB6}"/>
+                  </a:ext>
+                </a:extLst>
+              </p:cNvPr>
+              <p:cNvGrpSpPr/>
+              <p:nvPr/>
+            </p:nvGrpSpPr>
+            <p:grpSpPr>
+              <a:xfrm>
+                <a:off x="2835199" y="2410854"/>
+                <a:ext cx="1676144" cy="2028796"/>
+                <a:chOff x="1572639" y="2721713"/>
+                <a:chExt cx="2736000" cy="3311640"/>
+              </a:xfrm>
+            </p:grpSpPr>
+            <p:sp>
+              <p:nvSpPr>
+                <p:cNvPr id="49" name="Rechteck 48">
+                  <a:extLst>
+                    <a:ext uri="{FF2B5EF4-FFF2-40B4-BE49-F238E27FC236}">
+                      <a16:creationId xmlns:a16="http://schemas.microsoft.com/office/drawing/2014/main" id="{538089BB-95A7-6EA0-6B0B-92258A8C428A}"/>
+                    </a:ext>
+                  </a:extLst>
+                </p:cNvPr>
+                <p:cNvSpPr/>
+                <p:nvPr/>
+              </p:nvSpPr>
+              <p:spPr>
+                <a:xfrm>
+                  <a:off x="2256639" y="2721713"/>
+                  <a:ext cx="1368000" cy="3311640"/>
+                </a:xfrm>
+                <a:prstGeom prst="rect">
+                  <a:avLst/>
+                </a:prstGeom>
+                <a:solidFill>
+                  <a:schemeClr val="bg1"/>
+                </a:solidFill>
+                <a:ln>
+                  <a:noFill/>
+                </a:ln>
+              </p:spPr>
+              <p:style>
+                <a:lnRef idx="2">
+                  <a:schemeClr val="accent1">
+                    <a:shade val="50000"/>
+                  </a:schemeClr>
+                </a:lnRef>
+                <a:fillRef idx="1">
+                  <a:schemeClr val="accent1"/>
+                </a:fillRef>
+                <a:effectRef idx="0">
+                  <a:schemeClr val="accent1"/>
+                </a:effectRef>
+                <a:fontRef idx="minor">
+                  <a:schemeClr val="lt1"/>
+                </a:fontRef>
+              </p:style>
+              <p:txBody>
+                <a:bodyPr rtlCol="0" anchor="ctr"/>
+                <a:lstStyle/>
+                <a:p>
+                  <a:pPr algn="ctr"/>
+                  <a:endParaRPr lang="de-DE"/>
+                </a:p>
+              </p:txBody>
+            </p:sp>
+            <p:sp>
+              <p:nvSpPr>
+                <p:cNvPr id="50" name="Rechteck 49">
+                  <a:extLst>
+                    <a:ext uri="{FF2B5EF4-FFF2-40B4-BE49-F238E27FC236}">
+                      <a16:creationId xmlns:a16="http://schemas.microsoft.com/office/drawing/2014/main" id="{CB588F73-F241-3863-3B66-CE2CC67C4E65}"/>
+                    </a:ext>
+                  </a:extLst>
+                </p:cNvPr>
+                <p:cNvSpPr/>
+                <p:nvPr/>
+              </p:nvSpPr>
+              <p:spPr>
+                <a:xfrm>
+                  <a:off x="1572639" y="3257603"/>
+                  <a:ext cx="2736000" cy="2239861"/>
+                </a:xfrm>
+                <a:prstGeom prst="rect">
+                  <a:avLst/>
+                </a:prstGeom>
+                <a:solidFill>
+                  <a:schemeClr val="bg1"/>
+                </a:solidFill>
+                <a:ln>
+                  <a:noFill/>
+                </a:ln>
+              </p:spPr>
+              <p:style>
+                <a:lnRef idx="2">
+                  <a:schemeClr val="accent1">
+                    <a:shade val="50000"/>
+                  </a:schemeClr>
+                </a:lnRef>
+                <a:fillRef idx="1">
+                  <a:schemeClr val="accent1"/>
+                </a:fillRef>
+                <a:effectRef idx="0">
+                  <a:schemeClr val="accent1"/>
+                </a:effectRef>
+                <a:fontRef idx="minor">
+                  <a:schemeClr val="lt1"/>
+                </a:fontRef>
+              </p:style>
+              <p:txBody>
+                <a:bodyPr rtlCol="0" anchor="ctr"/>
+                <a:lstStyle/>
+                <a:p>
+                  <a:pPr algn="ctr"/>
+                  <a:endParaRPr lang="de-DE" dirty="0"/>
+                </a:p>
+              </p:txBody>
+            </p:sp>
+          </p:grpSp>
+          <p:sp>
+            <p:nvSpPr>
+              <p:cNvPr id="48" name="Rechteck 47">
+                <a:extLst>
+                  <a:ext uri="{FF2B5EF4-FFF2-40B4-BE49-F238E27FC236}">
+                    <a16:creationId xmlns:a16="http://schemas.microsoft.com/office/drawing/2014/main" id="{3BBCD46C-0661-27B6-B4B5-9646C190AFAB}"/>
+                  </a:ext>
+                </a:extLst>
+              </p:cNvPr>
+              <p:cNvSpPr/>
+              <p:nvPr/>
+            </p:nvSpPr>
+            <p:spPr>
+              <a:xfrm>
+                <a:off x="2830412" y="3325621"/>
+                <a:ext cx="841167" cy="785729"/>
+              </a:xfrm>
+              <a:prstGeom prst="rect">
+                <a:avLst/>
+              </a:prstGeom>
+              <a:solidFill>
+                <a:schemeClr val="tx1"/>
+              </a:solidFill>
+              <a:ln>
+                <a:noFill/>
+              </a:ln>
+            </p:spPr>
+            <p:style>
+              <a:lnRef idx="2">
+                <a:schemeClr val="accent1">
+                  <a:shade val="50000"/>
+                </a:schemeClr>
+              </a:lnRef>
+              <a:fillRef idx="1">
+                <a:schemeClr val="accent1"/>
+              </a:fillRef>
+              <a:effectRef idx="0">
+                <a:schemeClr val="accent1"/>
+              </a:effectRef>
+              <a:fontRef idx="minor">
+                <a:schemeClr val="lt1"/>
+              </a:fontRef>
+            </p:style>
+            <p:txBody>
+              <a:bodyPr rtlCol="0" anchor="ctr"/>
+              <a:lstStyle/>
+              <a:p>
+                <a:pPr algn="ctr"/>
+                <a:endParaRPr lang="de-DE"/>
+              </a:p>
+            </p:txBody>
+          </p:sp>
+        </p:grpSp>
+        <p:grpSp>
+          <p:nvGrpSpPr>
+            <p:cNvPr id="51" name="Gruppieren 50">
+              <a:extLst>
+                <a:ext uri="{FF2B5EF4-FFF2-40B4-BE49-F238E27FC236}">
+                  <a16:creationId xmlns:a16="http://schemas.microsoft.com/office/drawing/2014/main" id="{1FF35C7C-A5AE-1483-0769-51F9BB318AD3}"/>
+                </a:ext>
+              </a:extLst>
+            </p:cNvPr>
+            <p:cNvGrpSpPr/>
+            <p:nvPr/>
+          </p:nvGrpSpPr>
+          <p:grpSpPr>
+            <a:xfrm>
+              <a:off x="6650383" y="1637424"/>
+              <a:ext cx="1679383" cy="2028796"/>
+              <a:chOff x="317745" y="2414602"/>
+              <a:chExt cx="1679383" cy="2028796"/>
+            </a:xfrm>
+          </p:grpSpPr>
+          <p:grpSp>
+            <p:nvGrpSpPr>
+              <p:cNvPr id="52" name="Gruppieren 51">
+                <a:extLst>
+                  <a:ext uri="{FF2B5EF4-FFF2-40B4-BE49-F238E27FC236}">
+                    <a16:creationId xmlns:a16="http://schemas.microsoft.com/office/drawing/2014/main" id="{310EB28D-2964-80C6-D20B-9320A59E4A9C}"/>
+                  </a:ext>
+                </a:extLst>
+              </p:cNvPr>
+              <p:cNvGrpSpPr/>
+              <p:nvPr/>
+            </p:nvGrpSpPr>
+            <p:grpSpPr>
+              <a:xfrm>
+                <a:off x="320984" y="2414602"/>
+                <a:ext cx="1676144" cy="2028796"/>
+                <a:chOff x="1572639" y="2721713"/>
+                <a:chExt cx="2736000" cy="3311640"/>
+              </a:xfrm>
+            </p:grpSpPr>
+            <p:sp>
+              <p:nvSpPr>
+                <p:cNvPr id="54" name="Rechteck 53">
+                  <a:extLst>
+                    <a:ext uri="{FF2B5EF4-FFF2-40B4-BE49-F238E27FC236}">
+                      <a16:creationId xmlns:a16="http://schemas.microsoft.com/office/drawing/2014/main" id="{04DB612D-03A7-CBA1-FFD5-7434DDD486E0}"/>
+                    </a:ext>
+                  </a:extLst>
+                </p:cNvPr>
+                <p:cNvSpPr/>
+                <p:nvPr/>
+              </p:nvSpPr>
+              <p:spPr>
+                <a:xfrm>
+                  <a:off x="2256639" y="2721713"/>
+                  <a:ext cx="1368000" cy="3311640"/>
+                </a:xfrm>
+                <a:prstGeom prst="rect">
+                  <a:avLst/>
+                </a:prstGeom>
+                <a:solidFill>
+                  <a:schemeClr val="bg1"/>
+                </a:solidFill>
+                <a:ln>
+                  <a:noFill/>
+                </a:ln>
+              </p:spPr>
+              <p:style>
+                <a:lnRef idx="2">
+                  <a:schemeClr val="accent1">
+                    <a:shade val="50000"/>
+                  </a:schemeClr>
+                </a:lnRef>
+                <a:fillRef idx="1">
+                  <a:schemeClr val="accent1"/>
+                </a:fillRef>
+                <a:effectRef idx="0">
+                  <a:schemeClr val="accent1"/>
+                </a:effectRef>
+                <a:fontRef idx="minor">
+                  <a:schemeClr val="lt1"/>
+                </a:fontRef>
+              </p:style>
+              <p:txBody>
+                <a:bodyPr rtlCol="0" anchor="ctr"/>
+                <a:lstStyle/>
+                <a:p>
+                  <a:pPr algn="ctr"/>
+                  <a:endParaRPr lang="de-DE"/>
+                </a:p>
+              </p:txBody>
+            </p:sp>
+            <p:sp>
+              <p:nvSpPr>
+                <p:cNvPr id="55" name="Rechteck 54">
+                  <a:extLst>
+                    <a:ext uri="{FF2B5EF4-FFF2-40B4-BE49-F238E27FC236}">
+                      <a16:creationId xmlns:a16="http://schemas.microsoft.com/office/drawing/2014/main" id="{DAF874EB-D9EE-D1CC-1E9A-0762A8313836}"/>
+                    </a:ext>
+                  </a:extLst>
+                </p:cNvPr>
+                <p:cNvSpPr/>
+                <p:nvPr/>
+              </p:nvSpPr>
+              <p:spPr>
+                <a:xfrm>
+                  <a:off x="1572639" y="3257603"/>
+                  <a:ext cx="2736000" cy="2239861"/>
+                </a:xfrm>
+                <a:prstGeom prst="rect">
+                  <a:avLst/>
+                </a:prstGeom>
+                <a:solidFill>
+                  <a:schemeClr val="bg1"/>
+                </a:solidFill>
+                <a:ln>
+                  <a:noFill/>
+                </a:ln>
+              </p:spPr>
+              <p:style>
+                <a:lnRef idx="2">
+                  <a:schemeClr val="accent1">
+                    <a:shade val="50000"/>
+                  </a:schemeClr>
+                </a:lnRef>
+                <a:fillRef idx="1">
+                  <a:schemeClr val="accent1"/>
+                </a:fillRef>
+                <a:effectRef idx="0">
+                  <a:schemeClr val="accent1"/>
+                </a:effectRef>
+                <a:fontRef idx="minor">
+                  <a:schemeClr val="lt1"/>
+                </a:fontRef>
+              </p:style>
+              <p:txBody>
+                <a:bodyPr rtlCol="0" anchor="ctr"/>
+                <a:lstStyle/>
+                <a:p>
+                  <a:pPr algn="ctr"/>
+                  <a:endParaRPr lang="de-DE"/>
+                </a:p>
+              </p:txBody>
+            </p:sp>
+          </p:grpSp>
+          <p:sp>
+            <p:nvSpPr>
+              <p:cNvPr id="53" name="Rechteck 52">
+                <a:extLst>
+                  <a:ext uri="{FF2B5EF4-FFF2-40B4-BE49-F238E27FC236}">
+                    <a16:creationId xmlns:a16="http://schemas.microsoft.com/office/drawing/2014/main" id="{6F8DF7BB-515A-068C-85D6-9F5DCF702542}"/>
+                  </a:ext>
+                </a:extLst>
+              </p:cNvPr>
+              <p:cNvSpPr/>
+              <p:nvPr/>
+            </p:nvSpPr>
+            <p:spPr>
+              <a:xfrm>
+                <a:off x="317745" y="3334951"/>
+                <a:ext cx="841167" cy="785729"/>
+              </a:xfrm>
+              <a:prstGeom prst="rect">
+                <a:avLst/>
+              </a:prstGeom>
+              <a:solidFill>
+                <a:schemeClr val="tx1"/>
+              </a:solidFill>
+              <a:ln>
+                <a:noFill/>
+              </a:ln>
+            </p:spPr>
+            <p:style>
+              <a:lnRef idx="2">
+                <a:schemeClr val="accent1">
+                  <a:shade val="50000"/>
+                </a:schemeClr>
+              </a:lnRef>
+              <a:fillRef idx="1">
+                <a:schemeClr val="accent1"/>
+              </a:fillRef>
+              <a:effectRef idx="0">
+                <a:schemeClr val="accent1"/>
+              </a:effectRef>
+              <a:fontRef idx="minor">
+                <a:schemeClr val="lt1"/>
+              </a:fontRef>
+            </p:style>
+            <p:txBody>
+              <a:bodyPr rtlCol="0" anchor="ctr"/>
+              <a:lstStyle/>
+              <a:p>
+                <a:pPr algn="ctr"/>
+                <a:endParaRPr lang="de-DE"/>
+              </a:p>
+            </p:txBody>
+          </p:sp>
+        </p:grpSp>
+      </p:grpSp>
+    </p:spTree>
+    <p:extLst>
+      <p:ext uri="{BB962C8B-B14F-4D97-AF65-F5344CB8AC3E}">
+        <p14:creationId xmlns:p14="http://schemas.microsoft.com/office/powerpoint/2010/main" val="4073629313"/>
+      </p:ext>
+    </p:extLst>
+  </p:cSld>
+  <p:clrMapOvr>
+    <a:masterClrMapping/>
+  </p:clrMapOvr>
+</p:sld>
+</file>
+
+<file path=ppt/slides/slide13.xml><?xml version="1.0" encoding="utf-8"?>
+<p:sld xmlns:a="http://schemas.openxmlformats.org/drawingml/2006/main" xmlns:r="http://schemas.openxmlformats.org/officeDocument/2006/relationships" xmlns:p="http://schemas.openxmlformats.org/presentationml/2006/main">
+  <p:cSld>
+    <p:spTree>
+      <p:nvGrpSpPr>
+        <p:cNvPr id="1" name=""/>
+        <p:cNvGrpSpPr/>
+        <p:nvPr/>
+      </p:nvGrpSpPr>
+      <p:grpSpPr>
+        <a:xfrm>
+          <a:off x="0" y="0"/>
+          <a:ext cx="0" cy="0"/>
+          <a:chOff x="0" y="0"/>
+          <a:chExt cx="0" cy="0"/>
+        </a:xfrm>
+      </p:grpSpPr>
+      <p:grpSp>
+        <p:nvGrpSpPr>
+          <p:cNvPr id="56" name="Gruppieren 55">
+            <a:extLst>
+              <a:ext uri="{FF2B5EF4-FFF2-40B4-BE49-F238E27FC236}">
+                <a16:creationId xmlns:a16="http://schemas.microsoft.com/office/drawing/2014/main" id="{41CD6C17-14B0-2B2D-5657-6F6DB4758AC7}"/>
+              </a:ext>
+            </a:extLst>
+          </p:cNvPr>
+          <p:cNvGrpSpPr/>
+          <p:nvPr/>
+        </p:nvGrpSpPr>
+        <p:grpSpPr>
+          <a:xfrm>
+            <a:off x="95757" y="671115"/>
+            <a:ext cx="5866503" cy="5168921"/>
+            <a:chOff x="95757" y="671115"/>
+            <a:chExt cx="5866503" cy="5168921"/>
+          </a:xfrm>
+        </p:grpSpPr>
+        <p:grpSp>
+          <p:nvGrpSpPr>
+            <p:cNvPr id="4" name="Gruppieren 3">
+              <a:extLst>
+                <a:ext uri="{FF2B5EF4-FFF2-40B4-BE49-F238E27FC236}">
+                  <a16:creationId xmlns:a16="http://schemas.microsoft.com/office/drawing/2014/main" id="{8D68697C-E041-DA6B-36E2-992157F242A2}"/>
+                </a:ext>
+              </a:extLst>
+            </p:cNvPr>
+            <p:cNvGrpSpPr/>
+            <p:nvPr/>
+          </p:nvGrpSpPr>
+          <p:grpSpPr>
+            <a:xfrm>
+              <a:off x="95757" y="671115"/>
+              <a:ext cx="5866503" cy="5168921"/>
+              <a:chOff x="1784598" y="801743"/>
+              <a:chExt cx="5866503" cy="5168921"/>
+            </a:xfrm>
+            <a:noFill/>
+          </p:grpSpPr>
+          <p:grpSp>
+            <p:nvGrpSpPr>
+              <p:cNvPr id="5" name="Gruppieren 4">
+                <a:extLst>
+                  <a:ext uri="{FF2B5EF4-FFF2-40B4-BE49-F238E27FC236}">
+                    <a16:creationId xmlns:a16="http://schemas.microsoft.com/office/drawing/2014/main" id="{D84E13A2-A94A-3A16-43AD-A44ED674A247}"/>
+                  </a:ext>
+                </a:extLst>
+              </p:cNvPr>
+              <p:cNvGrpSpPr/>
+              <p:nvPr/>
+            </p:nvGrpSpPr>
+            <p:grpSpPr>
+              <a:xfrm>
+                <a:off x="1784598" y="5300696"/>
+                <a:ext cx="1676144" cy="669968"/>
+                <a:chOff x="1134631" y="4456166"/>
+                <a:chExt cx="2160000" cy="936000"/>
+              </a:xfrm>
+              <a:grpFill/>
+            </p:grpSpPr>
+            <p:sp>
+              <p:nvSpPr>
+                <p:cNvPr id="18" name="Rechteck 17">
+                  <a:extLst>
+                    <a:ext uri="{FF2B5EF4-FFF2-40B4-BE49-F238E27FC236}">
+                      <a16:creationId xmlns:a16="http://schemas.microsoft.com/office/drawing/2014/main" id="{13C14738-987A-2991-0D13-67F3F461A57F}"/>
+                    </a:ext>
+                  </a:extLst>
+                </p:cNvPr>
+                <p:cNvSpPr/>
+                <p:nvPr/>
+              </p:nvSpPr>
+              <p:spPr>
+                <a:xfrm>
+                  <a:off x="1674631" y="4924166"/>
+                  <a:ext cx="1080000" cy="468000"/>
+                </a:xfrm>
+                <a:prstGeom prst="rect">
+                  <a:avLst/>
+                </a:prstGeom>
+                <a:grpFill/>
+                <a:ln>
+                  <a:noFill/>
+                </a:ln>
+              </p:spPr>
+              <p:style>
+                <a:lnRef idx="2">
+                  <a:schemeClr val="accent1">
+                    <a:shade val="50000"/>
+                  </a:schemeClr>
+                </a:lnRef>
+                <a:fillRef idx="1">
+                  <a:schemeClr val="accent1"/>
+                </a:fillRef>
+                <a:effectRef idx="0">
+                  <a:schemeClr val="accent1"/>
+                </a:effectRef>
+                <a:fontRef idx="minor">
+                  <a:schemeClr val="lt1"/>
+                </a:fontRef>
+              </p:style>
+              <p:txBody>
+                <a:bodyPr rtlCol="0" anchor="ctr"/>
+                <a:lstStyle/>
+                <a:p>
+                  <a:pPr algn="ctr"/>
+                  <a:endParaRPr lang="de-DE"/>
+                </a:p>
+              </p:txBody>
+            </p:sp>
+            <p:sp>
+              <p:nvSpPr>
+                <p:cNvPr id="19" name="Rechteck 18">
+                  <a:extLst>
+                    <a:ext uri="{FF2B5EF4-FFF2-40B4-BE49-F238E27FC236}">
+                      <a16:creationId xmlns:a16="http://schemas.microsoft.com/office/drawing/2014/main" id="{10BEA748-AD6D-AEE4-81F4-3A6A40E7DF8D}"/>
+                    </a:ext>
+                  </a:extLst>
+                </p:cNvPr>
+                <p:cNvSpPr/>
+                <p:nvPr/>
+              </p:nvSpPr>
+              <p:spPr>
+                <a:xfrm>
+                  <a:off x="1134631" y="4456166"/>
+                  <a:ext cx="2160000" cy="468000"/>
+                </a:xfrm>
+                <a:prstGeom prst="rect">
+                  <a:avLst/>
+                </a:prstGeom>
+                <a:grpFill/>
+                <a:ln>
+                  <a:noFill/>
+                </a:ln>
+              </p:spPr>
+              <p:style>
+                <a:lnRef idx="2">
+                  <a:schemeClr val="accent1">
+                    <a:shade val="50000"/>
+                  </a:schemeClr>
+                </a:lnRef>
+                <a:fillRef idx="1">
+                  <a:schemeClr val="accent1"/>
+                </a:fillRef>
+                <a:effectRef idx="0">
+                  <a:schemeClr val="accent1"/>
+                </a:effectRef>
+                <a:fontRef idx="minor">
+                  <a:schemeClr val="lt1"/>
+                </a:fontRef>
+              </p:style>
+              <p:txBody>
+                <a:bodyPr rtlCol="0" anchor="ctr"/>
+                <a:lstStyle/>
+                <a:p>
+                  <a:pPr algn="ctr"/>
+                  <a:endParaRPr lang="de-DE" dirty="0"/>
+                </a:p>
+              </p:txBody>
+            </p:sp>
+          </p:grpSp>
+          <p:grpSp>
+            <p:nvGrpSpPr>
+              <p:cNvPr id="6" name="Gruppieren 5">
+                <a:extLst>
+                  <a:ext uri="{FF2B5EF4-FFF2-40B4-BE49-F238E27FC236}">
+                    <a16:creationId xmlns:a16="http://schemas.microsoft.com/office/drawing/2014/main" id="{65A2928B-765E-B7EE-8DED-9E110F61106A}"/>
+                  </a:ext>
+                </a:extLst>
+              </p:cNvPr>
+              <p:cNvGrpSpPr/>
+              <p:nvPr/>
+            </p:nvGrpSpPr>
+            <p:grpSpPr>
+              <a:xfrm>
+                <a:off x="3879778" y="5300696"/>
+                <a:ext cx="1676144" cy="669968"/>
+                <a:chOff x="1134631" y="4456166"/>
+                <a:chExt cx="2160000" cy="936000"/>
+              </a:xfrm>
+              <a:grpFill/>
+            </p:grpSpPr>
+            <p:sp>
+              <p:nvSpPr>
+                <p:cNvPr id="16" name="Rechteck 15">
+                  <a:extLst>
+                    <a:ext uri="{FF2B5EF4-FFF2-40B4-BE49-F238E27FC236}">
+                      <a16:creationId xmlns:a16="http://schemas.microsoft.com/office/drawing/2014/main" id="{B68ED488-3BF0-EF37-1CCF-A9B6D0EB18A2}"/>
+                    </a:ext>
+                  </a:extLst>
+                </p:cNvPr>
+                <p:cNvSpPr/>
+                <p:nvPr/>
+              </p:nvSpPr>
+              <p:spPr>
+                <a:xfrm>
+                  <a:off x="1674631" y="4924166"/>
+                  <a:ext cx="1080000" cy="468000"/>
+                </a:xfrm>
+                <a:prstGeom prst="rect">
+                  <a:avLst/>
+                </a:prstGeom>
+                <a:grpFill/>
+                <a:ln>
+                  <a:noFill/>
+                </a:ln>
+              </p:spPr>
+              <p:style>
+                <a:lnRef idx="2">
+                  <a:schemeClr val="accent1">
+                    <a:shade val="50000"/>
+                  </a:schemeClr>
+                </a:lnRef>
+                <a:fillRef idx="1">
+                  <a:schemeClr val="accent1"/>
+                </a:fillRef>
+                <a:effectRef idx="0">
+                  <a:schemeClr val="accent1"/>
+                </a:effectRef>
+                <a:fontRef idx="minor">
+                  <a:schemeClr val="lt1"/>
+                </a:fontRef>
+              </p:style>
+              <p:txBody>
+                <a:bodyPr rtlCol="0" anchor="ctr"/>
+                <a:lstStyle/>
+                <a:p>
+                  <a:pPr algn="ctr"/>
+                  <a:endParaRPr lang="de-DE"/>
+                </a:p>
+              </p:txBody>
+            </p:sp>
+            <p:sp>
+              <p:nvSpPr>
+                <p:cNvPr id="17" name="Rechteck 16">
+                  <a:extLst>
+                    <a:ext uri="{FF2B5EF4-FFF2-40B4-BE49-F238E27FC236}">
+                      <a16:creationId xmlns:a16="http://schemas.microsoft.com/office/drawing/2014/main" id="{34C0BFF1-B1AE-72E7-E9C8-015F44B4BBD9}"/>
+                    </a:ext>
+                  </a:extLst>
+                </p:cNvPr>
+                <p:cNvSpPr/>
+                <p:nvPr/>
+              </p:nvSpPr>
+              <p:spPr>
+                <a:xfrm>
+                  <a:off x="1134631" y="4456166"/>
+                  <a:ext cx="2160000" cy="468000"/>
+                </a:xfrm>
+                <a:prstGeom prst="rect">
+                  <a:avLst/>
+                </a:prstGeom>
+                <a:grpFill/>
+                <a:ln>
+                  <a:noFill/>
+                </a:ln>
+              </p:spPr>
+              <p:style>
+                <a:lnRef idx="2">
+                  <a:schemeClr val="accent1">
+                    <a:shade val="50000"/>
+                  </a:schemeClr>
+                </a:lnRef>
+                <a:fillRef idx="1">
+                  <a:schemeClr val="accent1"/>
+                </a:fillRef>
+                <a:effectRef idx="0">
+                  <a:schemeClr val="accent1"/>
+                </a:effectRef>
+                <a:fontRef idx="minor">
+                  <a:schemeClr val="lt1"/>
+                </a:fontRef>
+              </p:style>
+              <p:txBody>
+                <a:bodyPr rtlCol="0" anchor="ctr"/>
+                <a:lstStyle/>
+                <a:p>
+                  <a:pPr algn="ctr"/>
+                  <a:endParaRPr lang="de-DE"/>
+                </a:p>
+              </p:txBody>
+            </p:sp>
+          </p:grpSp>
+          <p:grpSp>
+            <p:nvGrpSpPr>
+              <p:cNvPr id="7" name="Gruppieren 6">
+                <a:extLst>
+                  <a:ext uri="{FF2B5EF4-FFF2-40B4-BE49-F238E27FC236}">
+                    <a16:creationId xmlns:a16="http://schemas.microsoft.com/office/drawing/2014/main" id="{12C2AFD6-35DC-A401-E443-000D6DF92EEA}"/>
+                  </a:ext>
+                </a:extLst>
+              </p:cNvPr>
+              <p:cNvGrpSpPr/>
+              <p:nvPr/>
+            </p:nvGrpSpPr>
+            <p:grpSpPr>
+              <a:xfrm>
+                <a:off x="5974957" y="5300696"/>
+                <a:ext cx="1676144" cy="669968"/>
+                <a:chOff x="1134631" y="4456166"/>
+                <a:chExt cx="2160000" cy="936000"/>
+              </a:xfrm>
+              <a:grpFill/>
+            </p:grpSpPr>
+            <p:sp>
+              <p:nvSpPr>
+                <p:cNvPr id="14" name="Rechteck 13">
+                  <a:extLst>
+                    <a:ext uri="{FF2B5EF4-FFF2-40B4-BE49-F238E27FC236}">
+                      <a16:creationId xmlns:a16="http://schemas.microsoft.com/office/drawing/2014/main" id="{C9F96CB5-3A00-B3A2-0421-B6AC62286AC5}"/>
+                    </a:ext>
+                  </a:extLst>
+                </p:cNvPr>
+                <p:cNvSpPr/>
+                <p:nvPr/>
+              </p:nvSpPr>
+              <p:spPr>
+                <a:xfrm>
+                  <a:off x="1674631" y="4924166"/>
+                  <a:ext cx="1080000" cy="468000"/>
+                </a:xfrm>
+                <a:prstGeom prst="rect">
+                  <a:avLst/>
+                </a:prstGeom>
+                <a:grpFill/>
+                <a:ln>
+                  <a:noFill/>
+                </a:ln>
+              </p:spPr>
+              <p:style>
+                <a:lnRef idx="2">
+                  <a:schemeClr val="accent1">
+                    <a:shade val="50000"/>
+                  </a:schemeClr>
+                </a:lnRef>
+                <a:fillRef idx="1">
+                  <a:schemeClr val="accent1"/>
+                </a:fillRef>
+                <a:effectRef idx="0">
+                  <a:schemeClr val="accent1"/>
+                </a:effectRef>
+                <a:fontRef idx="minor">
+                  <a:schemeClr val="lt1"/>
+                </a:fontRef>
+              </p:style>
+              <p:txBody>
+                <a:bodyPr rtlCol="0" anchor="ctr"/>
+                <a:lstStyle/>
+                <a:p>
+                  <a:pPr algn="ctr"/>
+                  <a:endParaRPr lang="de-DE"/>
+                </a:p>
+              </p:txBody>
+            </p:sp>
+            <p:sp>
+              <p:nvSpPr>
+                <p:cNvPr id="15" name="Rechteck 14">
+                  <a:extLst>
+                    <a:ext uri="{FF2B5EF4-FFF2-40B4-BE49-F238E27FC236}">
+                      <a16:creationId xmlns:a16="http://schemas.microsoft.com/office/drawing/2014/main" id="{80C9E981-8D54-A936-7AA0-6D009AE51494}"/>
+                    </a:ext>
+                  </a:extLst>
+                </p:cNvPr>
+                <p:cNvSpPr/>
+                <p:nvPr/>
+              </p:nvSpPr>
+              <p:spPr>
+                <a:xfrm>
+                  <a:off x="1134631" y="4456166"/>
+                  <a:ext cx="2160000" cy="468000"/>
+                </a:xfrm>
+                <a:prstGeom prst="rect">
+                  <a:avLst/>
+                </a:prstGeom>
+                <a:grpFill/>
+                <a:ln>
+                  <a:noFill/>
+                </a:ln>
+              </p:spPr>
+              <p:style>
+                <a:lnRef idx="2">
+                  <a:schemeClr val="accent1">
+                    <a:shade val="50000"/>
+                  </a:schemeClr>
+                </a:lnRef>
+                <a:fillRef idx="1">
+                  <a:schemeClr val="accent1"/>
+                </a:fillRef>
+                <a:effectRef idx="0">
+                  <a:schemeClr val="accent1"/>
+                </a:effectRef>
+                <a:fontRef idx="minor">
+                  <a:schemeClr val="lt1"/>
+                </a:fontRef>
+              </p:style>
+              <p:txBody>
+                <a:bodyPr rtlCol="0" anchor="ctr"/>
+                <a:lstStyle/>
+                <a:p>
+                  <a:pPr algn="ctr"/>
+                  <a:endParaRPr lang="de-DE"/>
+                </a:p>
+              </p:txBody>
+            </p:sp>
+          </p:grpSp>
+          <p:sp>
+            <p:nvSpPr>
+              <p:cNvPr id="8" name="Rechteck 7">
+                <a:extLst>
+                  <a:ext uri="{FF2B5EF4-FFF2-40B4-BE49-F238E27FC236}">
+                    <a16:creationId xmlns:a16="http://schemas.microsoft.com/office/drawing/2014/main" id="{16870CE1-4CD6-12C7-EAF4-A2655C542A72}"/>
+                  </a:ext>
+                </a:extLst>
+              </p:cNvPr>
+              <p:cNvSpPr/>
+              <p:nvPr/>
+            </p:nvSpPr>
+            <p:spPr>
+              <a:xfrm>
+                <a:off x="1784598" y="3273155"/>
+                <a:ext cx="5866503" cy="2027541"/>
+              </a:xfrm>
+              <a:prstGeom prst="rect">
+                <a:avLst/>
+              </a:prstGeom>
+              <a:grpFill/>
+              <a:ln>
+                <a:noFill/>
+              </a:ln>
+            </p:spPr>
+            <p:style>
+              <a:lnRef idx="2">
+                <a:schemeClr val="accent1">
+                  <a:shade val="50000"/>
+                </a:schemeClr>
+              </a:lnRef>
+              <a:fillRef idx="1">
+                <a:schemeClr val="accent1"/>
+              </a:fillRef>
+              <a:effectRef idx="0">
+                <a:schemeClr val="accent1"/>
+              </a:effectRef>
+              <a:fontRef idx="minor">
+                <a:schemeClr val="lt1"/>
+              </a:fontRef>
+            </p:style>
+            <p:txBody>
+              <a:bodyPr rtlCol="0" anchor="ctr"/>
+              <a:lstStyle/>
+              <a:p>
+                <a:pPr algn="ctr"/>
+                <a:endParaRPr lang="de-DE"/>
+              </a:p>
+            </p:txBody>
+          </p:sp>
+          <p:grpSp>
+            <p:nvGrpSpPr>
+              <p:cNvPr id="9" name="Gruppieren 8">
+                <a:extLst>
+                  <a:ext uri="{FF2B5EF4-FFF2-40B4-BE49-F238E27FC236}">
+                    <a16:creationId xmlns:a16="http://schemas.microsoft.com/office/drawing/2014/main" id="{0EA9E7FB-36BE-DC92-744F-37422C3BF3B6}"/>
+                  </a:ext>
+                </a:extLst>
+              </p:cNvPr>
+              <p:cNvGrpSpPr/>
+              <p:nvPr/>
+            </p:nvGrpSpPr>
+            <p:grpSpPr>
+              <a:xfrm>
+                <a:off x="2203634" y="801743"/>
+                <a:ext cx="5028431" cy="3334286"/>
+                <a:chOff x="1421478" y="183857"/>
+                <a:chExt cx="7025127" cy="4658268"/>
+              </a:xfrm>
+              <a:grpFill/>
+            </p:grpSpPr>
+            <p:sp>
+              <p:nvSpPr>
+                <p:cNvPr id="10" name="Rechteck 9">
+                  <a:extLst>
+                    <a:ext uri="{FF2B5EF4-FFF2-40B4-BE49-F238E27FC236}">
+                      <a16:creationId xmlns:a16="http://schemas.microsoft.com/office/drawing/2014/main" id="{6F8D8D9D-8147-59EF-A38B-26C75B4A3451}"/>
+                    </a:ext>
+                  </a:extLst>
+                </p:cNvPr>
+                <p:cNvSpPr/>
+                <p:nvPr/>
+              </p:nvSpPr>
+              <p:spPr>
+                <a:xfrm>
+                  <a:off x="1421478" y="2009485"/>
+                  <a:ext cx="7025127" cy="2832640"/>
+                </a:xfrm>
+                <a:prstGeom prst="rect">
+                  <a:avLst/>
+                </a:prstGeom>
+                <a:grpFill/>
+                <a:ln>
+                  <a:noFill/>
+                </a:ln>
+              </p:spPr>
+              <p:style>
+                <a:lnRef idx="2">
+                  <a:schemeClr val="accent1">
+                    <a:shade val="50000"/>
+                  </a:schemeClr>
+                </a:lnRef>
+                <a:fillRef idx="1">
+                  <a:schemeClr val="accent1"/>
+                </a:fillRef>
+                <a:effectRef idx="0">
+                  <a:schemeClr val="accent1"/>
+                </a:effectRef>
+                <a:fontRef idx="minor">
+                  <a:schemeClr val="lt1"/>
+                </a:fontRef>
+              </p:style>
+              <p:txBody>
+                <a:bodyPr rtlCol="0" anchor="ctr"/>
+                <a:lstStyle/>
+                <a:p>
+                  <a:pPr algn="ctr"/>
+                  <a:endParaRPr lang="de-DE"/>
+                </a:p>
+              </p:txBody>
+            </p:sp>
+            <p:sp>
+              <p:nvSpPr>
+                <p:cNvPr id="11" name="Rechteck 10">
+                  <a:extLst>
+                    <a:ext uri="{FF2B5EF4-FFF2-40B4-BE49-F238E27FC236}">
+                      <a16:creationId xmlns:a16="http://schemas.microsoft.com/office/drawing/2014/main" id="{2C33C986-D7CF-2A97-3971-9111ABCE7348}"/>
+                    </a:ext>
+                  </a:extLst>
+                </p:cNvPr>
+                <p:cNvSpPr/>
+                <p:nvPr/>
+              </p:nvSpPr>
+              <p:spPr>
+                <a:xfrm>
+                  <a:off x="2006905" y="1384042"/>
+                  <a:ext cx="5853348" cy="2832640"/>
+                </a:xfrm>
+                <a:prstGeom prst="rect">
+                  <a:avLst/>
+                </a:prstGeom>
+                <a:grpFill/>
+                <a:ln>
+                  <a:noFill/>
+                </a:ln>
+              </p:spPr>
+              <p:style>
+                <a:lnRef idx="2">
+                  <a:schemeClr val="accent1">
+                    <a:shade val="50000"/>
+                  </a:schemeClr>
+                </a:lnRef>
+                <a:fillRef idx="1">
+                  <a:schemeClr val="accent1"/>
+                </a:fillRef>
+                <a:effectRef idx="0">
+                  <a:schemeClr val="accent1"/>
+                </a:effectRef>
+                <a:fontRef idx="minor">
+                  <a:schemeClr val="lt1"/>
+                </a:fontRef>
+              </p:style>
+              <p:txBody>
+                <a:bodyPr rtlCol="0" anchor="ctr"/>
+                <a:lstStyle/>
+                <a:p>
+                  <a:pPr algn="ctr"/>
+                  <a:endParaRPr lang="de-DE"/>
+                </a:p>
+              </p:txBody>
+            </p:sp>
+            <p:sp>
+              <p:nvSpPr>
+                <p:cNvPr id="12" name="Rechteck 11">
+                  <a:extLst>
+                    <a:ext uri="{FF2B5EF4-FFF2-40B4-BE49-F238E27FC236}">
+                      <a16:creationId xmlns:a16="http://schemas.microsoft.com/office/drawing/2014/main" id="{1FB45AAE-45A4-D37B-F034-F4B435FCCEAA}"/>
+                    </a:ext>
+                  </a:extLst>
+                </p:cNvPr>
+                <p:cNvSpPr/>
+                <p:nvPr/>
+              </p:nvSpPr>
+              <p:spPr>
+                <a:xfrm>
+                  <a:off x="2592333" y="827165"/>
+                  <a:ext cx="4683418" cy="2832640"/>
+                </a:xfrm>
+                <a:prstGeom prst="rect">
+                  <a:avLst/>
+                </a:prstGeom>
+                <a:grpFill/>
+                <a:ln>
+                  <a:noFill/>
+                </a:ln>
+              </p:spPr>
+              <p:style>
+                <a:lnRef idx="2">
+                  <a:schemeClr val="accent1">
+                    <a:shade val="50000"/>
+                  </a:schemeClr>
+                </a:lnRef>
+                <a:fillRef idx="1">
+                  <a:schemeClr val="accent1"/>
+                </a:fillRef>
+                <a:effectRef idx="0">
+                  <a:schemeClr val="accent1"/>
+                </a:effectRef>
+                <a:fontRef idx="minor">
+                  <a:schemeClr val="lt1"/>
+                </a:fontRef>
+              </p:style>
+              <p:txBody>
+                <a:bodyPr rtlCol="0" anchor="ctr"/>
+                <a:lstStyle/>
+                <a:p>
+                  <a:pPr algn="ctr"/>
+                  <a:endParaRPr lang="de-DE"/>
+                </a:p>
+              </p:txBody>
+            </p:sp>
+            <p:sp>
+              <p:nvSpPr>
+                <p:cNvPr id="13" name="Rechteck 12">
+                  <a:extLst>
+                    <a:ext uri="{FF2B5EF4-FFF2-40B4-BE49-F238E27FC236}">
+                      <a16:creationId xmlns:a16="http://schemas.microsoft.com/office/drawing/2014/main" id="{A0A5397E-11AC-7334-0363-7AFED3984FD6}"/>
+                    </a:ext>
+                  </a:extLst>
+                </p:cNvPr>
+                <p:cNvSpPr/>
+                <p:nvPr/>
+              </p:nvSpPr>
+              <p:spPr>
+                <a:xfrm>
+                  <a:off x="3763187" y="183857"/>
+                  <a:ext cx="2341709" cy="2832640"/>
+                </a:xfrm>
+                <a:prstGeom prst="rect">
+                  <a:avLst/>
+                </a:prstGeom>
+                <a:grpFill/>
+                <a:ln>
+                  <a:noFill/>
+                </a:ln>
+              </p:spPr>
+              <p:style>
+                <a:lnRef idx="2">
+                  <a:schemeClr val="accent1">
+                    <a:shade val="50000"/>
+                  </a:schemeClr>
+                </a:lnRef>
+                <a:fillRef idx="1">
+                  <a:schemeClr val="accent1"/>
+                </a:fillRef>
+                <a:effectRef idx="0">
+                  <a:schemeClr val="accent1"/>
+                </a:effectRef>
+                <a:fontRef idx="minor">
+                  <a:schemeClr val="lt1"/>
+                </a:fontRef>
+              </p:style>
+              <p:txBody>
+                <a:bodyPr rtlCol="0" anchor="ctr"/>
+                <a:lstStyle/>
+                <a:p>
+                  <a:pPr algn="ctr"/>
+                  <a:endParaRPr lang="de-DE"/>
+                </a:p>
+              </p:txBody>
+            </p:sp>
+          </p:grpSp>
+        </p:grpSp>
+        <p:grpSp>
+          <p:nvGrpSpPr>
+            <p:cNvPr id="36" name="Gruppieren 35">
+              <a:extLst>
+                <a:ext uri="{FF2B5EF4-FFF2-40B4-BE49-F238E27FC236}">
+                  <a16:creationId xmlns:a16="http://schemas.microsoft.com/office/drawing/2014/main" id="{E69E87D8-2F8C-304B-5624-BF9C2F6CA706}"/>
+                </a:ext>
+              </a:extLst>
+            </p:cNvPr>
+            <p:cNvGrpSpPr/>
+            <p:nvPr/>
+          </p:nvGrpSpPr>
+          <p:grpSpPr>
+            <a:xfrm>
+              <a:off x="3448044" y="1128902"/>
+              <a:ext cx="1676144" cy="2028796"/>
+              <a:chOff x="7863629" y="2403242"/>
+              <a:chExt cx="1676144" cy="2028796"/>
+            </a:xfrm>
+          </p:grpSpPr>
+          <p:grpSp>
+            <p:nvGrpSpPr>
+              <p:cNvPr id="37" name="Gruppieren 36">
+                <a:extLst>
+                  <a:ext uri="{FF2B5EF4-FFF2-40B4-BE49-F238E27FC236}">
+                    <a16:creationId xmlns:a16="http://schemas.microsoft.com/office/drawing/2014/main" id="{5540FAE8-5C70-5996-7B3A-7F249F76A32B}"/>
+                  </a:ext>
+                </a:extLst>
+              </p:cNvPr>
+              <p:cNvGrpSpPr/>
+              <p:nvPr/>
+            </p:nvGrpSpPr>
+            <p:grpSpPr>
+              <a:xfrm>
+                <a:off x="7863629" y="2403242"/>
+                <a:ext cx="1676144" cy="2028796"/>
+                <a:chOff x="1572639" y="2721713"/>
+                <a:chExt cx="2736000" cy="3311640"/>
+              </a:xfrm>
+            </p:grpSpPr>
+            <p:sp>
+              <p:nvSpPr>
+                <p:cNvPr id="39" name="Rechteck 38">
+                  <a:extLst>
+                    <a:ext uri="{FF2B5EF4-FFF2-40B4-BE49-F238E27FC236}">
+                      <a16:creationId xmlns:a16="http://schemas.microsoft.com/office/drawing/2014/main" id="{6B0F2DD0-BB0C-BE88-39DF-3F71960FDDD2}"/>
+                    </a:ext>
+                  </a:extLst>
+                </p:cNvPr>
+                <p:cNvSpPr/>
+                <p:nvPr/>
+              </p:nvSpPr>
+              <p:spPr>
+                <a:xfrm>
+                  <a:off x="2256639" y="2721713"/>
+                  <a:ext cx="1368000" cy="3311640"/>
+                </a:xfrm>
+                <a:prstGeom prst="rect">
+                  <a:avLst/>
+                </a:prstGeom>
+                <a:solidFill>
+                  <a:schemeClr val="bg1"/>
+                </a:solidFill>
+                <a:ln>
+                  <a:noFill/>
+                </a:ln>
+              </p:spPr>
+              <p:style>
+                <a:lnRef idx="2">
+                  <a:schemeClr val="accent1">
+                    <a:shade val="50000"/>
+                  </a:schemeClr>
+                </a:lnRef>
+                <a:fillRef idx="1">
+                  <a:schemeClr val="accent1"/>
+                </a:fillRef>
+                <a:effectRef idx="0">
+                  <a:schemeClr val="accent1"/>
+                </a:effectRef>
+                <a:fontRef idx="minor">
+                  <a:schemeClr val="lt1"/>
+                </a:fontRef>
+              </p:style>
+              <p:txBody>
+                <a:bodyPr rtlCol="0" anchor="ctr"/>
+                <a:lstStyle/>
+                <a:p>
+                  <a:pPr algn="ctr"/>
+                  <a:endParaRPr lang="de-DE"/>
+                </a:p>
+              </p:txBody>
+            </p:sp>
+            <p:sp>
+              <p:nvSpPr>
+                <p:cNvPr id="40" name="Rechteck 39">
+                  <a:extLst>
+                    <a:ext uri="{FF2B5EF4-FFF2-40B4-BE49-F238E27FC236}">
+                      <a16:creationId xmlns:a16="http://schemas.microsoft.com/office/drawing/2014/main" id="{97B71096-2C2A-9777-7AE7-55F71C4BFAE7}"/>
+                    </a:ext>
+                  </a:extLst>
+                </p:cNvPr>
+                <p:cNvSpPr/>
+                <p:nvPr/>
+              </p:nvSpPr>
+              <p:spPr>
+                <a:xfrm>
+                  <a:off x="1572639" y="3257603"/>
+                  <a:ext cx="2736000" cy="2239861"/>
+                </a:xfrm>
+                <a:prstGeom prst="rect">
+                  <a:avLst/>
+                </a:prstGeom>
+                <a:solidFill>
+                  <a:schemeClr val="bg1"/>
+                </a:solidFill>
+                <a:ln>
+                  <a:noFill/>
+                </a:ln>
+              </p:spPr>
+              <p:style>
+                <a:lnRef idx="2">
+                  <a:schemeClr val="accent1">
+                    <a:shade val="50000"/>
+                  </a:schemeClr>
+                </a:lnRef>
+                <a:fillRef idx="1">
+                  <a:schemeClr val="accent1"/>
+                </a:fillRef>
+                <a:effectRef idx="0">
+                  <a:schemeClr val="accent1"/>
+                </a:effectRef>
+                <a:fontRef idx="minor">
+                  <a:schemeClr val="lt1"/>
+                </a:fontRef>
+              </p:style>
+              <p:txBody>
+                <a:bodyPr rtlCol="0" anchor="ctr"/>
+                <a:lstStyle/>
+                <a:p>
+                  <a:pPr algn="ctr"/>
+                  <a:endParaRPr lang="de-DE" dirty="0"/>
+                </a:p>
+              </p:txBody>
+            </p:sp>
+          </p:grpSp>
+          <p:sp>
+            <p:nvSpPr>
+              <p:cNvPr id="38" name="Rechteck 37">
+                <a:extLst>
+                  <a:ext uri="{FF2B5EF4-FFF2-40B4-BE49-F238E27FC236}">
+                    <a16:creationId xmlns:a16="http://schemas.microsoft.com/office/drawing/2014/main" id="{923C4A02-D061-EB8C-5171-02ACF4083F59}"/>
+                  </a:ext>
+                </a:extLst>
+              </p:cNvPr>
+              <p:cNvSpPr/>
+              <p:nvPr/>
+            </p:nvSpPr>
+            <p:spPr>
+              <a:xfrm>
+                <a:off x="8278719" y="2403612"/>
+                <a:ext cx="841167" cy="785729"/>
+              </a:xfrm>
+              <a:prstGeom prst="rect">
+                <a:avLst/>
+              </a:prstGeom>
+              <a:solidFill>
+                <a:schemeClr val="tx1"/>
+              </a:solidFill>
+              <a:ln>
+                <a:noFill/>
+              </a:ln>
+            </p:spPr>
+            <p:style>
+              <a:lnRef idx="2">
+                <a:schemeClr val="accent1">
+                  <a:shade val="50000"/>
+                </a:schemeClr>
+              </a:lnRef>
+              <a:fillRef idx="1">
+                <a:schemeClr val="accent1"/>
+              </a:fillRef>
+              <a:effectRef idx="0">
+                <a:schemeClr val="accent1"/>
+              </a:effectRef>
+              <a:fontRef idx="minor">
+                <a:schemeClr val="lt1"/>
+              </a:fontRef>
+            </p:style>
+            <p:txBody>
+              <a:bodyPr rtlCol="0" anchor="ctr"/>
+              <a:lstStyle/>
+              <a:p>
+                <a:pPr algn="ctr"/>
+                <a:endParaRPr lang="de-DE"/>
+              </a:p>
+            </p:txBody>
+          </p:sp>
+        </p:grpSp>
+        <p:grpSp>
+          <p:nvGrpSpPr>
+            <p:cNvPr id="41" name="Gruppieren 40">
+              <a:extLst>
+                <a:ext uri="{FF2B5EF4-FFF2-40B4-BE49-F238E27FC236}">
+                  <a16:creationId xmlns:a16="http://schemas.microsoft.com/office/drawing/2014/main" id="{108B5B3B-1148-6CC4-4B8E-00208042F701}"/>
+                </a:ext>
+              </a:extLst>
+            </p:cNvPr>
+            <p:cNvGrpSpPr/>
+            <p:nvPr/>
+          </p:nvGrpSpPr>
+          <p:grpSpPr>
+            <a:xfrm>
+              <a:off x="933829" y="1129271"/>
+              <a:ext cx="1676144" cy="2032175"/>
+              <a:chOff x="5349414" y="2403611"/>
+              <a:chExt cx="1676144" cy="2032175"/>
+            </a:xfrm>
+          </p:grpSpPr>
+          <p:grpSp>
+            <p:nvGrpSpPr>
+              <p:cNvPr id="42" name="Gruppieren 41">
+                <a:extLst>
+                  <a:ext uri="{FF2B5EF4-FFF2-40B4-BE49-F238E27FC236}">
+                    <a16:creationId xmlns:a16="http://schemas.microsoft.com/office/drawing/2014/main" id="{D9A0AF1A-CD83-FE75-1CC4-7C5537762463}"/>
+                  </a:ext>
+                </a:extLst>
+              </p:cNvPr>
+              <p:cNvGrpSpPr/>
+              <p:nvPr/>
+            </p:nvGrpSpPr>
+            <p:grpSpPr>
+              <a:xfrm>
+                <a:off x="5349414" y="2406990"/>
+                <a:ext cx="1676144" cy="2028796"/>
+                <a:chOff x="1572639" y="2721713"/>
+                <a:chExt cx="2736000" cy="3311640"/>
+              </a:xfrm>
+            </p:grpSpPr>
+            <p:sp>
+              <p:nvSpPr>
+                <p:cNvPr id="44" name="Rechteck 43">
+                  <a:extLst>
+                    <a:ext uri="{FF2B5EF4-FFF2-40B4-BE49-F238E27FC236}">
+                      <a16:creationId xmlns:a16="http://schemas.microsoft.com/office/drawing/2014/main" id="{FEB826F3-5093-4A9E-55A3-B5C7A3AF1176}"/>
+                    </a:ext>
+                  </a:extLst>
+                </p:cNvPr>
+                <p:cNvSpPr/>
+                <p:nvPr/>
+              </p:nvSpPr>
+              <p:spPr>
+                <a:xfrm>
+                  <a:off x="2256639" y="2721713"/>
+                  <a:ext cx="1368000" cy="3311640"/>
+                </a:xfrm>
+                <a:prstGeom prst="rect">
+                  <a:avLst/>
+                </a:prstGeom>
+                <a:solidFill>
+                  <a:schemeClr val="bg1"/>
+                </a:solidFill>
+                <a:ln>
+                  <a:noFill/>
+                </a:ln>
+              </p:spPr>
+              <p:style>
+                <a:lnRef idx="2">
+                  <a:schemeClr val="accent1">
+                    <a:shade val="50000"/>
+                  </a:schemeClr>
+                </a:lnRef>
+                <a:fillRef idx="1">
+                  <a:schemeClr val="accent1"/>
+                </a:fillRef>
+                <a:effectRef idx="0">
+                  <a:schemeClr val="accent1"/>
+                </a:effectRef>
+                <a:fontRef idx="minor">
+                  <a:schemeClr val="lt1"/>
+                </a:fontRef>
+              </p:style>
+              <p:txBody>
+                <a:bodyPr rtlCol="0" anchor="ctr"/>
+                <a:lstStyle/>
+                <a:p>
+                  <a:pPr algn="ctr"/>
+                  <a:endParaRPr lang="de-DE"/>
+                </a:p>
+              </p:txBody>
+            </p:sp>
+            <p:sp>
+              <p:nvSpPr>
+                <p:cNvPr id="45" name="Rechteck 44">
+                  <a:extLst>
+                    <a:ext uri="{FF2B5EF4-FFF2-40B4-BE49-F238E27FC236}">
+                      <a16:creationId xmlns:a16="http://schemas.microsoft.com/office/drawing/2014/main" id="{9F2F2239-77FD-1292-77D1-02283CFBA8F3}"/>
+                    </a:ext>
+                  </a:extLst>
+                </p:cNvPr>
+                <p:cNvSpPr/>
+                <p:nvPr/>
+              </p:nvSpPr>
+              <p:spPr>
+                <a:xfrm>
+                  <a:off x="1572639" y="3257603"/>
+                  <a:ext cx="2736000" cy="2239861"/>
+                </a:xfrm>
+                <a:prstGeom prst="rect">
+                  <a:avLst/>
+                </a:prstGeom>
+                <a:solidFill>
+                  <a:schemeClr val="bg1"/>
+                </a:solidFill>
+                <a:ln>
+                  <a:noFill/>
+                </a:ln>
+              </p:spPr>
+              <p:style>
+                <a:lnRef idx="2">
+                  <a:schemeClr val="accent1">
+                    <a:shade val="50000"/>
+                  </a:schemeClr>
+                </a:lnRef>
+                <a:fillRef idx="1">
+                  <a:schemeClr val="accent1"/>
+                </a:fillRef>
+                <a:effectRef idx="0">
+                  <a:schemeClr val="accent1"/>
+                </a:effectRef>
+                <a:fontRef idx="minor">
+                  <a:schemeClr val="lt1"/>
+                </a:fontRef>
+              </p:style>
+              <p:txBody>
+                <a:bodyPr rtlCol="0" anchor="ctr"/>
+                <a:lstStyle/>
+                <a:p>
+                  <a:pPr algn="ctr"/>
+                  <a:endParaRPr lang="de-DE"/>
+                </a:p>
+              </p:txBody>
+            </p:sp>
+          </p:grpSp>
+          <p:sp>
+            <p:nvSpPr>
+              <p:cNvPr id="43" name="Rechteck 42">
+                <a:extLst>
+                  <a:ext uri="{FF2B5EF4-FFF2-40B4-BE49-F238E27FC236}">
+                    <a16:creationId xmlns:a16="http://schemas.microsoft.com/office/drawing/2014/main" id="{38DAEA18-940A-EBD5-CFD6-62D300B34543}"/>
+                  </a:ext>
+                </a:extLst>
+              </p:cNvPr>
+              <p:cNvSpPr/>
+              <p:nvPr/>
+            </p:nvSpPr>
+            <p:spPr>
+              <a:xfrm>
+                <a:off x="5766052" y="2403611"/>
+                <a:ext cx="841167" cy="785729"/>
+              </a:xfrm>
+              <a:prstGeom prst="rect">
+                <a:avLst/>
+              </a:prstGeom>
+              <a:solidFill>
+                <a:schemeClr val="tx1"/>
+              </a:solidFill>
+              <a:ln>
+                <a:noFill/>
+              </a:ln>
+            </p:spPr>
+            <p:style>
+              <a:lnRef idx="2">
+                <a:schemeClr val="accent1">
+                  <a:shade val="50000"/>
+                </a:schemeClr>
+              </a:lnRef>
+              <a:fillRef idx="1">
+                <a:schemeClr val="accent1"/>
+              </a:fillRef>
+              <a:effectRef idx="0">
+                <a:schemeClr val="accent1"/>
+              </a:effectRef>
+              <a:fontRef idx="minor">
+                <a:schemeClr val="lt1"/>
+              </a:fontRef>
+            </p:style>
+            <p:txBody>
+              <a:bodyPr rtlCol="0" anchor="ctr"/>
+              <a:lstStyle/>
+              <a:p>
+                <a:pPr algn="ctr"/>
+                <a:endParaRPr lang="de-DE"/>
+              </a:p>
+            </p:txBody>
+          </p:sp>
+        </p:grpSp>
+      </p:grpSp>
+      <p:grpSp>
+        <p:nvGrpSpPr>
+          <p:cNvPr id="57" name="Gruppieren 56">
+            <a:extLst>
+              <a:ext uri="{FF2B5EF4-FFF2-40B4-BE49-F238E27FC236}">
+                <a16:creationId xmlns:a16="http://schemas.microsoft.com/office/drawing/2014/main" id="{B54930DC-1F94-BAE5-92A8-FFAC8648FD2B}"/>
+              </a:ext>
+            </a:extLst>
+          </p:cNvPr>
+          <p:cNvGrpSpPr/>
+          <p:nvPr/>
+        </p:nvGrpSpPr>
+        <p:grpSpPr>
+          <a:xfrm>
+            <a:off x="6229742" y="671115"/>
+            <a:ext cx="5866503" cy="5168921"/>
+            <a:chOff x="6229742" y="671115"/>
+            <a:chExt cx="5866503" cy="5168921"/>
+          </a:xfrm>
+        </p:grpSpPr>
+        <p:grpSp>
+          <p:nvGrpSpPr>
+            <p:cNvPr id="20" name="Gruppieren 19">
+              <a:extLst>
+                <a:ext uri="{FF2B5EF4-FFF2-40B4-BE49-F238E27FC236}">
+                  <a16:creationId xmlns:a16="http://schemas.microsoft.com/office/drawing/2014/main" id="{9E6ECC24-841A-6DC7-A6BB-EE9E14115143}"/>
+                </a:ext>
+              </a:extLst>
+            </p:cNvPr>
+            <p:cNvGrpSpPr/>
+            <p:nvPr/>
+          </p:nvGrpSpPr>
+          <p:grpSpPr>
+            <a:xfrm>
+              <a:off x="6229742" y="671115"/>
+              <a:ext cx="5866503" cy="5168921"/>
+              <a:chOff x="1784598" y="801743"/>
+              <a:chExt cx="5866503" cy="5168921"/>
+            </a:xfrm>
+            <a:noFill/>
+          </p:grpSpPr>
+          <p:grpSp>
+            <p:nvGrpSpPr>
+              <p:cNvPr id="21" name="Gruppieren 20">
+                <a:extLst>
+                  <a:ext uri="{FF2B5EF4-FFF2-40B4-BE49-F238E27FC236}">
+                    <a16:creationId xmlns:a16="http://schemas.microsoft.com/office/drawing/2014/main" id="{9E767CD9-2F26-4D2B-2EAD-41B2AF1EC5E2}"/>
+                  </a:ext>
+                </a:extLst>
+              </p:cNvPr>
+              <p:cNvGrpSpPr/>
+              <p:nvPr/>
+            </p:nvGrpSpPr>
+            <p:grpSpPr>
+              <a:xfrm>
+                <a:off x="1784598" y="5300696"/>
+                <a:ext cx="1676144" cy="669968"/>
+                <a:chOff x="1134631" y="4456166"/>
+                <a:chExt cx="2160000" cy="936000"/>
+              </a:xfrm>
+              <a:grpFill/>
+            </p:grpSpPr>
+            <p:sp>
+              <p:nvSpPr>
+                <p:cNvPr id="34" name="Rechteck 33">
+                  <a:extLst>
+                    <a:ext uri="{FF2B5EF4-FFF2-40B4-BE49-F238E27FC236}">
+                      <a16:creationId xmlns:a16="http://schemas.microsoft.com/office/drawing/2014/main" id="{D9F4764E-FBCB-E22F-075E-5C837735701B}"/>
+                    </a:ext>
+                  </a:extLst>
+                </p:cNvPr>
+                <p:cNvSpPr/>
+                <p:nvPr/>
+              </p:nvSpPr>
+              <p:spPr>
+                <a:xfrm>
+                  <a:off x="1674631" y="4924166"/>
+                  <a:ext cx="1080000" cy="468000"/>
+                </a:xfrm>
+                <a:prstGeom prst="rect">
+                  <a:avLst/>
+                </a:prstGeom>
+                <a:grpFill/>
+                <a:ln>
+                  <a:noFill/>
+                </a:ln>
+              </p:spPr>
+              <p:style>
+                <a:lnRef idx="2">
+                  <a:schemeClr val="accent1">
+                    <a:shade val="50000"/>
+                  </a:schemeClr>
+                </a:lnRef>
+                <a:fillRef idx="1">
+                  <a:schemeClr val="accent1"/>
+                </a:fillRef>
+                <a:effectRef idx="0">
+                  <a:schemeClr val="accent1"/>
+                </a:effectRef>
+                <a:fontRef idx="minor">
+                  <a:schemeClr val="lt1"/>
+                </a:fontRef>
+              </p:style>
+              <p:txBody>
+                <a:bodyPr rtlCol="0" anchor="ctr"/>
+                <a:lstStyle/>
+                <a:p>
+                  <a:pPr algn="ctr"/>
+                  <a:endParaRPr lang="de-DE"/>
+                </a:p>
+              </p:txBody>
+            </p:sp>
+            <p:sp>
+              <p:nvSpPr>
+                <p:cNvPr id="35" name="Rechteck 34">
+                  <a:extLst>
+                    <a:ext uri="{FF2B5EF4-FFF2-40B4-BE49-F238E27FC236}">
+                      <a16:creationId xmlns:a16="http://schemas.microsoft.com/office/drawing/2014/main" id="{21C2B151-4CAD-04FC-356A-61964E866258}"/>
+                    </a:ext>
+                  </a:extLst>
+                </p:cNvPr>
+                <p:cNvSpPr/>
+                <p:nvPr/>
+              </p:nvSpPr>
+              <p:spPr>
+                <a:xfrm>
+                  <a:off x="1134631" y="4456166"/>
+                  <a:ext cx="2160000" cy="468000"/>
+                </a:xfrm>
+                <a:prstGeom prst="rect">
+                  <a:avLst/>
+                </a:prstGeom>
+                <a:grpFill/>
+                <a:ln>
+                  <a:noFill/>
+                </a:ln>
+              </p:spPr>
+              <p:style>
+                <a:lnRef idx="2">
+                  <a:schemeClr val="accent1">
+                    <a:shade val="50000"/>
+                  </a:schemeClr>
+                </a:lnRef>
+                <a:fillRef idx="1">
+                  <a:schemeClr val="accent1"/>
+                </a:fillRef>
+                <a:effectRef idx="0">
+                  <a:schemeClr val="accent1"/>
+                </a:effectRef>
+                <a:fontRef idx="minor">
+                  <a:schemeClr val="lt1"/>
+                </a:fontRef>
+              </p:style>
+              <p:txBody>
+                <a:bodyPr rtlCol="0" anchor="ctr"/>
+                <a:lstStyle/>
+                <a:p>
+                  <a:pPr algn="ctr"/>
+                  <a:endParaRPr lang="de-DE" dirty="0"/>
+                </a:p>
+              </p:txBody>
+            </p:sp>
+          </p:grpSp>
+          <p:grpSp>
+            <p:nvGrpSpPr>
+              <p:cNvPr id="22" name="Gruppieren 21">
+                <a:extLst>
+                  <a:ext uri="{FF2B5EF4-FFF2-40B4-BE49-F238E27FC236}">
+                    <a16:creationId xmlns:a16="http://schemas.microsoft.com/office/drawing/2014/main" id="{663F6B81-624A-5DAB-BCB7-9237DDC028B1}"/>
+                  </a:ext>
+                </a:extLst>
+              </p:cNvPr>
+              <p:cNvGrpSpPr/>
+              <p:nvPr/>
+            </p:nvGrpSpPr>
+            <p:grpSpPr>
+              <a:xfrm>
+                <a:off x="3879778" y="5300696"/>
+                <a:ext cx="1676144" cy="669968"/>
+                <a:chOff x="1134631" y="4456166"/>
+                <a:chExt cx="2160000" cy="936000"/>
+              </a:xfrm>
+              <a:grpFill/>
+            </p:grpSpPr>
+            <p:sp>
+              <p:nvSpPr>
+                <p:cNvPr id="32" name="Rechteck 31">
+                  <a:extLst>
+                    <a:ext uri="{FF2B5EF4-FFF2-40B4-BE49-F238E27FC236}">
+                      <a16:creationId xmlns:a16="http://schemas.microsoft.com/office/drawing/2014/main" id="{27FF2278-FDF7-99EE-9FBD-A3B6B1712D3A}"/>
+                    </a:ext>
+                  </a:extLst>
+                </p:cNvPr>
+                <p:cNvSpPr/>
+                <p:nvPr/>
+              </p:nvSpPr>
+              <p:spPr>
+                <a:xfrm>
+                  <a:off x="1674631" y="4924166"/>
+                  <a:ext cx="1080000" cy="468000"/>
+                </a:xfrm>
+                <a:prstGeom prst="rect">
+                  <a:avLst/>
+                </a:prstGeom>
+                <a:grpFill/>
+                <a:ln>
+                  <a:noFill/>
+                </a:ln>
+              </p:spPr>
+              <p:style>
+                <a:lnRef idx="2">
+                  <a:schemeClr val="accent1">
+                    <a:shade val="50000"/>
+                  </a:schemeClr>
+                </a:lnRef>
+                <a:fillRef idx="1">
+                  <a:schemeClr val="accent1"/>
+                </a:fillRef>
+                <a:effectRef idx="0">
+                  <a:schemeClr val="accent1"/>
+                </a:effectRef>
+                <a:fontRef idx="minor">
+                  <a:schemeClr val="lt1"/>
+                </a:fontRef>
+              </p:style>
+              <p:txBody>
+                <a:bodyPr rtlCol="0" anchor="ctr"/>
+                <a:lstStyle/>
+                <a:p>
+                  <a:pPr algn="ctr"/>
+                  <a:endParaRPr lang="de-DE"/>
+                </a:p>
+              </p:txBody>
+            </p:sp>
+            <p:sp>
+              <p:nvSpPr>
+                <p:cNvPr id="33" name="Rechteck 32">
+                  <a:extLst>
+                    <a:ext uri="{FF2B5EF4-FFF2-40B4-BE49-F238E27FC236}">
+                      <a16:creationId xmlns:a16="http://schemas.microsoft.com/office/drawing/2014/main" id="{7FC35946-15FF-927A-0007-FEC9CE5453B7}"/>
+                    </a:ext>
+                  </a:extLst>
+                </p:cNvPr>
+                <p:cNvSpPr/>
+                <p:nvPr/>
+              </p:nvSpPr>
+              <p:spPr>
+                <a:xfrm>
+                  <a:off x="1134631" y="4456166"/>
+                  <a:ext cx="2160000" cy="468000"/>
+                </a:xfrm>
+                <a:prstGeom prst="rect">
+                  <a:avLst/>
+                </a:prstGeom>
+                <a:grpFill/>
+                <a:ln>
+                  <a:noFill/>
+                </a:ln>
+              </p:spPr>
+              <p:style>
+                <a:lnRef idx="2">
+                  <a:schemeClr val="accent1">
+                    <a:shade val="50000"/>
+                  </a:schemeClr>
+                </a:lnRef>
+                <a:fillRef idx="1">
+                  <a:schemeClr val="accent1"/>
+                </a:fillRef>
+                <a:effectRef idx="0">
+                  <a:schemeClr val="accent1"/>
+                </a:effectRef>
+                <a:fontRef idx="minor">
+                  <a:schemeClr val="lt1"/>
+                </a:fontRef>
+              </p:style>
+              <p:txBody>
+                <a:bodyPr rtlCol="0" anchor="ctr"/>
+                <a:lstStyle/>
+                <a:p>
+                  <a:pPr algn="ctr"/>
+                  <a:endParaRPr lang="de-DE"/>
+                </a:p>
+              </p:txBody>
+            </p:sp>
+          </p:grpSp>
+          <p:grpSp>
+            <p:nvGrpSpPr>
+              <p:cNvPr id="23" name="Gruppieren 22">
+                <a:extLst>
+                  <a:ext uri="{FF2B5EF4-FFF2-40B4-BE49-F238E27FC236}">
+                    <a16:creationId xmlns:a16="http://schemas.microsoft.com/office/drawing/2014/main" id="{73F075CD-D235-7B88-EE46-A2EDD54EE18D}"/>
+                  </a:ext>
+                </a:extLst>
+              </p:cNvPr>
+              <p:cNvGrpSpPr/>
+              <p:nvPr/>
+            </p:nvGrpSpPr>
+            <p:grpSpPr>
+              <a:xfrm>
+                <a:off x="5974957" y="5300696"/>
+                <a:ext cx="1676144" cy="669968"/>
+                <a:chOff x="1134631" y="4456166"/>
+                <a:chExt cx="2160000" cy="936000"/>
+              </a:xfrm>
+              <a:grpFill/>
+            </p:grpSpPr>
+            <p:sp>
+              <p:nvSpPr>
+                <p:cNvPr id="30" name="Rechteck 29">
+                  <a:extLst>
+                    <a:ext uri="{FF2B5EF4-FFF2-40B4-BE49-F238E27FC236}">
+                      <a16:creationId xmlns:a16="http://schemas.microsoft.com/office/drawing/2014/main" id="{DD0B07ED-49A0-5980-C229-4B1241E768F4}"/>
+                    </a:ext>
+                  </a:extLst>
+                </p:cNvPr>
+                <p:cNvSpPr/>
+                <p:nvPr/>
+              </p:nvSpPr>
+              <p:spPr>
+                <a:xfrm>
+                  <a:off x="1674631" y="4924166"/>
+                  <a:ext cx="1080000" cy="468000"/>
+                </a:xfrm>
+                <a:prstGeom prst="rect">
+                  <a:avLst/>
+                </a:prstGeom>
+                <a:grpFill/>
+                <a:ln>
+                  <a:noFill/>
+                </a:ln>
+              </p:spPr>
+              <p:style>
+                <a:lnRef idx="2">
+                  <a:schemeClr val="accent1">
+                    <a:shade val="50000"/>
+                  </a:schemeClr>
+                </a:lnRef>
+                <a:fillRef idx="1">
+                  <a:schemeClr val="accent1"/>
+                </a:fillRef>
+                <a:effectRef idx="0">
+                  <a:schemeClr val="accent1"/>
+                </a:effectRef>
+                <a:fontRef idx="minor">
+                  <a:schemeClr val="lt1"/>
+                </a:fontRef>
+              </p:style>
+              <p:txBody>
+                <a:bodyPr rtlCol="0" anchor="ctr"/>
+                <a:lstStyle/>
+                <a:p>
+                  <a:pPr algn="ctr"/>
+                  <a:endParaRPr lang="de-DE"/>
+                </a:p>
+              </p:txBody>
+            </p:sp>
+            <p:sp>
+              <p:nvSpPr>
+                <p:cNvPr id="31" name="Rechteck 30">
+                  <a:extLst>
+                    <a:ext uri="{FF2B5EF4-FFF2-40B4-BE49-F238E27FC236}">
+                      <a16:creationId xmlns:a16="http://schemas.microsoft.com/office/drawing/2014/main" id="{CD9C0E15-F71B-75DA-8DD3-7B708AF1B35B}"/>
+                    </a:ext>
+                  </a:extLst>
+                </p:cNvPr>
+                <p:cNvSpPr/>
+                <p:nvPr/>
+              </p:nvSpPr>
+              <p:spPr>
+                <a:xfrm>
+                  <a:off x="1134631" y="4456166"/>
+                  <a:ext cx="2160000" cy="468000"/>
+                </a:xfrm>
+                <a:prstGeom prst="rect">
+                  <a:avLst/>
+                </a:prstGeom>
+                <a:grpFill/>
+                <a:ln>
+                  <a:noFill/>
+                </a:ln>
+              </p:spPr>
+              <p:style>
+                <a:lnRef idx="2">
+                  <a:schemeClr val="accent1">
+                    <a:shade val="50000"/>
+                  </a:schemeClr>
+                </a:lnRef>
+                <a:fillRef idx="1">
+                  <a:schemeClr val="accent1"/>
+                </a:fillRef>
+                <a:effectRef idx="0">
+                  <a:schemeClr val="accent1"/>
+                </a:effectRef>
+                <a:fontRef idx="minor">
+                  <a:schemeClr val="lt1"/>
+                </a:fontRef>
+              </p:style>
+              <p:txBody>
+                <a:bodyPr rtlCol="0" anchor="ctr"/>
+                <a:lstStyle/>
+                <a:p>
+                  <a:pPr algn="ctr"/>
+                  <a:endParaRPr lang="de-DE"/>
+                </a:p>
+              </p:txBody>
+            </p:sp>
+          </p:grpSp>
+          <p:sp>
+            <p:nvSpPr>
+              <p:cNvPr id="24" name="Rechteck 23">
+                <a:extLst>
+                  <a:ext uri="{FF2B5EF4-FFF2-40B4-BE49-F238E27FC236}">
+                    <a16:creationId xmlns:a16="http://schemas.microsoft.com/office/drawing/2014/main" id="{70F2574B-852E-CAB7-EC03-3B89878127C7}"/>
+                  </a:ext>
+                </a:extLst>
+              </p:cNvPr>
+              <p:cNvSpPr/>
+              <p:nvPr/>
+            </p:nvSpPr>
+            <p:spPr>
+              <a:xfrm>
+                <a:off x="1784598" y="3273155"/>
+                <a:ext cx="5866503" cy="2027541"/>
+              </a:xfrm>
+              <a:prstGeom prst="rect">
+                <a:avLst/>
+              </a:prstGeom>
+              <a:grpFill/>
+              <a:ln>
+                <a:noFill/>
+              </a:ln>
+            </p:spPr>
+            <p:style>
+              <a:lnRef idx="2">
+                <a:schemeClr val="accent1">
+                  <a:shade val="50000"/>
+                </a:schemeClr>
+              </a:lnRef>
+              <a:fillRef idx="1">
+                <a:schemeClr val="accent1"/>
+              </a:fillRef>
+              <a:effectRef idx="0">
+                <a:schemeClr val="accent1"/>
+              </a:effectRef>
+              <a:fontRef idx="minor">
+                <a:schemeClr val="lt1"/>
+              </a:fontRef>
+            </p:style>
+            <p:txBody>
+              <a:bodyPr rtlCol="0" anchor="ctr"/>
+              <a:lstStyle/>
+              <a:p>
+                <a:pPr algn="ctr"/>
+                <a:endParaRPr lang="de-DE"/>
+              </a:p>
+            </p:txBody>
+          </p:sp>
+          <p:grpSp>
+            <p:nvGrpSpPr>
+              <p:cNvPr id="25" name="Gruppieren 24">
+                <a:extLst>
+                  <a:ext uri="{FF2B5EF4-FFF2-40B4-BE49-F238E27FC236}">
+                    <a16:creationId xmlns:a16="http://schemas.microsoft.com/office/drawing/2014/main" id="{7EC27568-7C94-3674-93F7-7F392F3DB753}"/>
+                  </a:ext>
+                </a:extLst>
+              </p:cNvPr>
+              <p:cNvGrpSpPr/>
+              <p:nvPr/>
+            </p:nvGrpSpPr>
+            <p:grpSpPr>
+              <a:xfrm>
+                <a:off x="2203634" y="801743"/>
+                <a:ext cx="5028431" cy="3334286"/>
+                <a:chOff x="1421478" y="183857"/>
+                <a:chExt cx="7025127" cy="4658268"/>
+              </a:xfrm>
+              <a:grpFill/>
+            </p:grpSpPr>
+            <p:sp>
+              <p:nvSpPr>
+                <p:cNvPr id="26" name="Rechteck 25">
+                  <a:extLst>
+                    <a:ext uri="{FF2B5EF4-FFF2-40B4-BE49-F238E27FC236}">
+                      <a16:creationId xmlns:a16="http://schemas.microsoft.com/office/drawing/2014/main" id="{01AAEF97-CFEB-86A0-5C35-ABC39D2129E5}"/>
+                    </a:ext>
+                  </a:extLst>
+                </p:cNvPr>
+                <p:cNvSpPr/>
+                <p:nvPr/>
+              </p:nvSpPr>
+              <p:spPr>
+                <a:xfrm>
+                  <a:off x="1421478" y="2009485"/>
+                  <a:ext cx="7025127" cy="2832640"/>
+                </a:xfrm>
+                <a:prstGeom prst="rect">
+                  <a:avLst/>
+                </a:prstGeom>
+                <a:grpFill/>
+                <a:ln>
+                  <a:noFill/>
+                </a:ln>
+              </p:spPr>
+              <p:style>
+                <a:lnRef idx="2">
+                  <a:schemeClr val="accent1">
+                    <a:shade val="50000"/>
+                  </a:schemeClr>
+                </a:lnRef>
+                <a:fillRef idx="1">
+                  <a:schemeClr val="accent1"/>
+                </a:fillRef>
+                <a:effectRef idx="0">
+                  <a:schemeClr val="accent1"/>
+                </a:effectRef>
+                <a:fontRef idx="minor">
+                  <a:schemeClr val="lt1"/>
+                </a:fontRef>
+              </p:style>
+              <p:txBody>
+                <a:bodyPr rtlCol="0" anchor="ctr"/>
+                <a:lstStyle/>
+                <a:p>
+                  <a:pPr algn="ctr"/>
+                  <a:endParaRPr lang="de-DE"/>
+                </a:p>
+              </p:txBody>
+            </p:sp>
+            <p:sp>
+              <p:nvSpPr>
+                <p:cNvPr id="27" name="Rechteck 26">
+                  <a:extLst>
+                    <a:ext uri="{FF2B5EF4-FFF2-40B4-BE49-F238E27FC236}">
+                      <a16:creationId xmlns:a16="http://schemas.microsoft.com/office/drawing/2014/main" id="{8380E24A-7E80-3E45-E639-00A193A7B9D9}"/>
+                    </a:ext>
+                  </a:extLst>
+                </p:cNvPr>
+                <p:cNvSpPr/>
+                <p:nvPr/>
+              </p:nvSpPr>
+              <p:spPr>
+                <a:xfrm>
+                  <a:off x="2006905" y="1384042"/>
+                  <a:ext cx="5853348" cy="2832640"/>
+                </a:xfrm>
+                <a:prstGeom prst="rect">
+                  <a:avLst/>
+                </a:prstGeom>
+                <a:grpFill/>
+                <a:ln>
+                  <a:noFill/>
+                </a:ln>
+              </p:spPr>
+              <p:style>
+                <a:lnRef idx="2">
+                  <a:schemeClr val="accent1">
+                    <a:shade val="50000"/>
+                  </a:schemeClr>
+                </a:lnRef>
+                <a:fillRef idx="1">
+                  <a:schemeClr val="accent1"/>
+                </a:fillRef>
+                <a:effectRef idx="0">
+                  <a:schemeClr val="accent1"/>
+                </a:effectRef>
+                <a:fontRef idx="minor">
+                  <a:schemeClr val="lt1"/>
+                </a:fontRef>
+              </p:style>
+              <p:txBody>
+                <a:bodyPr rtlCol="0" anchor="ctr"/>
+                <a:lstStyle/>
+                <a:p>
+                  <a:pPr algn="ctr"/>
+                  <a:endParaRPr lang="de-DE"/>
+                </a:p>
+              </p:txBody>
+            </p:sp>
+            <p:sp>
+              <p:nvSpPr>
+                <p:cNvPr id="28" name="Rechteck 27">
+                  <a:extLst>
+                    <a:ext uri="{FF2B5EF4-FFF2-40B4-BE49-F238E27FC236}">
+                      <a16:creationId xmlns:a16="http://schemas.microsoft.com/office/drawing/2014/main" id="{D88CB1CF-28C3-06E4-3DC4-70D0F967F67E}"/>
+                    </a:ext>
+                  </a:extLst>
+                </p:cNvPr>
+                <p:cNvSpPr/>
+                <p:nvPr/>
+              </p:nvSpPr>
+              <p:spPr>
+                <a:xfrm>
+                  <a:off x="2592333" y="827165"/>
+                  <a:ext cx="4683418" cy="2832640"/>
+                </a:xfrm>
+                <a:prstGeom prst="rect">
+                  <a:avLst/>
+                </a:prstGeom>
+                <a:grpFill/>
+                <a:ln>
+                  <a:noFill/>
+                </a:ln>
+              </p:spPr>
+              <p:style>
+                <a:lnRef idx="2">
+                  <a:schemeClr val="accent1">
+                    <a:shade val="50000"/>
+                  </a:schemeClr>
+                </a:lnRef>
+                <a:fillRef idx="1">
+                  <a:schemeClr val="accent1"/>
+                </a:fillRef>
+                <a:effectRef idx="0">
+                  <a:schemeClr val="accent1"/>
+                </a:effectRef>
+                <a:fontRef idx="minor">
+                  <a:schemeClr val="lt1"/>
+                </a:fontRef>
+              </p:style>
+              <p:txBody>
+                <a:bodyPr rtlCol="0" anchor="ctr"/>
+                <a:lstStyle/>
+                <a:p>
+                  <a:pPr algn="ctr"/>
+                  <a:endParaRPr lang="de-DE"/>
+                </a:p>
+              </p:txBody>
+            </p:sp>
+            <p:sp>
+              <p:nvSpPr>
+                <p:cNvPr id="29" name="Rechteck 28">
+                  <a:extLst>
+                    <a:ext uri="{FF2B5EF4-FFF2-40B4-BE49-F238E27FC236}">
+                      <a16:creationId xmlns:a16="http://schemas.microsoft.com/office/drawing/2014/main" id="{94208AEC-E9E6-1993-491E-4F9AD7DA73C7}"/>
+                    </a:ext>
+                  </a:extLst>
+                </p:cNvPr>
+                <p:cNvSpPr/>
+                <p:nvPr/>
+              </p:nvSpPr>
+              <p:spPr>
+                <a:xfrm>
+                  <a:off x="3763187" y="183857"/>
+                  <a:ext cx="2341709" cy="2832640"/>
+                </a:xfrm>
+                <a:prstGeom prst="rect">
+                  <a:avLst/>
+                </a:prstGeom>
+                <a:grpFill/>
+                <a:ln>
+                  <a:noFill/>
+                </a:ln>
+              </p:spPr>
+              <p:style>
+                <a:lnRef idx="2">
+                  <a:schemeClr val="accent1">
+                    <a:shade val="50000"/>
+                  </a:schemeClr>
+                </a:lnRef>
+                <a:fillRef idx="1">
+                  <a:schemeClr val="accent1"/>
+                </a:fillRef>
+                <a:effectRef idx="0">
+                  <a:schemeClr val="accent1"/>
+                </a:effectRef>
+                <a:fontRef idx="minor">
+                  <a:schemeClr val="lt1"/>
+                </a:fontRef>
+              </p:style>
+              <p:txBody>
+                <a:bodyPr rtlCol="0" anchor="ctr"/>
+                <a:lstStyle/>
+                <a:p>
+                  <a:pPr algn="ctr"/>
+                  <a:endParaRPr lang="de-DE"/>
+                </a:p>
+              </p:txBody>
+            </p:sp>
+          </p:grpSp>
+        </p:grpSp>
+        <p:grpSp>
+          <p:nvGrpSpPr>
+            <p:cNvPr id="46" name="Gruppieren 45">
+              <a:extLst>
+                <a:ext uri="{FF2B5EF4-FFF2-40B4-BE49-F238E27FC236}">
+                  <a16:creationId xmlns:a16="http://schemas.microsoft.com/office/drawing/2014/main" id="{F255436D-A42A-DC14-BDA7-1A555ECF4CD7}"/>
+                </a:ext>
+              </a:extLst>
+            </p:cNvPr>
+            <p:cNvGrpSpPr/>
+            <p:nvPr/>
+          </p:nvGrpSpPr>
+          <p:grpSpPr>
+            <a:xfrm>
+              <a:off x="9582030" y="2475903"/>
+              <a:ext cx="1676144" cy="2036408"/>
+              <a:chOff x="7772143" y="123403"/>
+              <a:chExt cx="1676144" cy="2036408"/>
+            </a:xfrm>
+          </p:grpSpPr>
+          <p:grpSp>
+            <p:nvGrpSpPr>
+              <p:cNvPr id="47" name="Gruppieren 46">
+                <a:extLst>
+                  <a:ext uri="{FF2B5EF4-FFF2-40B4-BE49-F238E27FC236}">
+                    <a16:creationId xmlns:a16="http://schemas.microsoft.com/office/drawing/2014/main" id="{276C611A-DE57-829F-AB20-5A25C6593B23}"/>
+                  </a:ext>
+                </a:extLst>
+              </p:cNvPr>
+              <p:cNvGrpSpPr/>
+              <p:nvPr/>
+            </p:nvGrpSpPr>
+            <p:grpSpPr>
+              <a:xfrm>
+                <a:off x="7772143" y="123403"/>
+                <a:ext cx="1676144" cy="2028796"/>
+                <a:chOff x="1572639" y="2721713"/>
+                <a:chExt cx="2736000" cy="3311640"/>
+              </a:xfrm>
+            </p:grpSpPr>
+            <p:sp>
+              <p:nvSpPr>
+                <p:cNvPr id="49" name="Rechteck 48">
+                  <a:extLst>
+                    <a:ext uri="{FF2B5EF4-FFF2-40B4-BE49-F238E27FC236}">
+                      <a16:creationId xmlns:a16="http://schemas.microsoft.com/office/drawing/2014/main" id="{2A2A6DB8-AC8C-CDA2-64DA-3A1EA9C51FB1}"/>
+                    </a:ext>
+                  </a:extLst>
+                </p:cNvPr>
+                <p:cNvSpPr/>
+                <p:nvPr/>
+              </p:nvSpPr>
+              <p:spPr>
+                <a:xfrm>
+                  <a:off x="2256639" y="2721713"/>
+                  <a:ext cx="1368000" cy="3311640"/>
+                </a:xfrm>
+                <a:prstGeom prst="rect">
+                  <a:avLst/>
+                </a:prstGeom>
+                <a:solidFill>
+                  <a:schemeClr val="bg1"/>
+                </a:solidFill>
+                <a:ln>
+                  <a:noFill/>
+                </a:ln>
+              </p:spPr>
+              <p:style>
+                <a:lnRef idx="2">
+                  <a:schemeClr val="accent1">
+                    <a:shade val="50000"/>
+                  </a:schemeClr>
+                </a:lnRef>
+                <a:fillRef idx="1">
+                  <a:schemeClr val="accent1"/>
+                </a:fillRef>
+                <a:effectRef idx="0">
+                  <a:schemeClr val="accent1"/>
+                </a:effectRef>
+                <a:fontRef idx="minor">
+                  <a:schemeClr val="lt1"/>
+                </a:fontRef>
+              </p:style>
+              <p:txBody>
+                <a:bodyPr rtlCol="0" anchor="ctr"/>
+                <a:lstStyle/>
+                <a:p>
+                  <a:pPr algn="ctr"/>
+                  <a:endParaRPr lang="de-DE"/>
+                </a:p>
+              </p:txBody>
+            </p:sp>
+            <p:sp>
+              <p:nvSpPr>
+                <p:cNvPr id="50" name="Rechteck 49">
+                  <a:extLst>
+                    <a:ext uri="{FF2B5EF4-FFF2-40B4-BE49-F238E27FC236}">
+                      <a16:creationId xmlns:a16="http://schemas.microsoft.com/office/drawing/2014/main" id="{8BBB1619-2D50-D0DB-BF34-55CBA9F9289F}"/>
+                    </a:ext>
+                  </a:extLst>
+                </p:cNvPr>
+                <p:cNvSpPr/>
+                <p:nvPr/>
+              </p:nvSpPr>
+              <p:spPr>
+                <a:xfrm>
+                  <a:off x="1572639" y="3257603"/>
+                  <a:ext cx="2736000" cy="2239861"/>
+                </a:xfrm>
+                <a:prstGeom prst="rect">
+                  <a:avLst/>
+                </a:prstGeom>
+                <a:solidFill>
+                  <a:schemeClr val="bg1"/>
+                </a:solidFill>
+                <a:ln>
+                  <a:noFill/>
+                </a:ln>
+              </p:spPr>
+              <p:style>
+                <a:lnRef idx="2">
+                  <a:schemeClr val="accent1">
+                    <a:shade val="50000"/>
+                  </a:schemeClr>
+                </a:lnRef>
+                <a:fillRef idx="1">
+                  <a:schemeClr val="accent1"/>
+                </a:fillRef>
+                <a:effectRef idx="0">
+                  <a:schemeClr val="accent1"/>
+                </a:effectRef>
+                <a:fontRef idx="minor">
+                  <a:schemeClr val="lt1"/>
+                </a:fontRef>
+              </p:style>
+              <p:txBody>
+                <a:bodyPr rtlCol="0" anchor="ctr"/>
+                <a:lstStyle/>
+                <a:p>
+                  <a:pPr algn="ctr"/>
+                  <a:endParaRPr lang="de-DE" dirty="0"/>
+                </a:p>
+              </p:txBody>
+            </p:sp>
+          </p:grpSp>
+          <p:sp>
+            <p:nvSpPr>
+              <p:cNvPr id="48" name="Rechteck 47">
+                <a:extLst>
+                  <a:ext uri="{FF2B5EF4-FFF2-40B4-BE49-F238E27FC236}">
+                    <a16:creationId xmlns:a16="http://schemas.microsoft.com/office/drawing/2014/main" id="{A828A21B-0879-B80E-3D0C-0631E8E4EC3C}"/>
+                  </a:ext>
+                </a:extLst>
+              </p:cNvPr>
+              <p:cNvSpPr/>
+              <p:nvPr/>
+            </p:nvSpPr>
+            <p:spPr>
+              <a:xfrm>
+                <a:off x="8196564" y="1374082"/>
+                <a:ext cx="841167" cy="785729"/>
+              </a:xfrm>
+              <a:prstGeom prst="rect">
+                <a:avLst/>
+              </a:prstGeom>
+              <a:solidFill>
+                <a:schemeClr val="tx1"/>
+              </a:solidFill>
+              <a:ln>
+                <a:noFill/>
+              </a:ln>
+            </p:spPr>
+            <p:style>
+              <a:lnRef idx="2">
+                <a:schemeClr val="accent1">
+                  <a:shade val="50000"/>
+                </a:schemeClr>
+              </a:lnRef>
+              <a:fillRef idx="1">
+                <a:schemeClr val="accent1"/>
+              </a:fillRef>
+              <a:effectRef idx="0">
+                <a:schemeClr val="accent1"/>
+              </a:effectRef>
+              <a:fontRef idx="minor">
+                <a:schemeClr val="lt1"/>
+              </a:fontRef>
+            </p:style>
+            <p:txBody>
+              <a:bodyPr rtlCol="0" anchor="ctr"/>
+              <a:lstStyle/>
+              <a:p>
+                <a:pPr algn="ctr"/>
+                <a:endParaRPr lang="de-DE"/>
+              </a:p>
+            </p:txBody>
+          </p:sp>
+        </p:grpSp>
+        <p:grpSp>
+          <p:nvGrpSpPr>
+            <p:cNvPr id="51" name="Gruppieren 50">
+              <a:extLst>
+                <a:ext uri="{FF2B5EF4-FFF2-40B4-BE49-F238E27FC236}">
+                  <a16:creationId xmlns:a16="http://schemas.microsoft.com/office/drawing/2014/main" id="{18B8D8D8-0C02-70CD-C902-E1B6ADD82951}"/>
+                </a:ext>
+              </a:extLst>
+            </p:cNvPr>
+            <p:cNvGrpSpPr/>
+            <p:nvPr/>
+          </p:nvGrpSpPr>
+          <p:grpSpPr>
+            <a:xfrm>
+              <a:off x="7067815" y="2479651"/>
+              <a:ext cx="1676144" cy="2032659"/>
+              <a:chOff x="5257928" y="127151"/>
+              <a:chExt cx="1676144" cy="2032659"/>
+            </a:xfrm>
+          </p:grpSpPr>
+          <p:grpSp>
+            <p:nvGrpSpPr>
+              <p:cNvPr id="52" name="Gruppieren 51">
+                <a:extLst>
+                  <a:ext uri="{FF2B5EF4-FFF2-40B4-BE49-F238E27FC236}">
+                    <a16:creationId xmlns:a16="http://schemas.microsoft.com/office/drawing/2014/main" id="{B0AC6FD4-A411-E462-C54A-472EF9546B37}"/>
+                  </a:ext>
+                </a:extLst>
+              </p:cNvPr>
+              <p:cNvGrpSpPr/>
+              <p:nvPr/>
+            </p:nvGrpSpPr>
+            <p:grpSpPr>
+              <a:xfrm>
+                <a:off x="5257928" y="127151"/>
+                <a:ext cx="1676144" cy="2028796"/>
+                <a:chOff x="1572639" y="2721713"/>
+                <a:chExt cx="2736000" cy="3311640"/>
+              </a:xfrm>
+            </p:grpSpPr>
+            <p:sp>
+              <p:nvSpPr>
+                <p:cNvPr id="54" name="Rechteck 53">
+                  <a:extLst>
+                    <a:ext uri="{FF2B5EF4-FFF2-40B4-BE49-F238E27FC236}">
+                      <a16:creationId xmlns:a16="http://schemas.microsoft.com/office/drawing/2014/main" id="{8CCD54B9-760F-A0D5-F82A-20629B632F74}"/>
+                    </a:ext>
+                  </a:extLst>
+                </p:cNvPr>
+                <p:cNvSpPr/>
+                <p:nvPr/>
+              </p:nvSpPr>
+              <p:spPr>
+                <a:xfrm>
+                  <a:off x="2256639" y="2721713"/>
+                  <a:ext cx="1368000" cy="3311640"/>
+                </a:xfrm>
+                <a:prstGeom prst="rect">
+                  <a:avLst/>
+                </a:prstGeom>
+                <a:solidFill>
+                  <a:schemeClr val="bg1"/>
+                </a:solidFill>
+                <a:ln>
+                  <a:noFill/>
+                </a:ln>
+              </p:spPr>
+              <p:style>
+                <a:lnRef idx="2">
+                  <a:schemeClr val="accent1">
+                    <a:shade val="50000"/>
+                  </a:schemeClr>
+                </a:lnRef>
+                <a:fillRef idx="1">
+                  <a:schemeClr val="accent1"/>
+                </a:fillRef>
+                <a:effectRef idx="0">
+                  <a:schemeClr val="accent1"/>
+                </a:effectRef>
+                <a:fontRef idx="minor">
+                  <a:schemeClr val="lt1"/>
+                </a:fontRef>
+              </p:style>
+              <p:txBody>
+                <a:bodyPr rtlCol="0" anchor="ctr"/>
+                <a:lstStyle/>
+                <a:p>
+                  <a:pPr algn="ctr"/>
+                  <a:endParaRPr lang="de-DE"/>
+                </a:p>
+              </p:txBody>
+            </p:sp>
+            <p:sp>
+              <p:nvSpPr>
+                <p:cNvPr id="55" name="Rechteck 54">
+                  <a:extLst>
+                    <a:ext uri="{FF2B5EF4-FFF2-40B4-BE49-F238E27FC236}">
+                      <a16:creationId xmlns:a16="http://schemas.microsoft.com/office/drawing/2014/main" id="{477EC3A0-CA93-676A-2830-B94BEE821A75}"/>
+                    </a:ext>
+                  </a:extLst>
+                </p:cNvPr>
+                <p:cNvSpPr/>
+                <p:nvPr/>
+              </p:nvSpPr>
+              <p:spPr>
+                <a:xfrm>
+                  <a:off x="1572639" y="3257603"/>
+                  <a:ext cx="2736000" cy="2239861"/>
+                </a:xfrm>
+                <a:prstGeom prst="rect">
+                  <a:avLst/>
+                </a:prstGeom>
+                <a:solidFill>
+                  <a:schemeClr val="bg1"/>
+                </a:solidFill>
+                <a:ln>
+                  <a:noFill/>
+                </a:ln>
+              </p:spPr>
+              <p:style>
+                <a:lnRef idx="2">
+                  <a:schemeClr val="accent1">
+                    <a:shade val="50000"/>
+                  </a:schemeClr>
+                </a:lnRef>
+                <a:fillRef idx="1">
+                  <a:schemeClr val="accent1"/>
+                </a:fillRef>
+                <a:effectRef idx="0">
+                  <a:schemeClr val="accent1"/>
+                </a:effectRef>
+                <a:fontRef idx="minor">
+                  <a:schemeClr val="lt1"/>
+                </a:fontRef>
+              </p:style>
+              <p:txBody>
+                <a:bodyPr rtlCol="0" anchor="ctr"/>
+                <a:lstStyle/>
+                <a:p>
+                  <a:pPr algn="ctr"/>
+                  <a:endParaRPr lang="de-DE"/>
+                </a:p>
+              </p:txBody>
+            </p:sp>
+          </p:grpSp>
+          <p:sp>
+            <p:nvSpPr>
+              <p:cNvPr id="53" name="Rechteck 52">
+                <a:extLst>
+                  <a:ext uri="{FF2B5EF4-FFF2-40B4-BE49-F238E27FC236}">
+                    <a16:creationId xmlns:a16="http://schemas.microsoft.com/office/drawing/2014/main" id="{9A4FEBD7-B8B0-3DD9-FE03-654B4E238C94}"/>
+                  </a:ext>
+                </a:extLst>
+              </p:cNvPr>
+              <p:cNvSpPr/>
+              <p:nvPr/>
+            </p:nvSpPr>
+            <p:spPr>
+              <a:xfrm>
+                <a:off x="5674566" y="1374081"/>
+                <a:ext cx="841167" cy="785729"/>
+              </a:xfrm>
+              <a:prstGeom prst="rect">
+                <a:avLst/>
+              </a:prstGeom>
+              <a:solidFill>
+                <a:schemeClr val="tx1"/>
+              </a:solidFill>
+              <a:ln>
+                <a:noFill/>
+              </a:ln>
+            </p:spPr>
+            <p:style>
+              <a:lnRef idx="2">
+                <a:schemeClr val="accent1">
+                  <a:shade val="50000"/>
+                </a:schemeClr>
+              </a:lnRef>
+              <a:fillRef idx="1">
+                <a:schemeClr val="accent1"/>
+              </a:fillRef>
+              <a:effectRef idx="0">
+                <a:schemeClr val="accent1"/>
+              </a:effectRef>
+              <a:fontRef idx="minor">
+                <a:schemeClr val="lt1"/>
+              </a:fontRef>
+            </p:style>
+            <p:txBody>
+              <a:bodyPr rtlCol="0" anchor="ctr"/>
+              <a:lstStyle/>
+              <a:p>
+                <a:pPr algn="ctr"/>
+                <a:endParaRPr lang="de-DE"/>
+              </a:p>
+            </p:txBody>
+          </p:sp>
+        </p:grpSp>
+      </p:grpSp>
+    </p:spTree>
+    <p:extLst>
+      <p:ext uri="{BB962C8B-B14F-4D97-AF65-F5344CB8AC3E}">
+        <p14:creationId xmlns:p14="http://schemas.microsoft.com/office/powerpoint/2010/main" val="894167890"/>
+      </p:ext>
+    </p:extLst>
+  </p:cSld>
+  <p:clrMapOvr>
+    <a:masterClrMapping/>
+  </p:clrMapOvr>
+</p:sld>
+</file>
+
+<file path=ppt/slides/slide14.xml><?xml version="1.0" encoding="utf-8"?>
+<p:sld xmlns:a="http://schemas.openxmlformats.org/drawingml/2006/main" xmlns:r="http://schemas.openxmlformats.org/officeDocument/2006/relationships" xmlns:p="http://schemas.openxmlformats.org/presentationml/2006/main">
+  <p:cSld>
+    <p:spTree>
+      <p:nvGrpSpPr>
+        <p:cNvPr id="1" name=""/>
+        <p:cNvGrpSpPr/>
+        <p:nvPr/>
+      </p:nvGrpSpPr>
+      <p:grpSpPr>
+        <a:xfrm>
+          <a:off x="0" y="0"/>
+          <a:ext cx="0" cy="0"/>
+          <a:chOff x="0" y="0"/>
+          <a:chExt cx="0" cy="0"/>
+        </a:xfrm>
+      </p:grpSpPr>
+      <p:sp>
+        <p:nvSpPr>
+          <p:cNvPr id="4" name="Rechteck 3">
+            <a:extLst>
+              <a:ext uri="{FF2B5EF4-FFF2-40B4-BE49-F238E27FC236}">
+                <a16:creationId xmlns:a16="http://schemas.microsoft.com/office/drawing/2014/main" id="{53B29310-E107-4D43-E7B4-3ECDCBB4E2D1}"/>
+              </a:ext>
+            </a:extLst>
+          </p:cNvPr>
+          <p:cNvSpPr/>
+          <p:nvPr/>
+        </p:nvSpPr>
+        <p:spPr>
+          <a:xfrm>
+            <a:off x="326571" y="699796"/>
+            <a:ext cx="4926563" cy="4926563"/>
+          </a:xfrm>
+          <a:prstGeom prst="rect">
+            <a:avLst/>
+          </a:prstGeom>
+          <a:noFill/>
+          <a:ln>
+            <a:noFill/>
+          </a:ln>
+        </p:spPr>
+        <p:style>
+          <a:lnRef idx="2">
+            <a:schemeClr val="accent1">
+              <a:shade val="50000"/>
+            </a:schemeClr>
+          </a:lnRef>
+          <a:fillRef idx="1">
+            <a:schemeClr val="accent1"/>
+          </a:fillRef>
+          <a:effectRef idx="0">
+            <a:schemeClr val="accent1"/>
+          </a:effectRef>
+          <a:fontRef idx="minor">
+            <a:schemeClr val="lt1"/>
+          </a:fontRef>
+        </p:style>
+        <p:txBody>
+          <a:bodyPr rtlCol="0" anchor="ctr"/>
+          <a:lstStyle/>
+          <a:p>
+            <a:pPr algn="ctr"/>
+            <a:r>
+              <a:rPr lang="de-DE" dirty="0"/>
+              <a:t>v</a:t>
+            </a:r>
+          </a:p>
+        </p:txBody>
+      </p:sp>
+      <p:sp>
+        <p:nvSpPr>
+          <p:cNvPr id="5" name="Rechteck 4">
+            <a:extLst>
+              <a:ext uri="{FF2B5EF4-FFF2-40B4-BE49-F238E27FC236}">
+                <a16:creationId xmlns:a16="http://schemas.microsoft.com/office/drawing/2014/main" id="{A8E278A7-0B2E-D86E-B2E3-6C6177DED7F0}"/>
+              </a:ext>
+            </a:extLst>
+          </p:cNvPr>
+          <p:cNvSpPr/>
+          <p:nvPr/>
+        </p:nvSpPr>
+        <p:spPr>
+          <a:xfrm>
+            <a:off x="326572" y="2666217"/>
+            <a:ext cx="4926562" cy="331240"/>
+          </a:xfrm>
+          <a:prstGeom prst="rect">
+            <a:avLst/>
+          </a:prstGeom>
+          <a:ln>
+            <a:solidFill>
+              <a:schemeClr val="accent1">
+                <a:shade val="50000"/>
+              </a:schemeClr>
+            </a:solidFill>
+          </a:ln>
+        </p:spPr>
+        <p:style>
+          <a:lnRef idx="2">
+            <a:schemeClr val="accent1">
+              <a:shade val="50000"/>
+            </a:schemeClr>
+          </a:lnRef>
+          <a:fillRef idx="1">
+            <a:schemeClr val="accent1"/>
+          </a:fillRef>
+          <a:effectRef idx="0">
+            <a:schemeClr val="accent1"/>
+          </a:effectRef>
+          <a:fontRef idx="minor">
+            <a:schemeClr val="lt1"/>
+          </a:fontRef>
+        </p:style>
+        <p:txBody>
+          <a:bodyPr rtlCol="0" anchor="ctr"/>
+          <a:lstStyle/>
+          <a:p>
+            <a:pPr algn="ctr"/>
+            <a:endParaRPr lang="de-DE"/>
+          </a:p>
+        </p:txBody>
+      </p:sp>
+      <p:sp>
+        <p:nvSpPr>
+          <p:cNvPr id="22" name="Rechteck 21">
+            <a:extLst>
+              <a:ext uri="{FF2B5EF4-FFF2-40B4-BE49-F238E27FC236}">
+                <a16:creationId xmlns:a16="http://schemas.microsoft.com/office/drawing/2014/main" id="{3E5F5EA3-21BA-D840-A318-4DA4AC37F92C}"/>
+              </a:ext>
+            </a:extLst>
+          </p:cNvPr>
+          <p:cNvSpPr/>
+          <p:nvPr/>
+        </p:nvSpPr>
+        <p:spPr>
+          <a:xfrm>
+            <a:off x="326572" y="3328697"/>
+            <a:ext cx="4926562" cy="331240"/>
+          </a:xfrm>
+          <a:prstGeom prst="rect">
+            <a:avLst/>
+          </a:prstGeom>
+          <a:ln>
+            <a:solidFill>
+              <a:schemeClr val="accent1">
+                <a:shade val="50000"/>
+              </a:schemeClr>
+            </a:solidFill>
+          </a:ln>
+        </p:spPr>
+        <p:style>
+          <a:lnRef idx="2">
+            <a:schemeClr val="accent1">
+              <a:shade val="50000"/>
+            </a:schemeClr>
+          </a:lnRef>
+          <a:fillRef idx="1">
+            <a:schemeClr val="accent1"/>
+          </a:fillRef>
+          <a:effectRef idx="0">
+            <a:schemeClr val="accent1"/>
+          </a:effectRef>
+          <a:fontRef idx="minor">
+            <a:schemeClr val="lt1"/>
+          </a:fontRef>
+        </p:style>
+        <p:txBody>
+          <a:bodyPr rtlCol="0" anchor="ctr"/>
+          <a:lstStyle/>
+          <a:p>
+            <a:pPr algn="ctr"/>
+            <a:endParaRPr lang="de-DE"/>
+          </a:p>
+        </p:txBody>
+      </p:sp>
+      <p:sp>
+        <p:nvSpPr>
+          <p:cNvPr id="25" name="Rechteck 24">
+            <a:extLst>
+              <a:ext uri="{FF2B5EF4-FFF2-40B4-BE49-F238E27FC236}">
+                <a16:creationId xmlns:a16="http://schemas.microsoft.com/office/drawing/2014/main" id="{2FF60366-5F5F-C0CF-ECD0-9018C78BF1D4}"/>
+              </a:ext>
+            </a:extLst>
+          </p:cNvPr>
+          <p:cNvSpPr/>
+          <p:nvPr/>
+        </p:nvSpPr>
+        <p:spPr>
+          <a:xfrm>
+            <a:off x="6375918" y="699796"/>
+            <a:ext cx="4926563" cy="4926563"/>
+          </a:xfrm>
+          <a:prstGeom prst="rect">
+            <a:avLst/>
+          </a:prstGeom>
+          <a:noFill/>
+          <a:ln>
+            <a:noFill/>
+          </a:ln>
+        </p:spPr>
+        <p:style>
+          <a:lnRef idx="2">
+            <a:schemeClr val="accent1">
+              <a:shade val="50000"/>
+            </a:schemeClr>
+          </a:lnRef>
+          <a:fillRef idx="1">
+            <a:schemeClr val="accent1"/>
+          </a:fillRef>
+          <a:effectRef idx="0">
+            <a:schemeClr val="accent1"/>
+          </a:effectRef>
+          <a:fontRef idx="minor">
+            <a:schemeClr val="lt1"/>
+          </a:fontRef>
+        </p:style>
+        <p:txBody>
+          <a:bodyPr rtlCol="0" anchor="ctr"/>
+          <a:lstStyle/>
+          <a:p>
+            <a:pPr algn="ctr"/>
+            <a:endParaRPr lang="de-DE" dirty="0"/>
+          </a:p>
+        </p:txBody>
+      </p:sp>
+      <p:sp>
+        <p:nvSpPr>
+          <p:cNvPr id="30" name="Rechteck 29">
+            <a:extLst>
+              <a:ext uri="{FF2B5EF4-FFF2-40B4-BE49-F238E27FC236}">
+                <a16:creationId xmlns:a16="http://schemas.microsoft.com/office/drawing/2014/main" id="{1A1962DF-41CE-1659-90CF-46A876AFF1E0}"/>
+              </a:ext>
+            </a:extLst>
+          </p:cNvPr>
+          <p:cNvSpPr/>
+          <p:nvPr/>
+        </p:nvSpPr>
+        <p:spPr>
+          <a:xfrm>
+            <a:off x="8342337" y="2666217"/>
+            <a:ext cx="2960144" cy="331240"/>
+          </a:xfrm>
+          <a:prstGeom prst="rect">
+            <a:avLst/>
+          </a:prstGeom>
+          <a:ln>
+            <a:noFill/>
+          </a:ln>
+        </p:spPr>
+        <p:style>
+          <a:lnRef idx="2">
+            <a:schemeClr val="accent1">
+              <a:shade val="50000"/>
+            </a:schemeClr>
+          </a:lnRef>
+          <a:fillRef idx="1">
+            <a:schemeClr val="accent1"/>
+          </a:fillRef>
+          <a:effectRef idx="0">
+            <a:schemeClr val="accent1"/>
+          </a:effectRef>
+          <a:fontRef idx="minor">
+            <a:schemeClr val="lt1"/>
+          </a:fontRef>
+        </p:style>
+        <p:txBody>
+          <a:bodyPr rtlCol="0" anchor="ctr"/>
+          <a:lstStyle/>
+          <a:p>
+            <a:pPr algn="ctr"/>
+            <a:endParaRPr lang="de-DE"/>
+          </a:p>
+        </p:txBody>
+      </p:sp>
+      <p:sp>
+        <p:nvSpPr>
+          <p:cNvPr id="31" name="Rechteck 30">
+            <a:extLst>
+              <a:ext uri="{FF2B5EF4-FFF2-40B4-BE49-F238E27FC236}">
+                <a16:creationId xmlns:a16="http://schemas.microsoft.com/office/drawing/2014/main" id="{75138D7C-32D3-ABC3-93D0-D26F9661C4E4}"/>
+              </a:ext>
+            </a:extLst>
+          </p:cNvPr>
+          <p:cNvSpPr/>
+          <p:nvPr/>
+        </p:nvSpPr>
+        <p:spPr>
+          <a:xfrm>
+            <a:off x="9004819" y="3328697"/>
+            <a:ext cx="2297661" cy="331240"/>
+          </a:xfrm>
+          <a:prstGeom prst="rect">
+            <a:avLst/>
+          </a:prstGeom>
+          <a:ln>
+            <a:noFill/>
+          </a:ln>
+        </p:spPr>
+        <p:style>
+          <a:lnRef idx="2">
+            <a:schemeClr val="accent1">
+              <a:shade val="50000"/>
+            </a:schemeClr>
+          </a:lnRef>
+          <a:fillRef idx="1">
+            <a:schemeClr val="accent1"/>
+          </a:fillRef>
+          <a:effectRef idx="0">
+            <a:schemeClr val="accent1"/>
+          </a:effectRef>
+          <a:fontRef idx="minor">
+            <a:schemeClr val="lt1"/>
+          </a:fontRef>
+        </p:style>
+        <p:txBody>
+          <a:bodyPr rtlCol="0" anchor="ctr"/>
+          <a:lstStyle/>
+          <a:p>
+            <a:pPr algn="ctr"/>
+            <a:endParaRPr lang="de-DE"/>
+          </a:p>
+        </p:txBody>
+      </p:sp>
+      <p:sp>
+        <p:nvSpPr>
+          <p:cNvPr id="32" name="Rechteck 31">
+            <a:extLst>
+              <a:ext uri="{FF2B5EF4-FFF2-40B4-BE49-F238E27FC236}">
+                <a16:creationId xmlns:a16="http://schemas.microsoft.com/office/drawing/2014/main" id="{FF127B9C-A436-ACD7-D590-670442C4286F}"/>
+              </a:ext>
+            </a:extLst>
+          </p:cNvPr>
+          <p:cNvSpPr/>
+          <p:nvPr/>
+        </p:nvSpPr>
+        <p:spPr>
+          <a:xfrm rot="5400000">
+            <a:off x="8021609" y="4311908"/>
+            <a:ext cx="2297662" cy="331240"/>
+          </a:xfrm>
+          <a:prstGeom prst="rect">
+            <a:avLst/>
+          </a:prstGeom>
+          <a:ln>
+            <a:noFill/>
+          </a:ln>
+        </p:spPr>
+        <p:style>
+          <a:lnRef idx="2">
+            <a:schemeClr val="accent1">
+              <a:shade val="50000"/>
+            </a:schemeClr>
+          </a:lnRef>
+          <a:fillRef idx="1">
+            <a:schemeClr val="accent1"/>
+          </a:fillRef>
+          <a:effectRef idx="0">
+            <a:schemeClr val="accent1"/>
+          </a:effectRef>
+          <a:fontRef idx="minor">
+            <a:schemeClr val="lt1"/>
+          </a:fontRef>
+        </p:style>
+        <p:txBody>
+          <a:bodyPr rtlCol="0" anchor="ctr"/>
+          <a:lstStyle/>
+          <a:p>
+            <a:pPr algn="ctr"/>
+            <a:endParaRPr lang="de-DE"/>
+          </a:p>
+        </p:txBody>
+      </p:sp>
+      <p:sp>
+        <p:nvSpPr>
+          <p:cNvPr id="34" name="Rechteck 33">
+            <a:extLst>
+              <a:ext uri="{FF2B5EF4-FFF2-40B4-BE49-F238E27FC236}">
+                <a16:creationId xmlns:a16="http://schemas.microsoft.com/office/drawing/2014/main" id="{29C1903A-F156-1984-2456-9661060A0EA8}"/>
+              </a:ext>
+            </a:extLst>
+          </p:cNvPr>
+          <p:cNvSpPr/>
+          <p:nvPr/>
+        </p:nvSpPr>
+        <p:spPr>
+          <a:xfrm rot="5400000">
+            <a:off x="7027888" y="3980670"/>
+            <a:ext cx="2960140" cy="331240"/>
+          </a:xfrm>
+          <a:prstGeom prst="rect">
+            <a:avLst/>
+          </a:prstGeom>
+          <a:ln>
+            <a:noFill/>
+          </a:ln>
+        </p:spPr>
+        <p:style>
+          <a:lnRef idx="2">
+            <a:schemeClr val="accent1">
+              <a:shade val="50000"/>
+            </a:schemeClr>
+          </a:lnRef>
+          <a:fillRef idx="1">
+            <a:schemeClr val="accent1"/>
+          </a:fillRef>
+          <a:effectRef idx="0">
+            <a:schemeClr val="accent1"/>
+          </a:effectRef>
+          <a:fontRef idx="minor">
+            <a:schemeClr val="lt1"/>
+          </a:fontRef>
+        </p:style>
+        <p:txBody>
+          <a:bodyPr rtlCol="0" anchor="ctr"/>
+          <a:lstStyle/>
+          <a:p>
+            <a:pPr algn="ctr"/>
+            <a:endParaRPr lang="de-DE"/>
+          </a:p>
+        </p:txBody>
+      </p:sp>
+    </p:spTree>
+    <p:extLst>
+      <p:ext uri="{BB962C8B-B14F-4D97-AF65-F5344CB8AC3E}">
+        <p14:creationId xmlns:p14="http://schemas.microsoft.com/office/powerpoint/2010/main" val="1768641629"/>
+      </p:ext>
+    </p:extLst>
+  </p:cSld>
+  <p:clrMapOvr>
+    <a:masterClrMapping/>
+  </p:clrMapOvr>
+</p:sld>
+</file>
+
 <file path=ppt/slides/slide2.xml><?xml version="1.0" encoding="utf-8"?>
 <p:sld xmlns:a="http://schemas.openxmlformats.org/drawingml/2006/main" xmlns:r="http://schemas.openxmlformats.org/officeDocument/2006/relationships" xmlns:p="http://schemas.openxmlformats.org/presentationml/2006/main">
   <p:cSld>

</xml_diff>

<commit_message>
Added textures for all wall types. The map was recreated with the correct type assigned for each wall.
</commit_message>
<xml_diff>
--- a/assets/textures.pptx
+++ b/assets/textures.pptx
@@ -19,6 +19,8 @@
     <p:sldId id="267" r:id="rId13"/>
     <p:sldId id="268" r:id="rId14"/>
     <p:sldId id="269" r:id="rId15"/>
+    <p:sldId id="270" r:id="rId16"/>
+    <p:sldId id="271" r:id="rId17"/>
   </p:sldIdLst>
   <p:sldSz cx="12192000" cy="6858000"/>
   <p:notesSz cx="6858000" cy="9144000"/>
@@ -272,7 +274,7 @@
           <a:p>
             <a:fld id="{08F585A2-760E-46F2-B064-85F0DFCDA2A3}" type="datetimeFigureOut">
               <a:rPr lang="de-DE" smtClean="0"/>
-              <a:t>30.06.2022</a:t>
+              <a:t>09.07.2022</a:t>
             </a:fld>
             <a:endParaRPr lang="de-DE"/>
           </a:p>
@@ -470,7 +472,7 @@
           <a:p>
             <a:fld id="{08F585A2-760E-46F2-B064-85F0DFCDA2A3}" type="datetimeFigureOut">
               <a:rPr lang="de-DE" smtClean="0"/>
-              <a:t>30.06.2022</a:t>
+              <a:t>09.07.2022</a:t>
             </a:fld>
             <a:endParaRPr lang="de-DE"/>
           </a:p>
@@ -678,7 +680,7 @@
           <a:p>
             <a:fld id="{08F585A2-760E-46F2-B064-85F0DFCDA2A3}" type="datetimeFigureOut">
               <a:rPr lang="de-DE" smtClean="0"/>
-              <a:t>30.06.2022</a:t>
+              <a:t>09.07.2022</a:t>
             </a:fld>
             <a:endParaRPr lang="de-DE"/>
           </a:p>
@@ -876,7 +878,7 @@
           <a:p>
             <a:fld id="{08F585A2-760E-46F2-B064-85F0DFCDA2A3}" type="datetimeFigureOut">
               <a:rPr lang="de-DE" smtClean="0"/>
-              <a:t>30.06.2022</a:t>
+              <a:t>09.07.2022</a:t>
             </a:fld>
             <a:endParaRPr lang="de-DE"/>
           </a:p>
@@ -1151,7 +1153,7 @@
           <a:p>
             <a:fld id="{08F585A2-760E-46F2-B064-85F0DFCDA2A3}" type="datetimeFigureOut">
               <a:rPr lang="de-DE" smtClean="0"/>
-              <a:t>30.06.2022</a:t>
+              <a:t>09.07.2022</a:t>
             </a:fld>
             <a:endParaRPr lang="de-DE"/>
           </a:p>
@@ -1416,7 +1418,7 @@
           <a:p>
             <a:fld id="{08F585A2-760E-46F2-B064-85F0DFCDA2A3}" type="datetimeFigureOut">
               <a:rPr lang="de-DE" smtClean="0"/>
-              <a:t>30.06.2022</a:t>
+              <a:t>09.07.2022</a:t>
             </a:fld>
             <a:endParaRPr lang="de-DE"/>
           </a:p>
@@ -1828,7 +1830,7 @@
           <a:p>
             <a:fld id="{08F585A2-760E-46F2-B064-85F0DFCDA2A3}" type="datetimeFigureOut">
               <a:rPr lang="de-DE" smtClean="0"/>
-              <a:t>30.06.2022</a:t>
+              <a:t>09.07.2022</a:t>
             </a:fld>
             <a:endParaRPr lang="de-DE"/>
           </a:p>
@@ -1969,7 +1971,7 @@
           <a:p>
             <a:fld id="{08F585A2-760E-46F2-B064-85F0DFCDA2A3}" type="datetimeFigureOut">
               <a:rPr lang="de-DE" smtClean="0"/>
-              <a:t>30.06.2022</a:t>
+              <a:t>09.07.2022</a:t>
             </a:fld>
             <a:endParaRPr lang="de-DE"/>
           </a:p>
@@ -2082,7 +2084,7 @@
           <a:p>
             <a:fld id="{08F585A2-760E-46F2-B064-85F0DFCDA2A3}" type="datetimeFigureOut">
               <a:rPr lang="de-DE" smtClean="0"/>
-              <a:t>30.06.2022</a:t>
+              <a:t>09.07.2022</a:t>
             </a:fld>
             <a:endParaRPr lang="de-DE"/>
           </a:p>
@@ -2393,7 +2395,7 @@
           <a:p>
             <a:fld id="{08F585A2-760E-46F2-B064-85F0DFCDA2A3}" type="datetimeFigureOut">
               <a:rPr lang="de-DE" smtClean="0"/>
-              <a:t>30.06.2022</a:t>
+              <a:t>09.07.2022</a:t>
             </a:fld>
             <a:endParaRPr lang="de-DE"/>
           </a:p>
@@ -2681,7 +2683,7 @@
           <a:p>
             <a:fld id="{08F585A2-760E-46F2-B064-85F0DFCDA2A3}" type="datetimeFigureOut">
               <a:rPr lang="de-DE" smtClean="0"/>
-              <a:t>30.06.2022</a:t>
+              <a:t>09.07.2022</a:t>
             </a:fld>
             <a:endParaRPr lang="de-DE"/>
           </a:p>
@@ -2922,7 +2924,7 @@
           <a:p>
             <a:fld id="{08F585A2-760E-46F2-B064-85F0DFCDA2A3}" type="datetimeFigureOut">
               <a:rPr lang="de-DE" smtClean="0"/>
-              <a:t>30.06.2022</a:t>
+              <a:t>09.07.2022</a:t>
             </a:fld>
             <a:endParaRPr lang="de-DE"/>
           </a:p>
@@ -12231,165 +12233,6 @@
       </p:grpSpPr>
       <p:sp>
         <p:nvSpPr>
-          <p:cNvPr id="4" name="Rechteck 3">
-            <a:extLst>
-              <a:ext uri="{FF2B5EF4-FFF2-40B4-BE49-F238E27FC236}">
-                <a16:creationId xmlns:a16="http://schemas.microsoft.com/office/drawing/2014/main" id="{53B29310-E107-4D43-E7B4-3ECDCBB4E2D1}"/>
-              </a:ext>
-            </a:extLst>
-          </p:cNvPr>
-          <p:cNvSpPr/>
-          <p:nvPr/>
-        </p:nvSpPr>
-        <p:spPr>
-          <a:xfrm>
-            <a:off x="326571" y="699796"/>
-            <a:ext cx="4926563" cy="4926563"/>
-          </a:xfrm>
-          <a:prstGeom prst="rect">
-            <a:avLst/>
-          </a:prstGeom>
-          <a:noFill/>
-          <a:ln>
-            <a:noFill/>
-          </a:ln>
-        </p:spPr>
-        <p:style>
-          <a:lnRef idx="2">
-            <a:schemeClr val="accent1">
-              <a:shade val="50000"/>
-            </a:schemeClr>
-          </a:lnRef>
-          <a:fillRef idx="1">
-            <a:schemeClr val="accent1"/>
-          </a:fillRef>
-          <a:effectRef idx="0">
-            <a:schemeClr val="accent1"/>
-          </a:effectRef>
-          <a:fontRef idx="minor">
-            <a:schemeClr val="lt1"/>
-          </a:fontRef>
-        </p:style>
-        <p:txBody>
-          <a:bodyPr rtlCol="0" anchor="ctr"/>
-          <a:lstStyle/>
-          <a:p>
-            <a:pPr algn="ctr"/>
-            <a:r>
-              <a:rPr lang="de-DE" dirty="0"/>
-              <a:t>v</a:t>
-            </a:r>
-          </a:p>
-        </p:txBody>
-      </p:sp>
-      <p:sp>
-        <p:nvSpPr>
-          <p:cNvPr id="5" name="Rechteck 4">
-            <a:extLst>
-              <a:ext uri="{FF2B5EF4-FFF2-40B4-BE49-F238E27FC236}">
-                <a16:creationId xmlns:a16="http://schemas.microsoft.com/office/drawing/2014/main" id="{A8E278A7-0B2E-D86E-B2E3-6C6177DED7F0}"/>
-              </a:ext>
-            </a:extLst>
-          </p:cNvPr>
-          <p:cNvSpPr/>
-          <p:nvPr/>
-        </p:nvSpPr>
-        <p:spPr>
-          <a:xfrm>
-            <a:off x="326572" y="2666217"/>
-            <a:ext cx="4926562" cy="331240"/>
-          </a:xfrm>
-          <a:prstGeom prst="rect">
-            <a:avLst/>
-          </a:prstGeom>
-          <a:ln>
-            <a:solidFill>
-              <a:schemeClr val="accent1">
-                <a:shade val="50000"/>
-              </a:schemeClr>
-            </a:solidFill>
-          </a:ln>
-        </p:spPr>
-        <p:style>
-          <a:lnRef idx="2">
-            <a:schemeClr val="accent1">
-              <a:shade val="50000"/>
-            </a:schemeClr>
-          </a:lnRef>
-          <a:fillRef idx="1">
-            <a:schemeClr val="accent1"/>
-          </a:fillRef>
-          <a:effectRef idx="0">
-            <a:schemeClr val="accent1"/>
-          </a:effectRef>
-          <a:fontRef idx="minor">
-            <a:schemeClr val="lt1"/>
-          </a:fontRef>
-        </p:style>
-        <p:txBody>
-          <a:bodyPr rtlCol="0" anchor="ctr"/>
-          <a:lstStyle/>
-          <a:p>
-            <a:pPr algn="ctr"/>
-            <a:endParaRPr lang="de-DE"/>
-          </a:p>
-        </p:txBody>
-      </p:sp>
-      <p:sp>
-        <p:nvSpPr>
-          <p:cNvPr id="22" name="Rechteck 21">
-            <a:extLst>
-              <a:ext uri="{FF2B5EF4-FFF2-40B4-BE49-F238E27FC236}">
-                <a16:creationId xmlns:a16="http://schemas.microsoft.com/office/drawing/2014/main" id="{3E5F5EA3-21BA-D840-A318-4DA4AC37F92C}"/>
-              </a:ext>
-            </a:extLst>
-          </p:cNvPr>
-          <p:cNvSpPr/>
-          <p:nvPr/>
-        </p:nvSpPr>
-        <p:spPr>
-          <a:xfrm>
-            <a:off x="326572" y="3328697"/>
-            <a:ext cx="4926562" cy="331240"/>
-          </a:xfrm>
-          <a:prstGeom prst="rect">
-            <a:avLst/>
-          </a:prstGeom>
-          <a:ln>
-            <a:solidFill>
-              <a:schemeClr val="accent1">
-                <a:shade val="50000"/>
-              </a:schemeClr>
-            </a:solidFill>
-          </a:ln>
-        </p:spPr>
-        <p:style>
-          <a:lnRef idx="2">
-            <a:schemeClr val="accent1">
-              <a:shade val="50000"/>
-            </a:schemeClr>
-          </a:lnRef>
-          <a:fillRef idx="1">
-            <a:schemeClr val="accent1"/>
-          </a:fillRef>
-          <a:effectRef idx="0">
-            <a:schemeClr val="accent1"/>
-          </a:effectRef>
-          <a:fontRef idx="minor">
-            <a:schemeClr val="lt1"/>
-          </a:fontRef>
-        </p:style>
-        <p:txBody>
-          <a:bodyPr rtlCol="0" anchor="ctr"/>
-          <a:lstStyle/>
-          <a:p>
-            <a:pPr algn="ctr"/>
-            <a:endParaRPr lang="de-DE"/>
-          </a:p>
-        </p:txBody>
-      </p:sp>
-      <p:sp>
-        <p:nvSpPr>
           <p:cNvPr id="25" name="Rechteck 24">
             <a:extLst>
               <a:ext uri="{FF2B5EF4-FFF2-40B4-BE49-F238E27FC236}">
@@ -12440,10 +12283,10 @@
       </p:sp>
       <p:sp>
         <p:nvSpPr>
-          <p:cNvPr id="30" name="Rechteck 29">
+          <p:cNvPr id="14" name="Rechteck 13">
             <a:extLst>
               <a:ext uri="{FF2B5EF4-FFF2-40B4-BE49-F238E27FC236}">
-                <a16:creationId xmlns:a16="http://schemas.microsoft.com/office/drawing/2014/main" id="{1A1962DF-41CE-1659-90CF-46A876AFF1E0}"/>
+                <a16:creationId xmlns:a16="http://schemas.microsoft.com/office/drawing/2014/main" id="{9DC9EBAF-F570-3468-0463-4D119E7F990F}"/>
               </a:ext>
             </a:extLst>
           </p:cNvPr>
@@ -12452,8 +12295,8 @@
         </p:nvSpPr>
         <p:spPr>
           <a:xfrm>
-            <a:off x="8342337" y="2666217"/>
-            <a:ext cx="2960144" cy="331240"/>
+            <a:off x="7967956" y="2291835"/>
+            <a:ext cx="3334524" cy="580828"/>
           </a:xfrm>
           <a:prstGeom prst="rect">
             <a:avLst/>
@@ -12489,10 +12332,10 @@
       </p:sp>
       <p:sp>
         <p:nvSpPr>
-          <p:cNvPr id="31" name="Rechteck 30">
+          <p:cNvPr id="15" name="Rechteck 14">
             <a:extLst>
               <a:ext uri="{FF2B5EF4-FFF2-40B4-BE49-F238E27FC236}">
-                <a16:creationId xmlns:a16="http://schemas.microsoft.com/office/drawing/2014/main" id="{75138D7C-32D3-ABC3-93D0-D26F9661C4E4}"/>
+                <a16:creationId xmlns:a16="http://schemas.microsoft.com/office/drawing/2014/main" id="{2C7AD8B9-6DFB-6453-91E4-EB5EA532E655}"/>
               </a:ext>
             </a:extLst>
           </p:cNvPr>
@@ -12501,8 +12344,8 @@
         </p:nvSpPr>
         <p:spPr>
           <a:xfrm>
-            <a:off x="9004819" y="3328697"/>
-            <a:ext cx="2297661" cy="331240"/>
+            <a:off x="9129612" y="3446498"/>
+            <a:ext cx="2172868" cy="580828"/>
           </a:xfrm>
           <a:prstGeom prst="rect">
             <a:avLst/>
@@ -12538,10 +12381,10 @@
       </p:sp>
       <p:sp>
         <p:nvSpPr>
-          <p:cNvPr id="32" name="Rechteck 31">
+          <p:cNvPr id="17" name="Rechteck 16">
             <a:extLst>
               <a:ext uri="{FF2B5EF4-FFF2-40B4-BE49-F238E27FC236}">
-                <a16:creationId xmlns:a16="http://schemas.microsoft.com/office/drawing/2014/main" id="{FF127B9C-A436-ACD7-D590-670442C4286F}"/>
+                <a16:creationId xmlns:a16="http://schemas.microsoft.com/office/drawing/2014/main" id="{99B35FC3-15CD-8F50-DDB5-E9E1CEBCFAD5}"/>
               </a:ext>
             </a:extLst>
           </p:cNvPr>
@@ -12550,8 +12393,8 @@
         </p:nvSpPr>
         <p:spPr>
           <a:xfrm rot="5400000">
-            <a:off x="8021609" y="4311908"/>
-            <a:ext cx="2297662" cy="331240"/>
+            <a:off x="8330096" y="4246014"/>
+            <a:ext cx="2179861" cy="580828"/>
           </a:xfrm>
           <a:prstGeom prst="rect">
             <a:avLst/>
@@ -12587,10 +12430,10 @@
       </p:sp>
       <p:sp>
         <p:nvSpPr>
-          <p:cNvPr id="34" name="Rechteck 33">
+          <p:cNvPr id="18" name="Rechteck 17">
             <a:extLst>
               <a:ext uri="{FF2B5EF4-FFF2-40B4-BE49-F238E27FC236}">
-                <a16:creationId xmlns:a16="http://schemas.microsoft.com/office/drawing/2014/main" id="{29C1903A-F156-1984-2456-9661060A0EA8}"/>
+                <a16:creationId xmlns:a16="http://schemas.microsoft.com/office/drawing/2014/main" id="{4A81A532-8DCA-9034-7943-77F0D5991FBB}"/>
               </a:ext>
             </a:extLst>
           </p:cNvPr>
@@ -12599,8 +12442,159 @@
         </p:nvSpPr>
         <p:spPr>
           <a:xfrm rot="5400000">
-            <a:off x="7027888" y="3980670"/>
-            <a:ext cx="2960140" cy="331240"/>
+            <a:off x="6591108" y="3668683"/>
+            <a:ext cx="3334524" cy="580828"/>
+          </a:xfrm>
+          <a:prstGeom prst="rect">
+            <a:avLst/>
+          </a:prstGeom>
+          <a:ln>
+            <a:noFill/>
+          </a:ln>
+        </p:spPr>
+        <p:style>
+          <a:lnRef idx="2">
+            <a:schemeClr val="accent1">
+              <a:shade val="50000"/>
+            </a:schemeClr>
+          </a:lnRef>
+          <a:fillRef idx="1">
+            <a:schemeClr val="accent1"/>
+          </a:fillRef>
+          <a:effectRef idx="0">
+            <a:schemeClr val="accent1"/>
+          </a:effectRef>
+          <a:fontRef idx="minor">
+            <a:schemeClr val="lt1"/>
+          </a:fontRef>
+        </p:style>
+        <p:txBody>
+          <a:bodyPr rtlCol="0" anchor="ctr"/>
+          <a:lstStyle/>
+          <a:p>
+            <a:pPr algn="ctr"/>
+            <a:endParaRPr lang="de-DE"/>
+          </a:p>
+        </p:txBody>
+      </p:sp>
+      <p:sp>
+        <p:nvSpPr>
+          <p:cNvPr id="20" name="Rechteck 19">
+            <a:extLst>
+              <a:ext uri="{FF2B5EF4-FFF2-40B4-BE49-F238E27FC236}">
+                <a16:creationId xmlns:a16="http://schemas.microsoft.com/office/drawing/2014/main" id="{6254F03C-FB49-315C-785A-0EC9E5EE360F}"/>
+              </a:ext>
+            </a:extLst>
+          </p:cNvPr>
+          <p:cNvSpPr/>
+          <p:nvPr/>
+        </p:nvSpPr>
+        <p:spPr>
+          <a:xfrm>
+            <a:off x="326571" y="699796"/>
+            <a:ext cx="4926563" cy="4926563"/>
+          </a:xfrm>
+          <a:prstGeom prst="rect">
+            <a:avLst/>
+          </a:prstGeom>
+          <a:noFill/>
+          <a:ln>
+            <a:noFill/>
+          </a:ln>
+        </p:spPr>
+        <p:style>
+          <a:lnRef idx="2">
+            <a:schemeClr val="accent1">
+              <a:shade val="50000"/>
+            </a:schemeClr>
+          </a:lnRef>
+          <a:fillRef idx="1">
+            <a:schemeClr val="accent1"/>
+          </a:fillRef>
+          <a:effectRef idx="0">
+            <a:schemeClr val="accent1"/>
+          </a:effectRef>
+          <a:fontRef idx="minor">
+            <a:schemeClr val="lt1"/>
+          </a:fontRef>
+        </p:style>
+        <p:txBody>
+          <a:bodyPr rtlCol="0" anchor="ctr"/>
+          <a:lstStyle/>
+          <a:p>
+            <a:pPr algn="ctr"/>
+            <a:r>
+              <a:rPr lang="de-DE" dirty="0"/>
+              <a:t>v</a:t>
+            </a:r>
+          </a:p>
+        </p:txBody>
+      </p:sp>
+      <p:sp>
+        <p:nvSpPr>
+          <p:cNvPr id="21" name="Rechteck 20">
+            <a:extLst>
+              <a:ext uri="{FF2B5EF4-FFF2-40B4-BE49-F238E27FC236}">
+                <a16:creationId xmlns:a16="http://schemas.microsoft.com/office/drawing/2014/main" id="{35527EEB-14DE-57E8-514C-30A397DB9661}"/>
+              </a:ext>
+            </a:extLst>
+          </p:cNvPr>
+          <p:cNvSpPr/>
+          <p:nvPr/>
+        </p:nvSpPr>
+        <p:spPr>
+          <a:xfrm>
+            <a:off x="326572" y="2291835"/>
+            <a:ext cx="4926562" cy="580828"/>
+          </a:xfrm>
+          <a:prstGeom prst="rect">
+            <a:avLst/>
+          </a:prstGeom>
+          <a:ln>
+            <a:noFill/>
+          </a:ln>
+        </p:spPr>
+        <p:style>
+          <a:lnRef idx="2">
+            <a:schemeClr val="accent1">
+              <a:shade val="50000"/>
+            </a:schemeClr>
+          </a:lnRef>
+          <a:fillRef idx="1">
+            <a:schemeClr val="accent1"/>
+          </a:fillRef>
+          <a:effectRef idx="0">
+            <a:schemeClr val="accent1"/>
+          </a:effectRef>
+          <a:fontRef idx="minor">
+            <a:schemeClr val="lt1"/>
+          </a:fontRef>
+        </p:style>
+        <p:txBody>
+          <a:bodyPr rtlCol="0" anchor="ctr"/>
+          <a:lstStyle/>
+          <a:p>
+            <a:pPr algn="ctr"/>
+            <a:endParaRPr lang="de-DE"/>
+          </a:p>
+        </p:txBody>
+      </p:sp>
+      <p:sp>
+        <p:nvSpPr>
+          <p:cNvPr id="23" name="Rechteck 22">
+            <a:extLst>
+              <a:ext uri="{FF2B5EF4-FFF2-40B4-BE49-F238E27FC236}">
+                <a16:creationId xmlns:a16="http://schemas.microsoft.com/office/drawing/2014/main" id="{F39EBF7E-2302-3183-9250-D0DB7B9F96AE}"/>
+              </a:ext>
+            </a:extLst>
+          </p:cNvPr>
+          <p:cNvSpPr/>
+          <p:nvPr/>
+        </p:nvSpPr>
+        <p:spPr>
+          <a:xfrm>
+            <a:off x="326570" y="3454655"/>
+            <a:ext cx="4926562" cy="580828"/>
           </a:xfrm>
           <a:prstGeom prst="rect">
             <a:avLst/>
@@ -12638,6 +12632,811 @@
     <p:extLst>
       <p:ext uri="{BB962C8B-B14F-4D97-AF65-F5344CB8AC3E}">
         <p14:creationId xmlns:p14="http://schemas.microsoft.com/office/powerpoint/2010/main" val="1768641629"/>
+      </p:ext>
+    </p:extLst>
+  </p:cSld>
+  <p:clrMapOvr>
+    <a:masterClrMapping/>
+  </p:clrMapOvr>
+</p:sld>
+</file>
+
+<file path=ppt/slides/slide15.xml><?xml version="1.0" encoding="utf-8"?>
+<p:sld xmlns:a="http://schemas.openxmlformats.org/drawingml/2006/main" xmlns:r="http://schemas.openxmlformats.org/officeDocument/2006/relationships" xmlns:p="http://schemas.openxmlformats.org/presentationml/2006/main">
+  <p:cSld>
+    <p:spTree>
+      <p:nvGrpSpPr>
+        <p:cNvPr id="1" name=""/>
+        <p:cNvGrpSpPr/>
+        <p:nvPr/>
+      </p:nvGrpSpPr>
+      <p:grpSpPr>
+        <a:xfrm>
+          <a:off x="0" y="0"/>
+          <a:ext cx="0" cy="0"/>
+          <a:chOff x="0" y="0"/>
+          <a:chExt cx="0" cy="0"/>
+        </a:xfrm>
+      </p:grpSpPr>
+      <p:sp>
+        <p:nvSpPr>
+          <p:cNvPr id="19" name="Rechteck 18">
+            <a:extLst>
+              <a:ext uri="{FF2B5EF4-FFF2-40B4-BE49-F238E27FC236}">
+                <a16:creationId xmlns:a16="http://schemas.microsoft.com/office/drawing/2014/main" id="{61C15C3B-6176-6C6E-9A83-DF37B9FBD308}"/>
+              </a:ext>
+            </a:extLst>
+          </p:cNvPr>
+          <p:cNvSpPr/>
+          <p:nvPr/>
+        </p:nvSpPr>
+        <p:spPr>
+          <a:xfrm>
+            <a:off x="6375918" y="699796"/>
+            <a:ext cx="4926563" cy="4926563"/>
+          </a:xfrm>
+          <a:prstGeom prst="rect">
+            <a:avLst/>
+          </a:prstGeom>
+          <a:noFill/>
+          <a:ln>
+            <a:noFill/>
+          </a:ln>
+        </p:spPr>
+        <p:style>
+          <a:lnRef idx="2">
+            <a:schemeClr val="accent1">
+              <a:shade val="50000"/>
+            </a:schemeClr>
+          </a:lnRef>
+          <a:fillRef idx="1">
+            <a:schemeClr val="accent1"/>
+          </a:fillRef>
+          <a:effectRef idx="0">
+            <a:schemeClr val="accent1"/>
+          </a:effectRef>
+          <a:fontRef idx="minor">
+            <a:schemeClr val="lt1"/>
+          </a:fontRef>
+        </p:style>
+        <p:txBody>
+          <a:bodyPr rtlCol="0" anchor="ctr"/>
+          <a:lstStyle/>
+          <a:p>
+            <a:pPr algn="ctr"/>
+            <a:endParaRPr lang="de-DE" dirty="0"/>
+          </a:p>
+        </p:txBody>
+      </p:sp>
+      <p:sp>
+        <p:nvSpPr>
+          <p:cNvPr id="24" name="Rechteck 23">
+            <a:extLst>
+              <a:ext uri="{FF2B5EF4-FFF2-40B4-BE49-F238E27FC236}">
+                <a16:creationId xmlns:a16="http://schemas.microsoft.com/office/drawing/2014/main" id="{39FF530B-84D0-2536-1F06-DCD310F1B070}"/>
+              </a:ext>
+            </a:extLst>
+          </p:cNvPr>
+          <p:cNvSpPr/>
+          <p:nvPr/>
+        </p:nvSpPr>
+        <p:spPr>
+          <a:xfrm>
+            <a:off x="9709212" y="2872663"/>
+            <a:ext cx="1593267" cy="580828"/>
+          </a:xfrm>
+          <a:prstGeom prst="rect">
+            <a:avLst/>
+          </a:prstGeom>
+          <a:ln>
+            <a:noFill/>
+          </a:ln>
+        </p:spPr>
+        <p:style>
+          <a:lnRef idx="2">
+            <a:schemeClr val="accent1">
+              <a:shade val="50000"/>
+            </a:schemeClr>
+          </a:lnRef>
+          <a:fillRef idx="1">
+            <a:schemeClr val="accent1"/>
+          </a:fillRef>
+          <a:effectRef idx="0">
+            <a:schemeClr val="accent1"/>
+          </a:effectRef>
+          <a:fontRef idx="minor">
+            <a:schemeClr val="lt1"/>
+          </a:fontRef>
+        </p:style>
+        <p:txBody>
+          <a:bodyPr rtlCol="0" anchor="ctr"/>
+          <a:lstStyle/>
+          <a:p>
+            <a:pPr algn="ctr"/>
+            <a:endParaRPr lang="de-DE"/>
+          </a:p>
+        </p:txBody>
+      </p:sp>
+      <p:sp>
+        <p:nvSpPr>
+          <p:cNvPr id="26" name="Rechteck 25">
+            <a:extLst>
+              <a:ext uri="{FF2B5EF4-FFF2-40B4-BE49-F238E27FC236}">
+                <a16:creationId xmlns:a16="http://schemas.microsoft.com/office/drawing/2014/main" id="{5E337ABD-46FE-C555-8194-DE0C2FC10B72}"/>
+              </a:ext>
+            </a:extLst>
+          </p:cNvPr>
+          <p:cNvSpPr/>
+          <p:nvPr/>
+        </p:nvSpPr>
+        <p:spPr>
+          <a:xfrm rot="5400000">
+            <a:off x="8042565" y="4539310"/>
+            <a:ext cx="1593267" cy="580828"/>
+          </a:xfrm>
+          <a:prstGeom prst="rect">
+            <a:avLst/>
+          </a:prstGeom>
+          <a:ln>
+            <a:noFill/>
+          </a:ln>
+        </p:spPr>
+        <p:style>
+          <a:lnRef idx="2">
+            <a:schemeClr val="accent1">
+              <a:shade val="50000"/>
+            </a:schemeClr>
+          </a:lnRef>
+          <a:fillRef idx="1">
+            <a:schemeClr val="accent1"/>
+          </a:fillRef>
+          <a:effectRef idx="0">
+            <a:schemeClr val="accent1"/>
+          </a:effectRef>
+          <a:fontRef idx="minor">
+            <a:schemeClr val="lt1"/>
+          </a:fontRef>
+        </p:style>
+        <p:txBody>
+          <a:bodyPr rtlCol="0" anchor="ctr"/>
+          <a:lstStyle/>
+          <a:p>
+            <a:pPr algn="ctr"/>
+            <a:endParaRPr lang="de-DE"/>
+          </a:p>
+        </p:txBody>
+      </p:sp>
+      <p:sp>
+        <p:nvSpPr>
+          <p:cNvPr id="27" name="Rechteck 26">
+            <a:extLst>
+              <a:ext uri="{FF2B5EF4-FFF2-40B4-BE49-F238E27FC236}">
+                <a16:creationId xmlns:a16="http://schemas.microsoft.com/office/drawing/2014/main" id="{0255B518-2153-6E04-14A3-5A1AA13EE409}"/>
+              </a:ext>
+            </a:extLst>
+          </p:cNvPr>
+          <p:cNvSpPr/>
+          <p:nvPr/>
+        </p:nvSpPr>
+        <p:spPr>
+          <a:xfrm>
+            <a:off x="9129613" y="3453491"/>
+            <a:ext cx="579600" cy="579600"/>
+          </a:xfrm>
+          <a:prstGeom prst="rect">
+            <a:avLst/>
+          </a:prstGeom>
+          <a:ln>
+            <a:noFill/>
+          </a:ln>
+        </p:spPr>
+        <p:style>
+          <a:lnRef idx="2">
+            <a:schemeClr val="accent1">
+              <a:shade val="50000"/>
+            </a:schemeClr>
+          </a:lnRef>
+          <a:fillRef idx="1">
+            <a:schemeClr val="accent1"/>
+          </a:fillRef>
+          <a:effectRef idx="0">
+            <a:schemeClr val="accent1"/>
+          </a:effectRef>
+          <a:fontRef idx="minor">
+            <a:schemeClr val="lt1"/>
+          </a:fontRef>
+        </p:style>
+        <p:txBody>
+          <a:bodyPr rtlCol="0" anchor="ctr"/>
+          <a:lstStyle/>
+          <a:p>
+            <a:pPr algn="ctr"/>
+            <a:endParaRPr lang="de-DE"/>
+          </a:p>
+        </p:txBody>
+      </p:sp>
+      <p:sp>
+        <p:nvSpPr>
+          <p:cNvPr id="28" name="Rechteck 27">
+            <a:extLst>
+              <a:ext uri="{FF2B5EF4-FFF2-40B4-BE49-F238E27FC236}">
+                <a16:creationId xmlns:a16="http://schemas.microsoft.com/office/drawing/2014/main" id="{7FA61B2A-80BE-9559-4F49-322E7E0F39EB}"/>
+              </a:ext>
+            </a:extLst>
+          </p:cNvPr>
+          <p:cNvSpPr/>
+          <p:nvPr/>
+        </p:nvSpPr>
+        <p:spPr>
+          <a:xfrm>
+            <a:off x="326571" y="699796"/>
+            <a:ext cx="4926563" cy="4926563"/>
+          </a:xfrm>
+          <a:prstGeom prst="rect">
+            <a:avLst/>
+          </a:prstGeom>
+          <a:noFill/>
+          <a:ln>
+            <a:noFill/>
+          </a:ln>
+        </p:spPr>
+        <p:style>
+          <a:lnRef idx="2">
+            <a:schemeClr val="accent1">
+              <a:shade val="50000"/>
+            </a:schemeClr>
+          </a:lnRef>
+          <a:fillRef idx="1">
+            <a:schemeClr val="accent1"/>
+          </a:fillRef>
+          <a:effectRef idx="0">
+            <a:schemeClr val="accent1"/>
+          </a:effectRef>
+          <a:fontRef idx="minor">
+            <a:schemeClr val="lt1"/>
+          </a:fontRef>
+        </p:style>
+        <p:txBody>
+          <a:bodyPr rtlCol="0" anchor="ctr"/>
+          <a:lstStyle/>
+          <a:p>
+            <a:pPr algn="ctr"/>
+            <a:r>
+              <a:rPr lang="de-DE" dirty="0"/>
+              <a:t>v</a:t>
+            </a:r>
+          </a:p>
+        </p:txBody>
+      </p:sp>
+      <p:sp>
+        <p:nvSpPr>
+          <p:cNvPr id="29" name="Rechteck 28">
+            <a:extLst>
+              <a:ext uri="{FF2B5EF4-FFF2-40B4-BE49-F238E27FC236}">
+                <a16:creationId xmlns:a16="http://schemas.microsoft.com/office/drawing/2014/main" id="{79EC9E59-F6E1-F618-1DE0-15B6856FBE9B}"/>
+              </a:ext>
+            </a:extLst>
+          </p:cNvPr>
+          <p:cNvSpPr/>
+          <p:nvPr/>
+        </p:nvSpPr>
+        <p:spPr>
+          <a:xfrm>
+            <a:off x="326571" y="2872663"/>
+            <a:ext cx="4926562" cy="580828"/>
+          </a:xfrm>
+          <a:prstGeom prst="rect">
+            <a:avLst/>
+          </a:prstGeom>
+          <a:ln>
+            <a:noFill/>
+          </a:ln>
+        </p:spPr>
+        <p:style>
+          <a:lnRef idx="2">
+            <a:schemeClr val="accent1">
+              <a:shade val="50000"/>
+            </a:schemeClr>
+          </a:lnRef>
+          <a:fillRef idx="1">
+            <a:schemeClr val="accent1"/>
+          </a:fillRef>
+          <a:effectRef idx="0">
+            <a:schemeClr val="accent1"/>
+          </a:effectRef>
+          <a:fontRef idx="minor">
+            <a:schemeClr val="lt1"/>
+          </a:fontRef>
+        </p:style>
+        <p:txBody>
+          <a:bodyPr rtlCol="0" anchor="ctr"/>
+          <a:lstStyle/>
+          <a:p>
+            <a:pPr algn="ctr"/>
+            <a:endParaRPr lang="de-DE"/>
+          </a:p>
+        </p:txBody>
+      </p:sp>
+    </p:spTree>
+    <p:extLst>
+      <p:ext uri="{BB962C8B-B14F-4D97-AF65-F5344CB8AC3E}">
+        <p14:creationId xmlns:p14="http://schemas.microsoft.com/office/powerpoint/2010/main" val="4198636381"/>
+      </p:ext>
+    </p:extLst>
+  </p:cSld>
+  <p:clrMapOvr>
+    <a:masterClrMapping/>
+  </p:clrMapOvr>
+</p:sld>
+</file>
+
+<file path=ppt/slides/slide16.xml><?xml version="1.0" encoding="utf-8"?>
+<p:sld xmlns:a="http://schemas.openxmlformats.org/drawingml/2006/main" xmlns:r="http://schemas.openxmlformats.org/officeDocument/2006/relationships" xmlns:p="http://schemas.openxmlformats.org/presentationml/2006/main">
+  <p:cSld>
+    <p:spTree>
+      <p:nvGrpSpPr>
+        <p:cNvPr id="1" name=""/>
+        <p:cNvGrpSpPr/>
+        <p:nvPr/>
+      </p:nvGrpSpPr>
+      <p:grpSpPr>
+        <a:xfrm>
+          <a:off x="0" y="0"/>
+          <a:ext cx="0" cy="0"/>
+          <a:chOff x="0" y="0"/>
+          <a:chExt cx="0" cy="0"/>
+        </a:xfrm>
+      </p:grpSpPr>
+      <p:sp>
+        <p:nvSpPr>
+          <p:cNvPr id="17" name="Rechteck 16">
+            <a:extLst>
+              <a:ext uri="{FF2B5EF4-FFF2-40B4-BE49-F238E27FC236}">
+                <a16:creationId xmlns:a16="http://schemas.microsoft.com/office/drawing/2014/main" id="{D5F06C8D-8F4E-AF0E-8E57-FCDA0258D8FA}"/>
+              </a:ext>
+            </a:extLst>
+          </p:cNvPr>
+          <p:cNvSpPr/>
+          <p:nvPr/>
+        </p:nvSpPr>
+        <p:spPr>
+          <a:xfrm>
+            <a:off x="6375918" y="699796"/>
+            <a:ext cx="4926563" cy="4926563"/>
+          </a:xfrm>
+          <a:prstGeom prst="rect">
+            <a:avLst/>
+          </a:prstGeom>
+          <a:noFill/>
+          <a:ln>
+            <a:noFill/>
+          </a:ln>
+        </p:spPr>
+        <p:style>
+          <a:lnRef idx="2">
+            <a:schemeClr val="accent1">
+              <a:shade val="50000"/>
+            </a:schemeClr>
+          </a:lnRef>
+          <a:fillRef idx="1">
+            <a:schemeClr val="accent1"/>
+          </a:fillRef>
+          <a:effectRef idx="0">
+            <a:schemeClr val="accent1"/>
+          </a:effectRef>
+          <a:fontRef idx="minor">
+            <a:schemeClr val="lt1"/>
+          </a:fontRef>
+        </p:style>
+        <p:txBody>
+          <a:bodyPr rtlCol="0" anchor="ctr"/>
+          <a:lstStyle/>
+          <a:p>
+            <a:pPr algn="ctr"/>
+            <a:endParaRPr lang="de-DE" dirty="0"/>
+          </a:p>
+        </p:txBody>
+      </p:sp>
+      <p:sp>
+        <p:nvSpPr>
+          <p:cNvPr id="23" name="Rechteck 22">
+            <a:extLst>
+              <a:ext uri="{FF2B5EF4-FFF2-40B4-BE49-F238E27FC236}">
+                <a16:creationId xmlns:a16="http://schemas.microsoft.com/office/drawing/2014/main" id="{75FCD471-7018-E29C-B0B9-35D4DEB10345}"/>
+              </a:ext>
+            </a:extLst>
+          </p:cNvPr>
+          <p:cNvSpPr/>
+          <p:nvPr/>
+        </p:nvSpPr>
+        <p:spPr>
+          <a:xfrm>
+            <a:off x="8549399" y="2873276"/>
+            <a:ext cx="579600" cy="579600"/>
+          </a:xfrm>
+          <a:prstGeom prst="rect">
+            <a:avLst/>
+          </a:prstGeom>
+          <a:ln>
+            <a:noFill/>
+          </a:ln>
+        </p:spPr>
+        <p:style>
+          <a:lnRef idx="2">
+            <a:schemeClr val="accent1">
+              <a:shade val="50000"/>
+            </a:schemeClr>
+          </a:lnRef>
+          <a:fillRef idx="1">
+            <a:schemeClr val="accent1"/>
+          </a:fillRef>
+          <a:effectRef idx="0">
+            <a:schemeClr val="accent1"/>
+          </a:effectRef>
+          <a:fontRef idx="minor">
+            <a:schemeClr val="lt1"/>
+          </a:fontRef>
+        </p:style>
+        <p:txBody>
+          <a:bodyPr rtlCol="0" anchor="ctr"/>
+          <a:lstStyle/>
+          <a:p>
+            <a:pPr algn="ctr"/>
+            <a:endParaRPr lang="de-DE"/>
+          </a:p>
+        </p:txBody>
+      </p:sp>
+      <p:sp>
+        <p:nvSpPr>
+          <p:cNvPr id="26" name="Rechteck 25">
+            <a:extLst>
+              <a:ext uri="{FF2B5EF4-FFF2-40B4-BE49-F238E27FC236}">
+                <a16:creationId xmlns:a16="http://schemas.microsoft.com/office/drawing/2014/main" id="{8D9CC822-E1AA-ED34-EC54-D74B4FA2C3B4}"/>
+              </a:ext>
+            </a:extLst>
+          </p:cNvPr>
+          <p:cNvSpPr/>
+          <p:nvPr/>
+        </p:nvSpPr>
+        <p:spPr>
+          <a:xfrm>
+            <a:off x="9128999" y="2293676"/>
+            <a:ext cx="2173482" cy="579600"/>
+          </a:xfrm>
+          <a:prstGeom prst="rect">
+            <a:avLst/>
+          </a:prstGeom>
+          <a:ln>
+            <a:noFill/>
+          </a:ln>
+        </p:spPr>
+        <p:style>
+          <a:lnRef idx="2">
+            <a:schemeClr val="accent1">
+              <a:shade val="50000"/>
+            </a:schemeClr>
+          </a:lnRef>
+          <a:fillRef idx="1">
+            <a:schemeClr val="accent1"/>
+          </a:fillRef>
+          <a:effectRef idx="0">
+            <a:schemeClr val="accent1"/>
+          </a:effectRef>
+          <a:fontRef idx="minor">
+            <a:schemeClr val="lt1"/>
+          </a:fontRef>
+        </p:style>
+        <p:txBody>
+          <a:bodyPr rtlCol="0" anchor="ctr"/>
+          <a:lstStyle/>
+          <a:p>
+            <a:pPr algn="ctr"/>
+            <a:endParaRPr lang="de-DE"/>
+          </a:p>
+        </p:txBody>
+      </p:sp>
+      <p:sp>
+        <p:nvSpPr>
+          <p:cNvPr id="27" name="Rechteck 26">
+            <a:extLst>
+              <a:ext uri="{FF2B5EF4-FFF2-40B4-BE49-F238E27FC236}">
+                <a16:creationId xmlns:a16="http://schemas.microsoft.com/office/drawing/2014/main" id="{CA290054-D7C5-895C-9541-BFD399587762}"/>
+              </a:ext>
+            </a:extLst>
+          </p:cNvPr>
+          <p:cNvSpPr/>
+          <p:nvPr/>
+        </p:nvSpPr>
+        <p:spPr>
+          <a:xfrm>
+            <a:off x="9708599" y="3452877"/>
+            <a:ext cx="1593882" cy="579600"/>
+          </a:xfrm>
+          <a:prstGeom prst="rect">
+            <a:avLst/>
+          </a:prstGeom>
+          <a:ln>
+            <a:noFill/>
+          </a:ln>
+        </p:spPr>
+        <p:style>
+          <a:lnRef idx="2">
+            <a:schemeClr val="accent1">
+              <a:shade val="50000"/>
+            </a:schemeClr>
+          </a:lnRef>
+          <a:fillRef idx="1">
+            <a:schemeClr val="accent1"/>
+          </a:fillRef>
+          <a:effectRef idx="0">
+            <a:schemeClr val="accent1"/>
+          </a:effectRef>
+          <a:fontRef idx="minor">
+            <a:schemeClr val="lt1"/>
+          </a:fontRef>
+        </p:style>
+        <p:txBody>
+          <a:bodyPr rtlCol="0" anchor="ctr"/>
+          <a:lstStyle/>
+          <a:p>
+            <a:pPr algn="ctr"/>
+            <a:endParaRPr lang="de-DE"/>
+          </a:p>
+        </p:txBody>
+      </p:sp>
+      <p:sp>
+        <p:nvSpPr>
+          <p:cNvPr id="28" name="Rechteck 27">
+            <a:extLst>
+              <a:ext uri="{FF2B5EF4-FFF2-40B4-BE49-F238E27FC236}">
+                <a16:creationId xmlns:a16="http://schemas.microsoft.com/office/drawing/2014/main" id="{66F4139D-11D1-20C7-7860-04050193D2A8}"/>
+              </a:ext>
+            </a:extLst>
+          </p:cNvPr>
+          <p:cNvSpPr/>
+          <p:nvPr/>
+        </p:nvSpPr>
+        <p:spPr>
+          <a:xfrm rot="5400000">
+            <a:off x="8621858" y="4539618"/>
+            <a:ext cx="1593883" cy="579600"/>
+          </a:xfrm>
+          <a:prstGeom prst="rect">
+            <a:avLst/>
+          </a:prstGeom>
+          <a:ln>
+            <a:noFill/>
+          </a:ln>
+        </p:spPr>
+        <p:style>
+          <a:lnRef idx="2">
+            <a:schemeClr val="accent1">
+              <a:shade val="50000"/>
+            </a:schemeClr>
+          </a:lnRef>
+          <a:fillRef idx="1">
+            <a:schemeClr val="accent1"/>
+          </a:fillRef>
+          <a:effectRef idx="0">
+            <a:schemeClr val="accent1"/>
+          </a:effectRef>
+          <a:fontRef idx="minor">
+            <a:schemeClr val="lt1"/>
+          </a:fontRef>
+        </p:style>
+        <p:txBody>
+          <a:bodyPr rtlCol="0" anchor="ctr"/>
+          <a:lstStyle/>
+          <a:p>
+            <a:pPr algn="ctr"/>
+            <a:endParaRPr lang="de-DE"/>
+          </a:p>
+        </p:txBody>
+      </p:sp>
+      <p:sp>
+        <p:nvSpPr>
+          <p:cNvPr id="29" name="Rechteck 28">
+            <a:extLst>
+              <a:ext uri="{FF2B5EF4-FFF2-40B4-BE49-F238E27FC236}">
+                <a16:creationId xmlns:a16="http://schemas.microsoft.com/office/drawing/2014/main" id="{B4C1ABD5-88B6-1D6D-542A-A10C0BFB49F9}"/>
+              </a:ext>
+            </a:extLst>
+          </p:cNvPr>
+          <p:cNvSpPr/>
+          <p:nvPr/>
+        </p:nvSpPr>
+        <p:spPr>
+          <a:xfrm rot="5400000">
+            <a:off x="7160919" y="4237880"/>
+            <a:ext cx="2197360" cy="579600"/>
+          </a:xfrm>
+          <a:prstGeom prst="rect">
+            <a:avLst/>
+          </a:prstGeom>
+          <a:ln>
+            <a:noFill/>
+          </a:ln>
+        </p:spPr>
+        <p:style>
+          <a:lnRef idx="2">
+            <a:schemeClr val="accent1">
+              <a:shade val="50000"/>
+            </a:schemeClr>
+          </a:lnRef>
+          <a:fillRef idx="1">
+            <a:schemeClr val="accent1"/>
+          </a:fillRef>
+          <a:effectRef idx="0">
+            <a:schemeClr val="accent1"/>
+          </a:effectRef>
+          <a:fontRef idx="minor">
+            <a:schemeClr val="lt1"/>
+          </a:fontRef>
+        </p:style>
+        <p:txBody>
+          <a:bodyPr rtlCol="0" anchor="ctr"/>
+          <a:lstStyle/>
+          <a:p>
+            <a:pPr algn="ctr"/>
+            <a:endParaRPr lang="de-DE"/>
+          </a:p>
+        </p:txBody>
+      </p:sp>
+      <p:sp>
+        <p:nvSpPr>
+          <p:cNvPr id="33" name="Rechteck 32">
+            <a:extLst>
+              <a:ext uri="{FF2B5EF4-FFF2-40B4-BE49-F238E27FC236}">
+                <a16:creationId xmlns:a16="http://schemas.microsoft.com/office/drawing/2014/main" id="{42864756-9340-2CC7-92B3-10E74155EAF3}"/>
+              </a:ext>
+            </a:extLst>
+          </p:cNvPr>
+          <p:cNvSpPr/>
+          <p:nvPr/>
+        </p:nvSpPr>
+        <p:spPr>
+          <a:xfrm>
+            <a:off x="326571" y="699796"/>
+            <a:ext cx="4926563" cy="4926563"/>
+          </a:xfrm>
+          <a:prstGeom prst="rect">
+            <a:avLst/>
+          </a:prstGeom>
+          <a:noFill/>
+          <a:ln>
+            <a:noFill/>
+          </a:ln>
+        </p:spPr>
+        <p:style>
+          <a:lnRef idx="2">
+            <a:schemeClr val="accent1">
+              <a:shade val="50000"/>
+            </a:schemeClr>
+          </a:lnRef>
+          <a:fillRef idx="1">
+            <a:schemeClr val="accent1"/>
+          </a:fillRef>
+          <a:effectRef idx="0">
+            <a:schemeClr val="accent1"/>
+          </a:effectRef>
+          <a:fontRef idx="minor">
+            <a:schemeClr val="lt1"/>
+          </a:fontRef>
+        </p:style>
+        <p:txBody>
+          <a:bodyPr rtlCol="0" anchor="ctr"/>
+          <a:lstStyle/>
+          <a:p>
+            <a:pPr algn="ctr"/>
+            <a:r>
+              <a:rPr lang="de-DE" dirty="0"/>
+              <a:t>v</a:t>
+            </a:r>
+          </a:p>
+        </p:txBody>
+      </p:sp>
+      <p:sp>
+        <p:nvSpPr>
+          <p:cNvPr id="35" name="Rechteck 34">
+            <a:extLst>
+              <a:ext uri="{FF2B5EF4-FFF2-40B4-BE49-F238E27FC236}">
+                <a16:creationId xmlns:a16="http://schemas.microsoft.com/office/drawing/2014/main" id="{CEBCA775-6CEB-B13D-1217-A8475B7FCC27}"/>
+              </a:ext>
+            </a:extLst>
+          </p:cNvPr>
+          <p:cNvSpPr/>
+          <p:nvPr/>
+        </p:nvSpPr>
+        <p:spPr>
+          <a:xfrm>
+            <a:off x="326572" y="2291835"/>
+            <a:ext cx="4926562" cy="580828"/>
+          </a:xfrm>
+          <a:prstGeom prst="rect">
+            <a:avLst/>
+          </a:prstGeom>
+          <a:ln>
+            <a:noFill/>
+          </a:ln>
+        </p:spPr>
+        <p:style>
+          <a:lnRef idx="2">
+            <a:schemeClr val="accent1">
+              <a:shade val="50000"/>
+            </a:schemeClr>
+          </a:lnRef>
+          <a:fillRef idx="1">
+            <a:schemeClr val="accent1"/>
+          </a:fillRef>
+          <a:effectRef idx="0">
+            <a:schemeClr val="accent1"/>
+          </a:effectRef>
+          <a:fontRef idx="minor">
+            <a:schemeClr val="lt1"/>
+          </a:fontRef>
+        </p:style>
+        <p:txBody>
+          <a:bodyPr rtlCol="0" anchor="ctr"/>
+          <a:lstStyle/>
+          <a:p>
+            <a:pPr algn="ctr"/>
+            <a:endParaRPr lang="de-DE"/>
+          </a:p>
+        </p:txBody>
+      </p:sp>
+      <p:sp>
+        <p:nvSpPr>
+          <p:cNvPr id="36" name="Rechteck 35">
+            <a:extLst>
+              <a:ext uri="{FF2B5EF4-FFF2-40B4-BE49-F238E27FC236}">
+                <a16:creationId xmlns:a16="http://schemas.microsoft.com/office/drawing/2014/main" id="{1D230D9F-C2BD-1919-B7B6-9114404CCBD0}"/>
+              </a:ext>
+            </a:extLst>
+          </p:cNvPr>
+          <p:cNvSpPr/>
+          <p:nvPr/>
+        </p:nvSpPr>
+        <p:spPr>
+          <a:xfrm>
+            <a:off x="326570" y="3454655"/>
+            <a:ext cx="4926562" cy="580828"/>
+          </a:xfrm>
+          <a:prstGeom prst="rect">
+            <a:avLst/>
+          </a:prstGeom>
+          <a:ln>
+            <a:noFill/>
+          </a:ln>
+        </p:spPr>
+        <p:style>
+          <a:lnRef idx="2">
+            <a:schemeClr val="accent1">
+              <a:shade val="50000"/>
+            </a:schemeClr>
+          </a:lnRef>
+          <a:fillRef idx="1">
+            <a:schemeClr val="accent1"/>
+          </a:fillRef>
+          <a:effectRef idx="0">
+            <a:schemeClr val="accent1"/>
+          </a:effectRef>
+          <a:fontRef idx="minor">
+            <a:schemeClr val="lt1"/>
+          </a:fontRef>
+        </p:style>
+        <p:txBody>
+          <a:bodyPr rtlCol="0" anchor="ctr"/>
+          <a:lstStyle/>
+          <a:p>
+            <a:pPr algn="ctr"/>
+            <a:endParaRPr lang="de-DE"/>
+          </a:p>
+        </p:txBody>
+      </p:sp>
+    </p:spTree>
+    <p:extLst>
+      <p:ext uri="{BB962C8B-B14F-4D97-AF65-F5344CB8AC3E}">
+        <p14:creationId xmlns:p14="http://schemas.microsoft.com/office/powerpoint/2010/main" val="442931970"/>
       </p:ext>
     </p:extLst>
   </p:cSld>

</xml_diff>

<commit_message>
Added a texture for the ghost house entrance
</commit_message>
<xml_diff>
--- a/assets/textures.pptx
+++ b/assets/textures.pptx
@@ -21,6 +21,7 @@
     <p:sldId id="269" r:id="rId15"/>
     <p:sldId id="270" r:id="rId16"/>
     <p:sldId id="271" r:id="rId17"/>
+    <p:sldId id="272" r:id="rId18"/>
   </p:sldIdLst>
   <p:sldSz cx="12192000" cy="6858000"/>
   <p:notesSz cx="6858000" cy="9144000"/>
@@ -13446,6 +13447,138 @@
 </p:sld>
 </file>
 
+<file path=ppt/slides/slide17.xml><?xml version="1.0" encoding="utf-8"?>
+<p:sld xmlns:a="http://schemas.openxmlformats.org/drawingml/2006/main" xmlns:r="http://schemas.openxmlformats.org/officeDocument/2006/relationships" xmlns:p="http://schemas.openxmlformats.org/presentationml/2006/main">
+  <p:cSld>
+    <p:spTree>
+      <p:nvGrpSpPr>
+        <p:cNvPr id="1" name=""/>
+        <p:cNvGrpSpPr/>
+        <p:nvPr/>
+      </p:nvGrpSpPr>
+      <p:grpSpPr>
+        <a:xfrm>
+          <a:off x="0" y="0"/>
+          <a:ext cx="0" cy="0"/>
+          <a:chOff x="0" y="0"/>
+          <a:chExt cx="0" cy="0"/>
+        </a:xfrm>
+      </p:grpSpPr>
+      <p:sp>
+        <p:nvSpPr>
+          <p:cNvPr id="6" name="Rechteck 5">
+            <a:extLst>
+              <a:ext uri="{FF2B5EF4-FFF2-40B4-BE49-F238E27FC236}">
+                <a16:creationId xmlns:a16="http://schemas.microsoft.com/office/drawing/2014/main" id="{1F7FC176-C7DF-151B-C46C-88B70F14393F}"/>
+              </a:ext>
+            </a:extLst>
+          </p:cNvPr>
+          <p:cNvSpPr/>
+          <p:nvPr/>
+        </p:nvSpPr>
+        <p:spPr>
+          <a:xfrm>
+            <a:off x="326572" y="2872663"/>
+            <a:ext cx="4926562" cy="580828"/>
+          </a:xfrm>
+          <a:prstGeom prst="rect">
+            <a:avLst/>
+          </a:prstGeom>
+          <a:solidFill>
+            <a:srgbClr val="FFD8FF"/>
+          </a:solidFill>
+          <a:ln>
+            <a:noFill/>
+          </a:ln>
+        </p:spPr>
+        <p:style>
+          <a:lnRef idx="2">
+            <a:schemeClr val="accent1">
+              <a:shade val="50000"/>
+            </a:schemeClr>
+          </a:lnRef>
+          <a:fillRef idx="1">
+            <a:schemeClr val="accent1"/>
+          </a:fillRef>
+          <a:effectRef idx="0">
+            <a:schemeClr val="accent1"/>
+          </a:effectRef>
+          <a:fontRef idx="minor">
+            <a:schemeClr val="lt1"/>
+          </a:fontRef>
+        </p:style>
+        <p:txBody>
+          <a:bodyPr rtlCol="0" anchor="ctr"/>
+          <a:lstStyle/>
+          <a:p>
+            <a:pPr algn="ctr"/>
+            <a:endParaRPr lang="de-DE"/>
+          </a:p>
+        </p:txBody>
+      </p:sp>
+      <p:sp>
+        <p:nvSpPr>
+          <p:cNvPr id="7" name="Rechteck 6">
+            <a:extLst>
+              <a:ext uri="{FF2B5EF4-FFF2-40B4-BE49-F238E27FC236}">
+                <a16:creationId xmlns:a16="http://schemas.microsoft.com/office/drawing/2014/main" id="{8A4CC212-3D8D-6BC6-660B-BA4E27B328EF}"/>
+              </a:ext>
+            </a:extLst>
+          </p:cNvPr>
+          <p:cNvSpPr/>
+          <p:nvPr/>
+        </p:nvSpPr>
+        <p:spPr>
+          <a:xfrm>
+            <a:off x="326571" y="699796"/>
+            <a:ext cx="4926563" cy="4926563"/>
+          </a:xfrm>
+          <a:prstGeom prst="rect">
+            <a:avLst/>
+          </a:prstGeom>
+          <a:noFill/>
+          <a:ln>
+            <a:noFill/>
+          </a:ln>
+        </p:spPr>
+        <p:style>
+          <a:lnRef idx="2">
+            <a:schemeClr val="accent1">
+              <a:shade val="50000"/>
+            </a:schemeClr>
+          </a:lnRef>
+          <a:fillRef idx="1">
+            <a:schemeClr val="accent1"/>
+          </a:fillRef>
+          <a:effectRef idx="0">
+            <a:schemeClr val="accent1"/>
+          </a:effectRef>
+          <a:fontRef idx="minor">
+            <a:schemeClr val="lt1"/>
+          </a:fontRef>
+        </p:style>
+        <p:txBody>
+          <a:bodyPr rtlCol="0" anchor="ctr"/>
+          <a:lstStyle/>
+          <a:p>
+            <a:pPr algn="ctr"/>
+            <a:endParaRPr lang="de-DE" dirty="0"/>
+          </a:p>
+        </p:txBody>
+      </p:sp>
+    </p:spTree>
+    <p:extLst>
+      <p:ext uri="{BB962C8B-B14F-4D97-AF65-F5344CB8AC3E}">
+        <p14:creationId xmlns:p14="http://schemas.microsoft.com/office/powerpoint/2010/main" val="3551332525"/>
+      </p:ext>
+    </p:extLst>
+  </p:cSld>
+  <p:clrMapOvr>
+    <a:masterClrMapping/>
+  </p:clrMapOvr>
+</p:sld>
+</file>
+
 <file path=ppt/slides/slide2.xml><?xml version="1.0" encoding="utf-8"?>
 <p:sld xmlns:a="http://schemas.openxmlformats.org/drawingml/2006/main" xmlns:r="http://schemas.openxmlformats.org/officeDocument/2006/relationships" xmlns:p="http://schemas.openxmlformats.org/presentationml/2006/main">
   <p:cSld>

</xml_diff>

<commit_message>
Pacman is now animated.
Added missing textures and replace the old one.
Moved the appearance update into new module pacman::textures.
</commit_message>
<xml_diff>
--- a/assets/textures.pptx
+++ b/assets/textures.pptx
@@ -32,6 +32,9 @@
     <p:sldId id="270" r:id="rId26"/>
     <p:sldId id="271" r:id="rId27"/>
     <p:sldId id="272" r:id="rId28"/>
+    <p:sldId id="283" r:id="rId29"/>
+    <p:sldId id="284" r:id="rId30"/>
+    <p:sldId id="285" r:id="rId31"/>
   </p:sldIdLst>
   <p:sldSz cx="12192000" cy="6858000"/>
   <p:notesSz cx="6858000" cy="9144000"/>
@@ -285,7 +288,7 @@
           <a:p>
             <a:fld id="{08F585A2-760E-46F2-B064-85F0DFCDA2A3}" type="datetimeFigureOut">
               <a:rPr lang="de-DE" smtClean="0"/>
-              <a:t>09.07.2022</a:t>
+              <a:t>10.07.2022</a:t>
             </a:fld>
             <a:endParaRPr lang="de-DE"/>
           </a:p>
@@ -483,7 +486,7 @@
           <a:p>
             <a:fld id="{08F585A2-760E-46F2-B064-85F0DFCDA2A3}" type="datetimeFigureOut">
               <a:rPr lang="de-DE" smtClean="0"/>
-              <a:t>09.07.2022</a:t>
+              <a:t>10.07.2022</a:t>
             </a:fld>
             <a:endParaRPr lang="de-DE"/>
           </a:p>
@@ -691,7 +694,7 @@
           <a:p>
             <a:fld id="{08F585A2-760E-46F2-B064-85F0DFCDA2A3}" type="datetimeFigureOut">
               <a:rPr lang="de-DE" smtClean="0"/>
-              <a:t>09.07.2022</a:t>
+              <a:t>10.07.2022</a:t>
             </a:fld>
             <a:endParaRPr lang="de-DE"/>
           </a:p>
@@ -889,7 +892,7 @@
           <a:p>
             <a:fld id="{08F585A2-760E-46F2-B064-85F0DFCDA2A3}" type="datetimeFigureOut">
               <a:rPr lang="de-DE" smtClean="0"/>
-              <a:t>09.07.2022</a:t>
+              <a:t>10.07.2022</a:t>
             </a:fld>
             <a:endParaRPr lang="de-DE"/>
           </a:p>
@@ -1164,7 +1167,7 @@
           <a:p>
             <a:fld id="{08F585A2-760E-46F2-B064-85F0DFCDA2A3}" type="datetimeFigureOut">
               <a:rPr lang="de-DE" smtClean="0"/>
-              <a:t>09.07.2022</a:t>
+              <a:t>10.07.2022</a:t>
             </a:fld>
             <a:endParaRPr lang="de-DE"/>
           </a:p>
@@ -1429,7 +1432,7 @@
           <a:p>
             <a:fld id="{08F585A2-760E-46F2-B064-85F0DFCDA2A3}" type="datetimeFigureOut">
               <a:rPr lang="de-DE" smtClean="0"/>
-              <a:t>09.07.2022</a:t>
+              <a:t>10.07.2022</a:t>
             </a:fld>
             <a:endParaRPr lang="de-DE"/>
           </a:p>
@@ -1841,7 +1844,7 @@
           <a:p>
             <a:fld id="{08F585A2-760E-46F2-B064-85F0DFCDA2A3}" type="datetimeFigureOut">
               <a:rPr lang="de-DE" smtClean="0"/>
-              <a:t>09.07.2022</a:t>
+              <a:t>10.07.2022</a:t>
             </a:fld>
             <a:endParaRPr lang="de-DE"/>
           </a:p>
@@ -1982,7 +1985,7 @@
           <a:p>
             <a:fld id="{08F585A2-760E-46F2-B064-85F0DFCDA2A3}" type="datetimeFigureOut">
               <a:rPr lang="de-DE" smtClean="0"/>
-              <a:t>09.07.2022</a:t>
+              <a:t>10.07.2022</a:t>
             </a:fld>
             <a:endParaRPr lang="de-DE"/>
           </a:p>
@@ -2095,7 +2098,7 @@
           <a:p>
             <a:fld id="{08F585A2-760E-46F2-B064-85F0DFCDA2A3}" type="datetimeFigureOut">
               <a:rPr lang="de-DE" smtClean="0"/>
-              <a:t>09.07.2022</a:t>
+              <a:t>10.07.2022</a:t>
             </a:fld>
             <a:endParaRPr lang="de-DE"/>
           </a:p>
@@ -2406,7 +2409,7 @@
           <a:p>
             <a:fld id="{08F585A2-760E-46F2-B064-85F0DFCDA2A3}" type="datetimeFigureOut">
               <a:rPr lang="de-DE" smtClean="0"/>
-              <a:t>09.07.2022</a:t>
+              <a:t>10.07.2022</a:t>
             </a:fld>
             <a:endParaRPr lang="de-DE"/>
           </a:p>
@@ -2694,7 +2697,7 @@
           <a:p>
             <a:fld id="{08F585A2-760E-46F2-B064-85F0DFCDA2A3}" type="datetimeFigureOut">
               <a:rPr lang="de-DE" smtClean="0"/>
-              <a:t>09.07.2022</a:t>
+              <a:t>10.07.2022</a:t>
             </a:fld>
             <a:endParaRPr lang="de-DE"/>
           </a:p>
@@ -2935,7 +2938,7 @@
           <a:p>
             <a:fld id="{08F585A2-760E-46F2-B064-85F0DFCDA2A3}" type="datetimeFigureOut">
               <a:rPr lang="de-DE" smtClean="0"/>
-              <a:t>09.07.2022</a:t>
+              <a:t>10.07.2022</a:t>
             </a:fld>
             <a:endParaRPr lang="de-DE"/>
           </a:p>
@@ -37431,6 +37434,1270 @@
 </p:sld>
 </file>
 
+<file path=ppt/slides/slide28.xml><?xml version="1.0" encoding="utf-8"?>
+<p:sld xmlns:a="http://schemas.openxmlformats.org/drawingml/2006/main" xmlns:r="http://schemas.openxmlformats.org/officeDocument/2006/relationships" xmlns:p="http://schemas.openxmlformats.org/presentationml/2006/main">
+  <p:cSld>
+    <p:spTree>
+      <p:nvGrpSpPr>
+        <p:cNvPr id="1" name=""/>
+        <p:cNvGrpSpPr/>
+        <p:nvPr/>
+      </p:nvGrpSpPr>
+      <p:grpSpPr>
+        <a:xfrm>
+          <a:off x="0" y="0"/>
+          <a:ext cx="0" cy="0"/>
+          <a:chOff x="0" y="0"/>
+          <a:chExt cx="0" cy="0"/>
+        </a:xfrm>
+      </p:grpSpPr>
+      <p:pic>
+        <p:nvPicPr>
+          <p:cNvPr id="22" name="Grafik 21">
+            <a:extLst>
+              <a:ext uri="{FF2B5EF4-FFF2-40B4-BE49-F238E27FC236}">
+                <a16:creationId xmlns:a16="http://schemas.microsoft.com/office/drawing/2014/main" id="{58D457F8-9639-016F-5C65-0FF95D961DFA}"/>
+              </a:ext>
+            </a:extLst>
+          </p:cNvPr>
+          <p:cNvPicPr>
+            <a:picLocks noChangeAspect="1"/>
+          </p:cNvPicPr>
+          <p:nvPr/>
+        </p:nvPicPr>
+        <p:blipFill>
+          <a:blip r:embed="rId2"/>
+          <a:stretch>
+            <a:fillRect/>
+          </a:stretch>
+        </p:blipFill>
+        <p:spPr>
+          <a:xfrm>
+            <a:off x="8865612" y="3866"/>
+            <a:ext cx="5640963" cy="1893334"/>
+          </a:xfrm>
+          <a:prstGeom prst="rect">
+            <a:avLst/>
+          </a:prstGeom>
+        </p:spPr>
+      </p:pic>
+      <p:sp>
+        <p:nvSpPr>
+          <p:cNvPr id="23" name="Rechteck 22">
+            <a:extLst>
+              <a:ext uri="{FF2B5EF4-FFF2-40B4-BE49-F238E27FC236}">
+                <a16:creationId xmlns:a16="http://schemas.microsoft.com/office/drawing/2014/main" id="{471F2B6B-89F5-A2BE-FF20-F92EB0070138}"/>
+              </a:ext>
+            </a:extLst>
+          </p:cNvPr>
+          <p:cNvSpPr/>
+          <p:nvPr/>
+        </p:nvSpPr>
+        <p:spPr>
+          <a:xfrm>
+            <a:off x="2409825" y="457200"/>
+            <a:ext cx="3240000" cy="540000"/>
+          </a:xfrm>
+          <a:prstGeom prst="rect">
+            <a:avLst/>
+          </a:prstGeom>
+          <a:solidFill>
+            <a:srgbClr val="FFFF00"/>
+          </a:solidFill>
+          <a:ln>
+            <a:noFill/>
+          </a:ln>
+        </p:spPr>
+        <p:style>
+          <a:lnRef idx="2">
+            <a:schemeClr val="accent1">
+              <a:shade val="50000"/>
+            </a:schemeClr>
+          </a:lnRef>
+          <a:fillRef idx="1">
+            <a:schemeClr val="accent1"/>
+          </a:fillRef>
+          <a:effectRef idx="0">
+            <a:schemeClr val="accent1"/>
+          </a:effectRef>
+          <a:fontRef idx="minor">
+            <a:schemeClr val="lt1"/>
+          </a:fontRef>
+        </p:style>
+        <p:txBody>
+          <a:bodyPr rtlCol="0" anchor="ctr"/>
+          <a:lstStyle/>
+          <a:p>
+            <a:pPr algn="ctr"/>
+            <a:endParaRPr lang="de-DE"/>
+          </a:p>
+        </p:txBody>
+      </p:sp>
+      <p:sp>
+        <p:nvSpPr>
+          <p:cNvPr id="24" name="Rechteck 23">
+            <a:extLst>
+              <a:ext uri="{FF2B5EF4-FFF2-40B4-BE49-F238E27FC236}">
+                <a16:creationId xmlns:a16="http://schemas.microsoft.com/office/drawing/2014/main" id="{98D631AC-1CB1-FAFF-DEAB-7D52AEE00D83}"/>
+              </a:ext>
+            </a:extLst>
+          </p:cNvPr>
+          <p:cNvSpPr/>
+          <p:nvPr/>
+        </p:nvSpPr>
+        <p:spPr>
+          <a:xfrm>
+            <a:off x="1329825" y="997200"/>
+            <a:ext cx="5400000" cy="540000"/>
+          </a:xfrm>
+          <a:prstGeom prst="rect">
+            <a:avLst/>
+          </a:prstGeom>
+          <a:solidFill>
+            <a:srgbClr val="FFFF00"/>
+          </a:solidFill>
+          <a:ln>
+            <a:noFill/>
+          </a:ln>
+        </p:spPr>
+        <p:style>
+          <a:lnRef idx="2">
+            <a:schemeClr val="accent1">
+              <a:shade val="50000"/>
+            </a:schemeClr>
+          </a:lnRef>
+          <a:fillRef idx="1">
+            <a:schemeClr val="accent1"/>
+          </a:fillRef>
+          <a:effectRef idx="0">
+            <a:schemeClr val="accent1"/>
+          </a:effectRef>
+          <a:fontRef idx="minor">
+            <a:schemeClr val="lt1"/>
+          </a:fontRef>
+        </p:style>
+        <p:txBody>
+          <a:bodyPr rtlCol="0" anchor="ctr"/>
+          <a:lstStyle/>
+          <a:p>
+            <a:pPr algn="ctr"/>
+            <a:endParaRPr lang="de-DE"/>
+          </a:p>
+        </p:txBody>
+      </p:sp>
+      <p:sp>
+        <p:nvSpPr>
+          <p:cNvPr id="25" name="Rechteck 24">
+            <a:extLst>
+              <a:ext uri="{FF2B5EF4-FFF2-40B4-BE49-F238E27FC236}">
+                <a16:creationId xmlns:a16="http://schemas.microsoft.com/office/drawing/2014/main" id="{2850AD32-C5D5-BC21-5236-1542384332FE}"/>
+              </a:ext>
+            </a:extLst>
+          </p:cNvPr>
+          <p:cNvSpPr/>
+          <p:nvPr/>
+        </p:nvSpPr>
+        <p:spPr>
+          <a:xfrm>
+            <a:off x="789825" y="1537200"/>
+            <a:ext cx="6480000" cy="720000"/>
+          </a:xfrm>
+          <a:prstGeom prst="rect">
+            <a:avLst/>
+          </a:prstGeom>
+          <a:solidFill>
+            <a:srgbClr val="FFFF00"/>
+          </a:solidFill>
+          <a:ln>
+            <a:noFill/>
+          </a:ln>
+        </p:spPr>
+        <p:style>
+          <a:lnRef idx="2">
+            <a:schemeClr val="accent1">
+              <a:shade val="50000"/>
+            </a:schemeClr>
+          </a:lnRef>
+          <a:fillRef idx="1">
+            <a:schemeClr val="accent1"/>
+          </a:fillRef>
+          <a:effectRef idx="0">
+            <a:schemeClr val="accent1"/>
+          </a:effectRef>
+          <a:fontRef idx="minor">
+            <a:schemeClr val="lt1"/>
+          </a:fontRef>
+        </p:style>
+        <p:txBody>
+          <a:bodyPr rtlCol="0" anchor="ctr"/>
+          <a:lstStyle/>
+          <a:p>
+            <a:pPr algn="ctr"/>
+            <a:endParaRPr lang="de-DE"/>
+          </a:p>
+        </p:txBody>
+      </p:sp>
+      <p:sp>
+        <p:nvSpPr>
+          <p:cNvPr id="26" name="Rechteck 25">
+            <a:extLst>
+              <a:ext uri="{FF2B5EF4-FFF2-40B4-BE49-F238E27FC236}">
+                <a16:creationId xmlns:a16="http://schemas.microsoft.com/office/drawing/2014/main" id="{DEB72003-5B04-70E8-584F-1B969B9C4303}"/>
+              </a:ext>
+            </a:extLst>
+          </p:cNvPr>
+          <p:cNvSpPr/>
+          <p:nvPr/>
+        </p:nvSpPr>
+        <p:spPr>
+          <a:xfrm>
+            <a:off x="1809750" y="2257200"/>
+            <a:ext cx="5906250" cy="540000"/>
+          </a:xfrm>
+          <a:prstGeom prst="rect">
+            <a:avLst/>
+          </a:prstGeom>
+          <a:solidFill>
+            <a:srgbClr val="FFFF00"/>
+          </a:solidFill>
+          <a:ln>
+            <a:noFill/>
+          </a:ln>
+        </p:spPr>
+        <p:style>
+          <a:lnRef idx="2">
+            <a:schemeClr val="accent1">
+              <a:shade val="50000"/>
+            </a:schemeClr>
+          </a:lnRef>
+          <a:fillRef idx="1">
+            <a:schemeClr val="accent1"/>
+          </a:fillRef>
+          <a:effectRef idx="0">
+            <a:schemeClr val="accent1"/>
+          </a:effectRef>
+          <a:fontRef idx="minor">
+            <a:schemeClr val="lt1"/>
+          </a:fontRef>
+        </p:style>
+        <p:txBody>
+          <a:bodyPr rtlCol="0" anchor="ctr"/>
+          <a:lstStyle/>
+          <a:p>
+            <a:pPr algn="ctr"/>
+            <a:endParaRPr lang="de-DE"/>
+          </a:p>
+        </p:txBody>
+      </p:sp>
+      <p:sp>
+        <p:nvSpPr>
+          <p:cNvPr id="27" name="Rechteck 26">
+            <a:extLst>
+              <a:ext uri="{FF2B5EF4-FFF2-40B4-BE49-F238E27FC236}">
+                <a16:creationId xmlns:a16="http://schemas.microsoft.com/office/drawing/2014/main" id="{70860606-40DE-BDD7-A0D1-EA238DD618D8}"/>
+              </a:ext>
+            </a:extLst>
+          </p:cNvPr>
+          <p:cNvSpPr/>
+          <p:nvPr/>
+        </p:nvSpPr>
+        <p:spPr>
+          <a:xfrm>
+            <a:off x="3533775" y="2803575"/>
+            <a:ext cx="4182225" cy="540000"/>
+          </a:xfrm>
+          <a:prstGeom prst="rect">
+            <a:avLst/>
+          </a:prstGeom>
+          <a:solidFill>
+            <a:srgbClr val="FFFF00"/>
+          </a:solidFill>
+          <a:ln>
+            <a:noFill/>
+          </a:ln>
+        </p:spPr>
+        <p:style>
+          <a:lnRef idx="2">
+            <a:schemeClr val="accent1">
+              <a:shade val="50000"/>
+            </a:schemeClr>
+          </a:lnRef>
+          <a:fillRef idx="1">
+            <a:schemeClr val="accent1"/>
+          </a:fillRef>
+          <a:effectRef idx="0">
+            <a:schemeClr val="accent1"/>
+          </a:effectRef>
+          <a:fontRef idx="minor">
+            <a:schemeClr val="lt1"/>
+          </a:fontRef>
+        </p:style>
+        <p:txBody>
+          <a:bodyPr rtlCol="0" anchor="ctr"/>
+          <a:lstStyle/>
+          <a:p>
+            <a:pPr algn="ctr"/>
+            <a:endParaRPr lang="de-DE"/>
+          </a:p>
+        </p:txBody>
+      </p:sp>
+      <p:sp>
+        <p:nvSpPr>
+          <p:cNvPr id="28" name="Rechteck 27">
+            <a:extLst>
+              <a:ext uri="{FF2B5EF4-FFF2-40B4-BE49-F238E27FC236}">
+                <a16:creationId xmlns:a16="http://schemas.microsoft.com/office/drawing/2014/main" id="{AFB82D5D-9A25-961F-3CF3-D99519840265}"/>
+              </a:ext>
+            </a:extLst>
+          </p:cNvPr>
+          <p:cNvSpPr/>
+          <p:nvPr/>
+        </p:nvSpPr>
+        <p:spPr>
+          <a:xfrm>
+            <a:off x="5219700" y="3343575"/>
+            <a:ext cx="2496300" cy="540000"/>
+          </a:xfrm>
+          <a:prstGeom prst="rect">
+            <a:avLst/>
+          </a:prstGeom>
+          <a:solidFill>
+            <a:srgbClr val="FFFF00"/>
+          </a:solidFill>
+          <a:ln>
+            <a:noFill/>
+          </a:ln>
+        </p:spPr>
+        <p:style>
+          <a:lnRef idx="2">
+            <a:schemeClr val="accent1">
+              <a:shade val="50000"/>
+            </a:schemeClr>
+          </a:lnRef>
+          <a:fillRef idx="1">
+            <a:schemeClr val="accent1"/>
+          </a:fillRef>
+          <a:effectRef idx="0">
+            <a:schemeClr val="accent1"/>
+          </a:effectRef>
+          <a:fontRef idx="minor">
+            <a:schemeClr val="lt1"/>
+          </a:fontRef>
+        </p:style>
+        <p:txBody>
+          <a:bodyPr rtlCol="0" anchor="ctr"/>
+          <a:lstStyle/>
+          <a:p>
+            <a:pPr algn="ctr"/>
+            <a:endParaRPr lang="de-DE"/>
+          </a:p>
+        </p:txBody>
+      </p:sp>
+      <p:sp>
+        <p:nvSpPr>
+          <p:cNvPr id="31" name="Rechteck 30">
+            <a:extLst>
+              <a:ext uri="{FF2B5EF4-FFF2-40B4-BE49-F238E27FC236}">
+                <a16:creationId xmlns:a16="http://schemas.microsoft.com/office/drawing/2014/main" id="{DF0BA6A4-5A9A-4A0A-C9B8-BD2C5AF4C8D3}"/>
+              </a:ext>
+            </a:extLst>
+          </p:cNvPr>
+          <p:cNvSpPr/>
+          <p:nvPr/>
+        </p:nvSpPr>
+        <p:spPr>
+          <a:xfrm flipV="1">
+            <a:off x="2409825" y="6223987"/>
+            <a:ext cx="3240000" cy="540000"/>
+          </a:xfrm>
+          <a:prstGeom prst="rect">
+            <a:avLst/>
+          </a:prstGeom>
+          <a:solidFill>
+            <a:srgbClr val="FFFF00"/>
+          </a:solidFill>
+          <a:ln>
+            <a:noFill/>
+          </a:ln>
+        </p:spPr>
+        <p:style>
+          <a:lnRef idx="2">
+            <a:schemeClr val="accent1">
+              <a:shade val="50000"/>
+            </a:schemeClr>
+          </a:lnRef>
+          <a:fillRef idx="1">
+            <a:schemeClr val="accent1"/>
+          </a:fillRef>
+          <a:effectRef idx="0">
+            <a:schemeClr val="accent1"/>
+          </a:effectRef>
+          <a:fontRef idx="minor">
+            <a:schemeClr val="lt1"/>
+          </a:fontRef>
+        </p:style>
+        <p:txBody>
+          <a:bodyPr rtlCol="0" anchor="ctr"/>
+          <a:lstStyle/>
+          <a:p>
+            <a:pPr algn="ctr"/>
+            <a:endParaRPr lang="de-DE"/>
+          </a:p>
+        </p:txBody>
+      </p:sp>
+      <p:sp>
+        <p:nvSpPr>
+          <p:cNvPr id="32" name="Rechteck 31">
+            <a:extLst>
+              <a:ext uri="{FF2B5EF4-FFF2-40B4-BE49-F238E27FC236}">
+                <a16:creationId xmlns:a16="http://schemas.microsoft.com/office/drawing/2014/main" id="{ED832CF2-C3D6-F001-A0F8-2C20C485B4AB}"/>
+              </a:ext>
+            </a:extLst>
+          </p:cNvPr>
+          <p:cNvSpPr/>
+          <p:nvPr/>
+        </p:nvSpPr>
+        <p:spPr>
+          <a:xfrm flipV="1">
+            <a:off x="1329825" y="5683987"/>
+            <a:ext cx="5400000" cy="540000"/>
+          </a:xfrm>
+          <a:prstGeom prst="rect">
+            <a:avLst/>
+          </a:prstGeom>
+          <a:solidFill>
+            <a:srgbClr val="FFFF00"/>
+          </a:solidFill>
+          <a:ln>
+            <a:noFill/>
+          </a:ln>
+        </p:spPr>
+        <p:style>
+          <a:lnRef idx="2">
+            <a:schemeClr val="accent1">
+              <a:shade val="50000"/>
+            </a:schemeClr>
+          </a:lnRef>
+          <a:fillRef idx="1">
+            <a:schemeClr val="accent1"/>
+          </a:fillRef>
+          <a:effectRef idx="0">
+            <a:schemeClr val="accent1"/>
+          </a:effectRef>
+          <a:fontRef idx="minor">
+            <a:schemeClr val="lt1"/>
+          </a:fontRef>
+        </p:style>
+        <p:txBody>
+          <a:bodyPr rtlCol="0" anchor="ctr"/>
+          <a:lstStyle/>
+          <a:p>
+            <a:pPr algn="ctr"/>
+            <a:endParaRPr lang="de-DE"/>
+          </a:p>
+        </p:txBody>
+      </p:sp>
+      <p:sp>
+        <p:nvSpPr>
+          <p:cNvPr id="33" name="Rechteck 32">
+            <a:extLst>
+              <a:ext uri="{FF2B5EF4-FFF2-40B4-BE49-F238E27FC236}">
+                <a16:creationId xmlns:a16="http://schemas.microsoft.com/office/drawing/2014/main" id="{24692D2F-0540-C87D-A89A-235DA94D378A}"/>
+              </a:ext>
+            </a:extLst>
+          </p:cNvPr>
+          <p:cNvSpPr/>
+          <p:nvPr/>
+        </p:nvSpPr>
+        <p:spPr>
+          <a:xfrm flipV="1">
+            <a:off x="789825" y="4963987"/>
+            <a:ext cx="6480000" cy="720000"/>
+          </a:xfrm>
+          <a:prstGeom prst="rect">
+            <a:avLst/>
+          </a:prstGeom>
+          <a:solidFill>
+            <a:srgbClr val="FFFF00"/>
+          </a:solidFill>
+          <a:ln>
+            <a:noFill/>
+          </a:ln>
+        </p:spPr>
+        <p:style>
+          <a:lnRef idx="2">
+            <a:schemeClr val="accent1">
+              <a:shade val="50000"/>
+            </a:schemeClr>
+          </a:lnRef>
+          <a:fillRef idx="1">
+            <a:schemeClr val="accent1"/>
+          </a:fillRef>
+          <a:effectRef idx="0">
+            <a:schemeClr val="accent1"/>
+          </a:effectRef>
+          <a:fontRef idx="minor">
+            <a:schemeClr val="lt1"/>
+          </a:fontRef>
+        </p:style>
+        <p:txBody>
+          <a:bodyPr rtlCol="0" anchor="ctr"/>
+          <a:lstStyle/>
+          <a:p>
+            <a:pPr algn="ctr"/>
+            <a:endParaRPr lang="de-DE"/>
+          </a:p>
+        </p:txBody>
+      </p:sp>
+      <p:sp>
+        <p:nvSpPr>
+          <p:cNvPr id="34" name="Rechteck 33">
+            <a:extLst>
+              <a:ext uri="{FF2B5EF4-FFF2-40B4-BE49-F238E27FC236}">
+                <a16:creationId xmlns:a16="http://schemas.microsoft.com/office/drawing/2014/main" id="{95BE6A54-EAD9-BE2E-E24B-D361CB1ED49F}"/>
+              </a:ext>
+            </a:extLst>
+          </p:cNvPr>
+          <p:cNvSpPr/>
+          <p:nvPr/>
+        </p:nvSpPr>
+        <p:spPr>
+          <a:xfrm flipV="1">
+            <a:off x="1809750" y="4423987"/>
+            <a:ext cx="5906250" cy="540000"/>
+          </a:xfrm>
+          <a:prstGeom prst="rect">
+            <a:avLst/>
+          </a:prstGeom>
+          <a:solidFill>
+            <a:srgbClr val="FFFF00"/>
+          </a:solidFill>
+          <a:ln>
+            <a:noFill/>
+          </a:ln>
+        </p:spPr>
+        <p:style>
+          <a:lnRef idx="2">
+            <a:schemeClr val="accent1">
+              <a:shade val="50000"/>
+            </a:schemeClr>
+          </a:lnRef>
+          <a:fillRef idx="1">
+            <a:schemeClr val="accent1"/>
+          </a:fillRef>
+          <a:effectRef idx="0">
+            <a:schemeClr val="accent1"/>
+          </a:effectRef>
+          <a:fontRef idx="minor">
+            <a:schemeClr val="lt1"/>
+          </a:fontRef>
+        </p:style>
+        <p:txBody>
+          <a:bodyPr rtlCol="0" anchor="ctr"/>
+          <a:lstStyle/>
+          <a:p>
+            <a:pPr algn="ctr"/>
+            <a:endParaRPr lang="de-DE"/>
+          </a:p>
+        </p:txBody>
+      </p:sp>
+      <p:sp>
+        <p:nvSpPr>
+          <p:cNvPr id="35" name="Rechteck 34">
+            <a:extLst>
+              <a:ext uri="{FF2B5EF4-FFF2-40B4-BE49-F238E27FC236}">
+                <a16:creationId xmlns:a16="http://schemas.microsoft.com/office/drawing/2014/main" id="{3E638F6E-C937-E974-FEFC-560B6E58A409}"/>
+              </a:ext>
+            </a:extLst>
+          </p:cNvPr>
+          <p:cNvSpPr/>
+          <p:nvPr/>
+        </p:nvSpPr>
+        <p:spPr>
+          <a:xfrm flipV="1">
+            <a:off x="3533775" y="3877612"/>
+            <a:ext cx="4182225" cy="540000"/>
+          </a:xfrm>
+          <a:prstGeom prst="rect">
+            <a:avLst/>
+          </a:prstGeom>
+          <a:solidFill>
+            <a:srgbClr val="FFFF00"/>
+          </a:solidFill>
+          <a:ln>
+            <a:noFill/>
+          </a:ln>
+        </p:spPr>
+        <p:style>
+          <a:lnRef idx="2">
+            <a:schemeClr val="accent1">
+              <a:shade val="50000"/>
+            </a:schemeClr>
+          </a:lnRef>
+          <a:fillRef idx="1">
+            <a:schemeClr val="accent1"/>
+          </a:fillRef>
+          <a:effectRef idx="0">
+            <a:schemeClr val="accent1"/>
+          </a:effectRef>
+          <a:fontRef idx="minor">
+            <a:schemeClr val="lt1"/>
+          </a:fontRef>
+        </p:style>
+        <p:txBody>
+          <a:bodyPr rtlCol="0" anchor="ctr"/>
+          <a:lstStyle/>
+          <a:p>
+            <a:pPr algn="ctr"/>
+            <a:endParaRPr lang="de-DE"/>
+          </a:p>
+        </p:txBody>
+      </p:sp>
+    </p:spTree>
+    <p:extLst>
+      <p:ext uri="{BB962C8B-B14F-4D97-AF65-F5344CB8AC3E}">
+        <p14:creationId xmlns:p14="http://schemas.microsoft.com/office/powerpoint/2010/main" val="1364065266"/>
+      </p:ext>
+    </p:extLst>
+  </p:cSld>
+  <p:clrMapOvr>
+    <a:masterClrMapping/>
+  </p:clrMapOvr>
+</p:sld>
+</file>
+
+<file path=ppt/slides/slide29.xml><?xml version="1.0" encoding="utf-8"?>
+<p:sld xmlns:a="http://schemas.openxmlformats.org/drawingml/2006/main" xmlns:r="http://schemas.openxmlformats.org/officeDocument/2006/relationships" xmlns:p="http://schemas.openxmlformats.org/presentationml/2006/main">
+  <p:cSld>
+    <p:spTree>
+      <p:nvGrpSpPr>
+        <p:cNvPr id="1" name=""/>
+        <p:cNvGrpSpPr/>
+        <p:nvPr/>
+      </p:nvGrpSpPr>
+      <p:grpSpPr>
+        <a:xfrm>
+          <a:off x="0" y="0"/>
+          <a:ext cx="0" cy="0"/>
+          <a:chOff x="0" y="0"/>
+          <a:chExt cx="0" cy="0"/>
+        </a:xfrm>
+      </p:grpSpPr>
+      <p:pic>
+        <p:nvPicPr>
+          <p:cNvPr id="4" name="Grafik 3">
+            <a:extLst>
+              <a:ext uri="{FF2B5EF4-FFF2-40B4-BE49-F238E27FC236}">
+                <a16:creationId xmlns:a16="http://schemas.microsoft.com/office/drawing/2014/main" id="{C84C88EE-0C46-9C20-D5DD-70ADD0B92C81}"/>
+              </a:ext>
+            </a:extLst>
+          </p:cNvPr>
+          <p:cNvPicPr>
+            <a:picLocks noChangeAspect="1"/>
+          </p:cNvPicPr>
+          <p:nvPr/>
+        </p:nvPicPr>
+        <p:blipFill>
+          <a:blip r:embed="rId2"/>
+          <a:stretch>
+            <a:fillRect/>
+          </a:stretch>
+        </p:blipFill>
+        <p:spPr>
+          <a:xfrm>
+            <a:off x="8132187" y="-219467"/>
+            <a:ext cx="5640963" cy="1893334"/>
+          </a:xfrm>
+          <a:prstGeom prst="rect">
+            <a:avLst/>
+          </a:prstGeom>
+        </p:spPr>
+      </p:pic>
+      <p:sp>
+        <p:nvSpPr>
+          <p:cNvPr id="5" name="Rechteck 4">
+            <a:extLst>
+              <a:ext uri="{FF2B5EF4-FFF2-40B4-BE49-F238E27FC236}">
+                <a16:creationId xmlns:a16="http://schemas.microsoft.com/office/drawing/2014/main" id="{D967439E-67E4-DED6-1BF4-90C414EEB6FB}"/>
+              </a:ext>
+            </a:extLst>
+          </p:cNvPr>
+          <p:cNvSpPr/>
+          <p:nvPr/>
+        </p:nvSpPr>
+        <p:spPr>
+          <a:xfrm>
+            <a:off x="2409825" y="457200"/>
+            <a:ext cx="3240000" cy="540000"/>
+          </a:xfrm>
+          <a:prstGeom prst="rect">
+            <a:avLst/>
+          </a:prstGeom>
+          <a:solidFill>
+            <a:srgbClr val="FFFF00"/>
+          </a:solidFill>
+          <a:ln>
+            <a:noFill/>
+          </a:ln>
+        </p:spPr>
+        <p:style>
+          <a:lnRef idx="2">
+            <a:schemeClr val="accent1">
+              <a:shade val="50000"/>
+            </a:schemeClr>
+          </a:lnRef>
+          <a:fillRef idx="1">
+            <a:schemeClr val="accent1"/>
+          </a:fillRef>
+          <a:effectRef idx="0">
+            <a:schemeClr val="accent1"/>
+          </a:effectRef>
+          <a:fontRef idx="minor">
+            <a:schemeClr val="lt1"/>
+          </a:fontRef>
+        </p:style>
+        <p:txBody>
+          <a:bodyPr rtlCol="0" anchor="ctr"/>
+          <a:lstStyle/>
+          <a:p>
+            <a:pPr algn="ctr"/>
+            <a:endParaRPr lang="de-DE"/>
+          </a:p>
+        </p:txBody>
+      </p:sp>
+      <p:sp>
+        <p:nvSpPr>
+          <p:cNvPr id="6" name="Rechteck 5">
+            <a:extLst>
+              <a:ext uri="{FF2B5EF4-FFF2-40B4-BE49-F238E27FC236}">
+                <a16:creationId xmlns:a16="http://schemas.microsoft.com/office/drawing/2014/main" id="{321B1B6D-AAE1-0C6D-549B-858B07A1745E}"/>
+              </a:ext>
+            </a:extLst>
+          </p:cNvPr>
+          <p:cNvSpPr/>
+          <p:nvPr/>
+        </p:nvSpPr>
+        <p:spPr>
+          <a:xfrm>
+            <a:off x="1329825" y="997200"/>
+            <a:ext cx="5400000" cy="540000"/>
+          </a:xfrm>
+          <a:prstGeom prst="rect">
+            <a:avLst/>
+          </a:prstGeom>
+          <a:solidFill>
+            <a:srgbClr val="FFFF00"/>
+          </a:solidFill>
+          <a:ln>
+            <a:noFill/>
+          </a:ln>
+        </p:spPr>
+        <p:style>
+          <a:lnRef idx="2">
+            <a:schemeClr val="accent1">
+              <a:shade val="50000"/>
+            </a:schemeClr>
+          </a:lnRef>
+          <a:fillRef idx="1">
+            <a:schemeClr val="accent1"/>
+          </a:fillRef>
+          <a:effectRef idx="0">
+            <a:schemeClr val="accent1"/>
+          </a:effectRef>
+          <a:fontRef idx="minor">
+            <a:schemeClr val="lt1"/>
+          </a:fontRef>
+        </p:style>
+        <p:txBody>
+          <a:bodyPr rtlCol="0" anchor="ctr"/>
+          <a:lstStyle/>
+          <a:p>
+            <a:pPr algn="ctr"/>
+            <a:endParaRPr lang="de-DE"/>
+          </a:p>
+        </p:txBody>
+      </p:sp>
+      <p:sp>
+        <p:nvSpPr>
+          <p:cNvPr id="7" name="Rechteck 6">
+            <a:extLst>
+              <a:ext uri="{FF2B5EF4-FFF2-40B4-BE49-F238E27FC236}">
+                <a16:creationId xmlns:a16="http://schemas.microsoft.com/office/drawing/2014/main" id="{97F179B5-9DF3-2B74-04EB-727904D26BF7}"/>
+              </a:ext>
+            </a:extLst>
+          </p:cNvPr>
+          <p:cNvSpPr/>
+          <p:nvPr/>
+        </p:nvSpPr>
+        <p:spPr>
+          <a:xfrm>
+            <a:off x="789825" y="1537200"/>
+            <a:ext cx="6480000" cy="720000"/>
+          </a:xfrm>
+          <a:prstGeom prst="rect">
+            <a:avLst/>
+          </a:prstGeom>
+          <a:solidFill>
+            <a:srgbClr val="FFFF00"/>
+          </a:solidFill>
+          <a:ln>
+            <a:noFill/>
+          </a:ln>
+        </p:spPr>
+        <p:style>
+          <a:lnRef idx="2">
+            <a:schemeClr val="accent1">
+              <a:shade val="50000"/>
+            </a:schemeClr>
+          </a:lnRef>
+          <a:fillRef idx="1">
+            <a:schemeClr val="accent1"/>
+          </a:fillRef>
+          <a:effectRef idx="0">
+            <a:schemeClr val="accent1"/>
+          </a:effectRef>
+          <a:fontRef idx="minor">
+            <a:schemeClr val="lt1"/>
+          </a:fontRef>
+        </p:style>
+        <p:txBody>
+          <a:bodyPr rtlCol="0" anchor="ctr"/>
+          <a:lstStyle/>
+          <a:p>
+            <a:pPr algn="ctr"/>
+            <a:endParaRPr lang="de-DE"/>
+          </a:p>
+        </p:txBody>
+      </p:sp>
+      <p:sp>
+        <p:nvSpPr>
+          <p:cNvPr id="8" name="Rechteck 7">
+            <a:extLst>
+              <a:ext uri="{FF2B5EF4-FFF2-40B4-BE49-F238E27FC236}">
+                <a16:creationId xmlns:a16="http://schemas.microsoft.com/office/drawing/2014/main" id="{621D07C6-D9CF-8EAC-CFAC-716C7A1D6D55}"/>
+              </a:ext>
+            </a:extLst>
+          </p:cNvPr>
+          <p:cNvSpPr/>
+          <p:nvPr/>
+        </p:nvSpPr>
+        <p:spPr>
+          <a:xfrm>
+            <a:off x="342899" y="2257200"/>
+            <a:ext cx="7373101" cy="540000"/>
+          </a:xfrm>
+          <a:prstGeom prst="rect">
+            <a:avLst/>
+          </a:prstGeom>
+          <a:solidFill>
+            <a:srgbClr val="FFFF00"/>
+          </a:solidFill>
+          <a:ln>
+            <a:noFill/>
+          </a:ln>
+        </p:spPr>
+        <p:style>
+          <a:lnRef idx="2">
+            <a:schemeClr val="accent1">
+              <a:shade val="50000"/>
+            </a:schemeClr>
+          </a:lnRef>
+          <a:fillRef idx="1">
+            <a:schemeClr val="accent1"/>
+          </a:fillRef>
+          <a:effectRef idx="0">
+            <a:schemeClr val="accent1"/>
+          </a:effectRef>
+          <a:fontRef idx="minor">
+            <a:schemeClr val="lt1"/>
+          </a:fontRef>
+        </p:style>
+        <p:txBody>
+          <a:bodyPr rtlCol="0" anchor="ctr"/>
+          <a:lstStyle/>
+          <a:p>
+            <a:pPr algn="ctr"/>
+            <a:endParaRPr lang="de-DE"/>
+          </a:p>
+        </p:txBody>
+      </p:sp>
+      <p:sp>
+        <p:nvSpPr>
+          <p:cNvPr id="9" name="Rechteck 8">
+            <a:extLst>
+              <a:ext uri="{FF2B5EF4-FFF2-40B4-BE49-F238E27FC236}">
+                <a16:creationId xmlns:a16="http://schemas.microsoft.com/office/drawing/2014/main" id="{CF80056C-CF95-BA41-1B51-BAFBCBA0DBA8}"/>
+              </a:ext>
+            </a:extLst>
+          </p:cNvPr>
+          <p:cNvSpPr/>
+          <p:nvPr/>
+        </p:nvSpPr>
+        <p:spPr>
+          <a:xfrm>
+            <a:off x="342899" y="2803575"/>
+            <a:ext cx="7373101" cy="540000"/>
+          </a:xfrm>
+          <a:prstGeom prst="rect">
+            <a:avLst/>
+          </a:prstGeom>
+          <a:solidFill>
+            <a:srgbClr val="FFFF00"/>
+          </a:solidFill>
+          <a:ln>
+            <a:noFill/>
+          </a:ln>
+        </p:spPr>
+        <p:style>
+          <a:lnRef idx="2">
+            <a:schemeClr val="accent1">
+              <a:shade val="50000"/>
+            </a:schemeClr>
+          </a:lnRef>
+          <a:fillRef idx="1">
+            <a:schemeClr val="accent1"/>
+          </a:fillRef>
+          <a:effectRef idx="0">
+            <a:schemeClr val="accent1"/>
+          </a:effectRef>
+          <a:fontRef idx="minor">
+            <a:schemeClr val="lt1"/>
+          </a:fontRef>
+        </p:style>
+        <p:txBody>
+          <a:bodyPr rtlCol="0" anchor="ctr"/>
+          <a:lstStyle/>
+          <a:p>
+            <a:pPr algn="ctr"/>
+            <a:endParaRPr lang="de-DE"/>
+          </a:p>
+        </p:txBody>
+      </p:sp>
+      <p:sp>
+        <p:nvSpPr>
+          <p:cNvPr id="10" name="Rechteck 9">
+            <a:extLst>
+              <a:ext uri="{FF2B5EF4-FFF2-40B4-BE49-F238E27FC236}">
+                <a16:creationId xmlns:a16="http://schemas.microsoft.com/office/drawing/2014/main" id="{E7DAEE87-A6DB-1788-8D54-44AD751E8005}"/>
+              </a:ext>
+            </a:extLst>
+          </p:cNvPr>
+          <p:cNvSpPr/>
+          <p:nvPr/>
+        </p:nvSpPr>
+        <p:spPr>
+          <a:xfrm>
+            <a:off x="342900" y="3343575"/>
+            <a:ext cx="7373100" cy="540000"/>
+          </a:xfrm>
+          <a:prstGeom prst="rect">
+            <a:avLst/>
+          </a:prstGeom>
+          <a:solidFill>
+            <a:srgbClr val="FFFF00"/>
+          </a:solidFill>
+          <a:ln>
+            <a:noFill/>
+          </a:ln>
+        </p:spPr>
+        <p:style>
+          <a:lnRef idx="2">
+            <a:schemeClr val="accent1">
+              <a:shade val="50000"/>
+            </a:schemeClr>
+          </a:lnRef>
+          <a:fillRef idx="1">
+            <a:schemeClr val="accent1"/>
+          </a:fillRef>
+          <a:effectRef idx="0">
+            <a:schemeClr val="accent1"/>
+          </a:effectRef>
+          <a:fontRef idx="minor">
+            <a:schemeClr val="lt1"/>
+          </a:fontRef>
+        </p:style>
+        <p:txBody>
+          <a:bodyPr rtlCol="0" anchor="ctr"/>
+          <a:lstStyle/>
+          <a:p>
+            <a:pPr algn="ctr"/>
+            <a:endParaRPr lang="de-DE"/>
+          </a:p>
+        </p:txBody>
+      </p:sp>
+      <p:sp>
+        <p:nvSpPr>
+          <p:cNvPr id="11" name="Rechteck 10">
+            <a:extLst>
+              <a:ext uri="{FF2B5EF4-FFF2-40B4-BE49-F238E27FC236}">
+                <a16:creationId xmlns:a16="http://schemas.microsoft.com/office/drawing/2014/main" id="{7B302079-0716-E84D-5AE7-37FA20A62AAA}"/>
+              </a:ext>
+            </a:extLst>
+          </p:cNvPr>
+          <p:cNvSpPr/>
+          <p:nvPr/>
+        </p:nvSpPr>
+        <p:spPr>
+          <a:xfrm flipV="1">
+            <a:off x="2409825" y="6223987"/>
+            <a:ext cx="3240000" cy="540000"/>
+          </a:xfrm>
+          <a:prstGeom prst="rect">
+            <a:avLst/>
+          </a:prstGeom>
+          <a:solidFill>
+            <a:srgbClr val="FFFF00"/>
+          </a:solidFill>
+          <a:ln>
+            <a:noFill/>
+          </a:ln>
+        </p:spPr>
+        <p:style>
+          <a:lnRef idx="2">
+            <a:schemeClr val="accent1">
+              <a:shade val="50000"/>
+            </a:schemeClr>
+          </a:lnRef>
+          <a:fillRef idx="1">
+            <a:schemeClr val="accent1"/>
+          </a:fillRef>
+          <a:effectRef idx="0">
+            <a:schemeClr val="accent1"/>
+          </a:effectRef>
+          <a:fontRef idx="minor">
+            <a:schemeClr val="lt1"/>
+          </a:fontRef>
+        </p:style>
+        <p:txBody>
+          <a:bodyPr rtlCol="0" anchor="ctr"/>
+          <a:lstStyle/>
+          <a:p>
+            <a:pPr algn="ctr"/>
+            <a:endParaRPr lang="de-DE"/>
+          </a:p>
+        </p:txBody>
+      </p:sp>
+      <p:sp>
+        <p:nvSpPr>
+          <p:cNvPr id="12" name="Rechteck 11">
+            <a:extLst>
+              <a:ext uri="{FF2B5EF4-FFF2-40B4-BE49-F238E27FC236}">
+                <a16:creationId xmlns:a16="http://schemas.microsoft.com/office/drawing/2014/main" id="{72DACB65-E68C-3CF1-0CC5-C507F49719B3}"/>
+              </a:ext>
+            </a:extLst>
+          </p:cNvPr>
+          <p:cNvSpPr/>
+          <p:nvPr/>
+        </p:nvSpPr>
+        <p:spPr>
+          <a:xfrm flipV="1">
+            <a:off x="1329825" y="5683987"/>
+            <a:ext cx="5400000" cy="540000"/>
+          </a:xfrm>
+          <a:prstGeom prst="rect">
+            <a:avLst/>
+          </a:prstGeom>
+          <a:solidFill>
+            <a:srgbClr val="FFFF00"/>
+          </a:solidFill>
+          <a:ln>
+            <a:noFill/>
+          </a:ln>
+        </p:spPr>
+        <p:style>
+          <a:lnRef idx="2">
+            <a:schemeClr val="accent1">
+              <a:shade val="50000"/>
+            </a:schemeClr>
+          </a:lnRef>
+          <a:fillRef idx="1">
+            <a:schemeClr val="accent1"/>
+          </a:fillRef>
+          <a:effectRef idx="0">
+            <a:schemeClr val="accent1"/>
+          </a:effectRef>
+          <a:fontRef idx="minor">
+            <a:schemeClr val="lt1"/>
+          </a:fontRef>
+        </p:style>
+        <p:txBody>
+          <a:bodyPr rtlCol="0" anchor="ctr"/>
+          <a:lstStyle/>
+          <a:p>
+            <a:pPr algn="ctr"/>
+            <a:endParaRPr lang="de-DE"/>
+          </a:p>
+        </p:txBody>
+      </p:sp>
+      <p:sp>
+        <p:nvSpPr>
+          <p:cNvPr id="13" name="Rechteck 12">
+            <a:extLst>
+              <a:ext uri="{FF2B5EF4-FFF2-40B4-BE49-F238E27FC236}">
+                <a16:creationId xmlns:a16="http://schemas.microsoft.com/office/drawing/2014/main" id="{777CEB30-F3D5-81BC-FB0D-EC1264BD6495}"/>
+              </a:ext>
+            </a:extLst>
+          </p:cNvPr>
+          <p:cNvSpPr/>
+          <p:nvPr/>
+        </p:nvSpPr>
+        <p:spPr>
+          <a:xfrm flipV="1">
+            <a:off x="789825" y="4963987"/>
+            <a:ext cx="6480000" cy="720000"/>
+          </a:xfrm>
+          <a:prstGeom prst="rect">
+            <a:avLst/>
+          </a:prstGeom>
+          <a:solidFill>
+            <a:srgbClr val="FFFF00"/>
+          </a:solidFill>
+          <a:ln>
+            <a:noFill/>
+          </a:ln>
+        </p:spPr>
+        <p:style>
+          <a:lnRef idx="2">
+            <a:schemeClr val="accent1">
+              <a:shade val="50000"/>
+            </a:schemeClr>
+          </a:lnRef>
+          <a:fillRef idx="1">
+            <a:schemeClr val="accent1"/>
+          </a:fillRef>
+          <a:effectRef idx="0">
+            <a:schemeClr val="accent1"/>
+          </a:effectRef>
+          <a:fontRef idx="minor">
+            <a:schemeClr val="lt1"/>
+          </a:fontRef>
+        </p:style>
+        <p:txBody>
+          <a:bodyPr rtlCol="0" anchor="ctr"/>
+          <a:lstStyle/>
+          <a:p>
+            <a:pPr algn="ctr"/>
+            <a:endParaRPr lang="de-DE"/>
+          </a:p>
+        </p:txBody>
+      </p:sp>
+      <p:sp>
+        <p:nvSpPr>
+          <p:cNvPr id="14" name="Rechteck 13">
+            <a:extLst>
+              <a:ext uri="{FF2B5EF4-FFF2-40B4-BE49-F238E27FC236}">
+                <a16:creationId xmlns:a16="http://schemas.microsoft.com/office/drawing/2014/main" id="{B4342FB4-4583-0AE5-E665-0B94E728BE83}"/>
+              </a:ext>
+            </a:extLst>
+          </p:cNvPr>
+          <p:cNvSpPr/>
+          <p:nvPr/>
+        </p:nvSpPr>
+        <p:spPr>
+          <a:xfrm flipV="1">
+            <a:off x="342900" y="4423987"/>
+            <a:ext cx="7373100" cy="540000"/>
+          </a:xfrm>
+          <a:prstGeom prst="rect">
+            <a:avLst/>
+          </a:prstGeom>
+          <a:solidFill>
+            <a:srgbClr val="FFFF00"/>
+          </a:solidFill>
+          <a:ln>
+            <a:noFill/>
+          </a:ln>
+        </p:spPr>
+        <p:style>
+          <a:lnRef idx="2">
+            <a:schemeClr val="accent1">
+              <a:shade val="50000"/>
+            </a:schemeClr>
+          </a:lnRef>
+          <a:fillRef idx="1">
+            <a:schemeClr val="accent1"/>
+          </a:fillRef>
+          <a:effectRef idx="0">
+            <a:schemeClr val="accent1"/>
+          </a:effectRef>
+          <a:fontRef idx="minor">
+            <a:schemeClr val="lt1"/>
+          </a:fontRef>
+        </p:style>
+        <p:txBody>
+          <a:bodyPr rtlCol="0" anchor="ctr"/>
+          <a:lstStyle/>
+          <a:p>
+            <a:pPr algn="ctr"/>
+            <a:endParaRPr lang="de-DE"/>
+          </a:p>
+        </p:txBody>
+      </p:sp>
+      <p:sp>
+        <p:nvSpPr>
+          <p:cNvPr id="15" name="Rechteck 14">
+            <a:extLst>
+              <a:ext uri="{FF2B5EF4-FFF2-40B4-BE49-F238E27FC236}">
+                <a16:creationId xmlns:a16="http://schemas.microsoft.com/office/drawing/2014/main" id="{3A463C17-5ED4-5AE4-9EAF-31C9D1747A28}"/>
+              </a:ext>
+            </a:extLst>
+          </p:cNvPr>
+          <p:cNvSpPr/>
+          <p:nvPr/>
+        </p:nvSpPr>
+        <p:spPr>
+          <a:xfrm flipV="1">
+            <a:off x="342901" y="3877612"/>
+            <a:ext cx="7373100" cy="540000"/>
+          </a:xfrm>
+          <a:prstGeom prst="rect">
+            <a:avLst/>
+          </a:prstGeom>
+          <a:solidFill>
+            <a:srgbClr val="FFFF00"/>
+          </a:solidFill>
+          <a:ln>
+            <a:noFill/>
+          </a:ln>
+        </p:spPr>
+        <p:style>
+          <a:lnRef idx="2">
+            <a:schemeClr val="accent1">
+              <a:shade val="50000"/>
+            </a:schemeClr>
+          </a:lnRef>
+          <a:fillRef idx="1">
+            <a:schemeClr val="accent1"/>
+          </a:fillRef>
+          <a:effectRef idx="0">
+            <a:schemeClr val="accent1"/>
+          </a:effectRef>
+          <a:fontRef idx="minor">
+            <a:schemeClr val="lt1"/>
+          </a:fontRef>
+        </p:style>
+        <p:txBody>
+          <a:bodyPr rtlCol="0" anchor="ctr"/>
+          <a:lstStyle/>
+          <a:p>
+            <a:pPr algn="ctr"/>
+            <a:endParaRPr lang="de-DE"/>
+          </a:p>
+        </p:txBody>
+      </p:sp>
+    </p:spTree>
+    <p:extLst>
+      <p:ext uri="{BB962C8B-B14F-4D97-AF65-F5344CB8AC3E}">
+        <p14:creationId xmlns:p14="http://schemas.microsoft.com/office/powerpoint/2010/main" val="4075284749"/>
+      </p:ext>
+    </p:extLst>
+  </p:cSld>
+  <p:clrMapOvr>
+    <a:masterClrMapping/>
+  </p:clrMapOvr>
+</p:sld>
+</file>
+
 <file path=ppt/slides/slide3.xml><?xml version="1.0" encoding="utf-8"?>
 <p:sld xmlns:a="http://schemas.openxmlformats.org/drawingml/2006/main" xmlns:r="http://schemas.openxmlformats.org/officeDocument/2006/relationships" xmlns:p="http://schemas.openxmlformats.org/presentationml/2006/main">
   <p:cSld>
@@ -38527,6 +39794,638 @@
 </p:sld>
 </file>
 
+<file path=ppt/slides/slide30.xml><?xml version="1.0" encoding="utf-8"?>
+<p:sld xmlns:a="http://schemas.openxmlformats.org/drawingml/2006/main" xmlns:r="http://schemas.openxmlformats.org/officeDocument/2006/relationships" xmlns:p="http://schemas.openxmlformats.org/presentationml/2006/main">
+  <p:cSld>
+    <p:spTree>
+      <p:nvGrpSpPr>
+        <p:cNvPr id="1" name=""/>
+        <p:cNvGrpSpPr/>
+        <p:nvPr/>
+      </p:nvGrpSpPr>
+      <p:grpSpPr>
+        <a:xfrm>
+          <a:off x="0" y="0"/>
+          <a:ext cx="0" cy="0"/>
+          <a:chOff x="0" y="0"/>
+          <a:chExt cx="0" cy="0"/>
+        </a:xfrm>
+      </p:grpSpPr>
+      <p:pic>
+        <p:nvPicPr>
+          <p:cNvPr id="4" name="Grafik 3">
+            <a:extLst>
+              <a:ext uri="{FF2B5EF4-FFF2-40B4-BE49-F238E27FC236}">
+                <a16:creationId xmlns:a16="http://schemas.microsoft.com/office/drawing/2014/main" id="{1B860D71-B48A-F74E-3304-6B8BF40E591D}"/>
+              </a:ext>
+            </a:extLst>
+          </p:cNvPr>
+          <p:cNvPicPr>
+            <a:picLocks noChangeAspect="1"/>
+          </p:cNvPicPr>
+          <p:nvPr/>
+        </p:nvPicPr>
+        <p:blipFill>
+          <a:blip r:embed="rId2"/>
+          <a:stretch>
+            <a:fillRect/>
+          </a:stretch>
+        </p:blipFill>
+        <p:spPr>
+          <a:xfrm>
+            <a:off x="8865612" y="3866"/>
+            <a:ext cx="5640963" cy="1893334"/>
+          </a:xfrm>
+          <a:prstGeom prst="rect">
+            <a:avLst/>
+          </a:prstGeom>
+        </p:spPr>
+      </p:pic>
+      <p:sp>
+        <p:nvSpPr>
+          <p:cNvPr id="5" name="Rechteck 4">
+            <a:extLst>
+              <a:ext uri="{FF2B5EF4-FFF2-40B4-BE49-F238E27FC236}">
+                <a16:creationId xmlns:a16="http://schemas.microsoft.com/office/drawing/2014/main" id="{945AD719-AFAD-D7A6-2015-C342A770515E}"/>
+              </a:ext>
+            </a:extLst>
+          </p:cNvPr>
+          <p:cNvSpPr/>
+          <p:nvPr/>
+        </p:nvSpPr>
+        <p:spPr>
+          <a:xfrm>
+            <a:off x="2409825" y="457200"/>
+            <a:ext cx="3240000" cy="540000"/>
+          </a:xfrm>
+          <a:prstGeom prst="rect">
+            <a:avLst/>
+          </a:prstGeom>
+          <a:solidFill>
+            <a:srgbClr val="FFFF00"/>
+          </a:solidFill>
+          <a:ln>
+            <a:noFill/>
+          </a:ln>
+        </p:spPr>
+        <p:style>
+          <a:lnRef idx="2">
+            <a:schemeClr val="accent1">
+              <a:shade val="50000"/>
+            </a:schemeClr>
+          </a:lnRef>
+          <a:fillRef idx="1">
+            <a:schemeClr val="accent1"/>
+          </a:fillRef>
+          <a:effectRef idx="0">
+            <a:schemeClr val="accent1"/>
+          </a:effectRef>
+          <a:fontRef idx="minor">
+            <a:schemeClr val="lt1"/>
+          </a:fontRef>
+        </p:style>
+        <p:txBody>
+          <a:bodyPr rtlCol="0" anchor="ctr"/>
+          <a:lstStyle/>
+          <a:p>
+            <a:pPr algn="ctr"/>
+            <a:endParaRPr lang="de-DE"/>
+          </a:p>
+        </p:txBody>
+      </p:sp>
+      <p:sp>
+        <p:nvSpPr>
+          <p:cNvPr id="6" name="Rechteck 5">
+            <a:extLst>
+              <a:ext uri="{FF2B5EF4-FFF2-40B4-BE49-F238E27FC236}">
+                <a16:creationId xmlns:a16="http://schemas.microsoft.com/office/drawing/2014/main" id="{01BBA6C3-FC49-7E6D-E867-3D481DF3E5B7}"/>
+              </a:ext>
+            </a:extLst>
+          </p:cNvPr>
+          <p:cNvSpPr/>
+          <p:nvPr/>
+        </p:nvSpPr>
+        <p:spPr>
+          <a:xfrm>
+            <a:off x="2949825" y="997200"/>
+            <a:ext cx="3780000" cy="540000"/>
+          </a:xfrm>
+          <a:prstGeom prst="rect">
+            <a:avLst/>
+          </a:prstGeom>
+          <a:solidFill>
+            <a:srgbClr val="FFFF00"/>
+          </a:solidFill>
+          <a:ln>
+            <a:noFill/>
+          </a:ln>
+        </p:spPr>
+        <p:style>
+          <a:lnRef idx="2">
+            <a:schemeClr val="accent1">
+              <a:shade val="50000"/>
+            </a:schemeClr>
+          </a:lnRef>
+          <a:fillRef idx="1">
+            <a:schemeClr val="accent1"/>
+          </a:fillRef>
+          <a:effectRef idx="0">
+            <a:schemeClr val="accent1"/>
+          </a:effectRef>
+          <a:fontRef idx="minor">
+            <a:schemeClr val="lt1"/>
+          </a:fontRef>
+        </p:style>
+        <p:txBody>
+          <a:bodyPr rtlCol="0" anchor="ctr"/>
+          <a:lstStyle/>
+          <a:p>
+            <a:pPr algn="ctr"/>
+            <a:endParaRPr lang="de-DE"/>
+          </a:p>
+        </p:txBody>
+      </p:sp>
+      <p:sp>
+        <p:nvSpPr>
+          <p:cNvPr id="7" name="Rechteck 6">
+            <a:extLst>
+              <a:ext uri="{FF2B5EF4-FFF2-40B4-BE49-F238E27FC236}">
+                <a16:creationId xmlns:a16="http://schemas.microsoft.com/office/drawing/2014/main" id="{CFA6A045-4F44-0B00-476C-B233BA025D49}"/>
+              </a:ext>
+            </a:extLst>
+          </p:cNvPr>
+          <p:cNvSpPr/>
+          <p:nvPr/>
+        </p:nvSpPr>
+        <p:spPr>
+          <a:xfrm>
+            <a:off x="3533773" y="1537200"/>
+            <a:ext cx="3736051" cy="720000"/>
+          </a:xfrm>
+          <a:prstGeom prst="rect">
+            <a:avLst/>
+          </a:prstGeom>
+          <a:solidFill>
+            <a:srgbClr val="FFFF00"/>
+          </a:solidFill>
+          <a:ln>
+            <a:noFill/>
+          </a:ln>
+        </p:spPr>
+        <p:style>
+          <a:lnRef idx="2">
+            <a:schemeClr val="accent1">
+              <a:shade val="50000"/>
+            </a:schemeClr>
+          </a:lnRef>
+          <a:fillRef idx="1">
+            <a:schemeClr val="accent1"/>
+          </a:fillRef>
+          <a:effectRef idx="0">
+            <a:schemeClr val="accent1"/>
+          </a:effectRef>
+          <a:fontRef idx="minor">
+            <a:schemeClr val="lt1"/>
+          </a:fontRef>
+        </p:style>
+        <p:txBody>
+          <a:bodyPr rtlCol="0" anchor="ctr"/>
+          <a:lstStyle/>
+          <a:p>
+            <a:pPr algn="ctr"/>
+            <a:endParaRPr lang="de-DE"/>
+          </a:p>
+        </p:txBody>
+      </p:sp>
+      <p:sp>
+        <p:nvSpPr>
+          <p:cNvPr id="8" name="Rechteck 7">
+            <a:extLst>
+              <a:ext uri="{FF2B5EF4-FFF2-40B4-BE49-F238E27FC236}">
+                <a16:creationId xmlns:a16="http://schemas.microsoft.com/office/drawing/2014/main" id="{86164A30-5627-1572-B025-85281A46FAEE}"/>
+              </a:ext>
+            </a:extLst>
+          </p:cNvPr>
+          <p:cNvSpPr/>
+          <p:nvPr/>
+        </p:nvSpPr>
+        <p:spPr>
+          <a:xfrm>
+            <a:off x="4076700" y="2257200"/>
+            <a:ext cx="3639300" cy="540000"/>
+          </a:xfrm>
+          <a:prstGeom prst="rect">
+            <a:avLst/>
+          </a:prstGeom>
+          <a:solidFill>
+            <a:srgbClr val="FFFF00"/>
+          </a:solidFill>
+          <a:ln>
+            <a:noFill/>
+          </a:ln>
+        </p:spPr>
+        <p:style>
+          <a:lnRef idx="2">
+            <a:schemeClr val="accent1">
+              <a:shade val="50000"/>
+            </a:schemeClr>
+          </a:lnRef>
+          <a:fillRef idx="1">
+            <a:schemeClr val="accent1"/>
+          </a:fillRef>
+          <a:effectRef idx="0">
+            <a:schemeClr val="accent1"/>
+          </a:effectRef>
+          <a:fontRef idx="minor">
+            <a:schemeClr val="lt1"/>
+          </a:fontRef>
+        </p:style>
+        <p:txBody>
+          <a:bodyPr rtlCol="0" anchor="ctr"/>
+          <a:lstStyle/>
+          <a:p>
+            <a:pPr algn="ctr"/>
+            <a:endParaRPr lang="de-DE"/>
+          </a:p>
+        </p:txBody>
+      </p:sp>
+      <p:sp>
+        <p:nvSpPr>
+          <p:cNvPr id="9" name="Rechteck 8">
+            <a:extLst>
+              <a:ext uri="{FF2B5EF4-FFF2-40B4-BE49-F238E27FC236}">
+                <a16:creationId xmlns:a16="http://schemas.microsoft.com/office/drawing/2014/main" id="{F6FA85E8-5C5D-03D8-E20E-2C9B0B3EEC36}"/>
+              </a:ext>
+            </a:extLst>
+          </p:cNvPr>
+          <p:cNvSpPr/>
+          <p:nvPr/>
+        </p:nvSpPr>
+        <p:spPr>
+          <a:xfrm>
+            <a:off x="4743450" y="2803575"/>
+            <a:ext cx="2972550" cy="540000"/>
+          </a:xfrm>
+          <a:prstGeom prst="rect">
+            <a:avLst/>
+          </a:prstGeom>
+          <a:solidFill>
+            <a:srgbClr val="FFFF00"/>
+          </a:solidFill>
+          <a:ln>
+            <a:noFill/>
+          </a:ln>
+        </p:spPr>
+        <p:style>
+          <a:lnRef idx="2">
+            <a:schemeClr val="accent1">
+              <a:shade val="50000"/>
+            </a:schemeClr>
+          </a:lnRef>
+          <a:fillRef idx="1">
+            <a:schemeClr val="accent1"/>
+          </a:fillRef>
+          <a:effectRef idx="0">
+            <a:schemeClr val="accent1"/>
+          </a:effectRef>
+          <a:fontRef idx="minor">
+            <a:schemeClr val="lt1"/>
+          </a:fontRef>
+        </p:style>
+        <p:txBody>
+          <a:bodyPr rtlCol="0" anchor="ctr"/>
+          <a:lstStyle/>
+          <a:p>
+            <a:pPr algn="ctr"/>
+            <a:endParaRPr lang="de-DE"/>
+          </a:p>
+        </p:txBody>
+      </p:sp>
+      <p:sp>
+        <p:nvSpPr>
+          <p:cNvPr id="10" name="Rechteck 9">
+            <a:extLst>
+              <a:ext uri="{FF2B5EF4-FFF2-40B4-BE49-F238E27FC236}">
+                <a16:creationId xmlns:a16="http://schemas.microsoft.com/office/drawing/2014/main" id="{8C3694A0-355A-92A5-2522-F8AFB887D23A}"/>
+              </a:ext>
+            </a:extLst>
+          </p:cNvPr>
+          <p:cNvSpPr/>
+          <p:nvPr/>
+        </p:nvSpPr>
+        <p:spPr>
+          <a:xfrm>
+            <a:off x="5219700" y="3343575"/>
+            <a:ext cx="2496300" cy="540000"/>
+          </a:xfrm>
+          <a:prstGeom prst="rect">
+            <a:avLst/>
+          </a:prstGeom>
+          <a:solidFill>
+            <a:srgbClr val="FFFF00"/>
+          </a:solidFill>
+          <a:ln>
+            <a:noFill/>
+          </a:ln>
+        </p:spPr>
+        <p:style>
+          <a:lnRef idx="2">
+            <a:schemeClr val="accent1">
+              <a:shade val="50000"/>
+            </a:schemeClr>
+          </a:lnRef>
+          <a:fillRef idx="1">
+            <a:schemeClr val="accent1"/>
+          </a:fillRef>
+          <a:effectRef idx="0">
+            <a:schemeClr val="accent1"/>
+          </a:effectRef>
+          <a:fontRef idx="minor">
+            <a:schemeClr val="lt1"/>
+          </a:fontRef>
+        </p:style>
+        <p:txBody>
+          <a:bodyPr rtlCol="0" anchor="ctr"/>
+          <a:lstStyle/>
+          <a:p>
+            <a:pPr algn="ctr"/>
+            <a:endParaRPr lang="de-DE"/>
+          </a:p>
+        </p:txBody>
+      </p:sp>
+      <p:sp>
+        <p:nvSpPr>
+          <p:cNvPr id="26" name="Rechteck 25">
+            <a:extLst>
+              <a:ext uri="{FF2B5EF4-FFF2-40B4-BE49-F238E27FC236}">
+                <a16:creationId xmlns:a16="http://schemas.microsoft.com/office/drawing/2014/main" id="{76EC7676-C46E-57C9-5DB3-DAECA8F47A11}"/>
+              </a:ext>
+            </a:extLst>
+          </p:cNvPr>
+          <p:cNvSpPr/>
+          <p:nvPr/>
+        </p:nvSpPr>
+        <p:spPr>
+          <a:xfrm flipV="1">
+            <a:off x="2409825" y="6223575"/>
+            <a:ext cx="3240000" cy="540000"/>
+          </a:xfrm>
+          <a:prstGeom prst="rect">
+            <a:avLst/>
+          </a:prstGeom>
+          <a:solidFill>
+            <a:srgbClr val="FFFF00"/>
+          </a:solidFill>
+          <a:ln>
+            <a:noFill/>
+          </a:ln>
+        </p:spPr>
+        <p:style>
+          <a:lnRef idx="2">
+            <a:schemeClr val="accent1">
+              <a:shade val="50000"/>
+            </a:schemeClr>
+          </a:lnRef>
+          <a:fillRef idx="1">
+            <a:schemeClr val="accent1"/>
+          </a:fillRef>
+          <a:effectRef idx="0">
+            <a:schemeClr val="accent1"/>
+          </a:effectRef>
+          <a:fontRef idx="minor">
+            <a:schemeClr val="lt1"/>
+          </a:fontRef>
+        </p:style>
+        <p:txBody>
+          <a:bodyPr rtlCol="0" anchor="ctr"/>
+          <a:lstStyle/>
+          <a:p>
+            <a:pPr algn="ctr"/>
+            <a:endParaRPr lang="de-DE"/>
+          </a:p>
+        </p:txBody>
+      </p:sp>
+      <p:sp>
+        <p:nvSpPr>
+          <p:cNvPr id="27" name="Rechteck 26">
+            <a:extLst>
+              <a:ext uri="{FF2B5EF4-FFF2-40B4-BE49-F238E27FC236}">
+                <a16:creationId xmlns:a16="http://schemas.microsoft.com/office/drawing/2014/main" id="{8533D50D-C014-F74C-92A5-821D26EF1365}"/>
+              </a:ext>
+            </a:extLst>
+          </p:cNvPr>
+          <p:cNvSpPr/>
+          <p:nvPr/>
+        </p:nvSpPr>
+        <p:spPr>
+          <a:xfrm flipV="1">
+            <a:off x="2949825" y="5683575"/>
+            <a:ext cx="3780000" cy="540000"/>
+          </a:xfrm>
+          <a:prstGeom prst="rect">
+            <a:avLst/>
+          </a:prstGeom>
+          <a:solidFill>
+            <a:srgbClr val="FFFF00"/>
+          </a:solidFill>
+          <a:ln>
+            <a:noFill/>
+          </a:ln>
+        </p:spPr>
+        <p:style>
+          <a:lnRef idx="2">
+            <a:schemeClr val="accent1">
+              <a:shade val="50000"/>
+            </a:schemeClr>
+          </a:lnRef>
+          <a:fillRef idx="1">
+            <a:schemeClr val="accent1"/>
+          </a:fillRef>
+          <a:effectRef idx="0">
+            <a:schemeClr val="accent1"/>
+          </a:effectRef>
+          <a:fontRef idx="minor">
+            <a:schemeClr val="lt1"/>
+          </a:fontRef>
+        </p:style>
+        <p:txBody>
+          <a:bodyPr rtlCol="0" anchor="ctr"/>
+          <a:lstStyle/>
+          <a:p>
+            <a:pPr algn="ctr"/>
+            <a:endParaRPr lang="de-DE"/>
+          </a:p>
+        </p:txBody>
+      </p:sp>
+      <p:sp>
+        <p:nvSpPr>
+          <p:cNvPr id="28" name="Rechteck 27">
+            <a:extLst>
+              <a:ext uri="{FF2B5EF4-FFF2-40B4-BE49-F238E27FC236}">
+                <a16:creationId xmlns:a16="http://schemas.microsoft.com/office/drawing/2014/main" id="{A9B9337C-1CB2-AA4D-9A07-8AF699882704}"/>
+              </a:ext>
+            </a:extLst>
+          </p:cNvPr>
+          <p:cNvSpPr/>
+          <p:nvPr/>
+        </p:nvSpPr>
+        <p:spPr>
+          <a:xfrm flipV="1">
+            <a:off x="3533773" y="4963575"/>
+            <a:ext cx="3736051" cy="720000"/>
+          </a:xfrm>
+          <a:prstGeom prst="rect">
+            <a:avLst/>
+          </a:prstGeom>
+          <a:solidFill>
+            <a:srgbClr val="FFFF00"/>
+          </a:solidFill>
+          <a:ln>
+            <a:noFill/>
+          </a:ln>
+        </p:spPr>
+        <p:style>
+          <a:lnRef idx="2">
+            <a:schemeClr val="accent1">
+              <a:shade val="50000"/>
+            </a:schemeClr>
+          </a:lnRef>
+          <a:fillRef idx="1">
+            <a:schemeClr val="accent1"/>
+          </a:fillRef>
+          <a:effectRef idx="0">
+            <a:schemeClr val="accent1"/>
+          </a:effectRef>
+          <a:fontRef idx="minor">
+            <a:schemeClr val="lt1"/>
+          </a:fontRef>
+        </p:style>
+        <p:txBody>
+          <a:bodyPr rtlCol="0" anchor="ctr"/>
+          <a:lstStyle/>
+          <a:p>
+            <a:pPr algn="ctr"/>
+            <a:endParaRPr lang="de-DE"/>
+          </a:p>
+        </p:txBody>
+      </p:sp>
+      <p:sp>
+        <p:nvSpPr>
+          <p:cNvPr id="29" name="Rechteck 28">
+            <a:extLst>
+              <a:ext uri="{FF2B5EF4-FFF2-40B4-BE49-F238E27FC236}">
+                <a16:creationId xmlns:a16="http://schemas.microsoft.com/office/drawing/2014/main" id="{31201B62-9D08-EB2A-8ECF-0FE885A07977}"/>
+              </a:ext>
+            </a:extLst>
+          </p:cNvPr>
+          <p:cNvSpPr/>
+          <p:nvPr/>
+        </p:nvSpPr>
+        <p:spPr>
+          <a:xfrm flipV="1">
+            <a:off x="4076700" y="4423575"/>
+            <a:ext cx="3639300" cy="540000"/>
+          </a:xfrm>
+          <a:prstGeom prst="rect">
+            <a:avLst/>
+          </a:prstGeom>
+          <a:solidFill>
+            <a:srgbClr val="FFFF00"/>
+          </a:solidFill>
+          <a:ln>
+            <a:noFill/>
+          </a:ln>
+        </p:spPr>
+        <p:style>
+          <a:lnRef idx="2">
+            <a:schemeClr val="accent1">
+              <a:shade val="50000"/>
+            </a:schemeClr>
+          </a:lnRef>
+          <a:fillRef idx="1">
+            <a:schemeClr val="accent1"/>
+          </a:fillRef>
+          <a:effectRef idx="0">
+            <a:schemeClr val="accent1"/>
+          </a:effectRef>
+          <a:fontRef idx="minor">
+            <a:schemeClr val="lt1"/>
+          </a:fontRef>
+        </p:style>
+        <p:txBody>
+          <a:bodyPr rtlCol="0" anchor="ctr"/>
+          <a:lstStyle/>
+          <a:p>
+            <a:pPr algn="ctr"/>
+            <a:endParaRPr lang="de-DE"/>
+          </a:p>
+        </p:txBody>
+      </p:sp>
+      <p:sp>
+        <p:nvSpPr>
+          <p:cNvPr id="30" name="Rechteck 29">
+            <a:extLst>
+              <a:ext uri="{FF2B5EF4-FFF2-40B4-BE49-F238E27FC236}">
+                <a16:creationId xmlns:a16="http://schemas.microsoft.com/office/drawing/2014/main" id="{A1F0F072-9BC5-9DA1-5639-DBC0DDFAB1E9}"/>
+              </a:ext>
+            </a:extLst>
+          </p:cNvPr>
+          <p:cNvSpPr/>
+          <p:nvPr/>
+        </p:nvSpPr>
+        <p:spPr>
+          <a:xfrm flipV="1">
+            <a:off x="4743450" y="3883575"/>
+            <a:ext cx="2972550" cy="540000"/>
+          </a:xfrm>
+          <a:prstGeom prst="rect">
+            <a:avLst/>
+          </a:prstGeom>
+          <a:solidFill>
+            <a:srgbClr val="FFFF00"/>
+          </a:solidFill>
+          <a:ln>
+            <a:noFill/>
+          </a:ln>
+        </p:spPr>
+        <p:style>
+          <a:lnRef idx="2">
+            <a:schemeClr val="accent1">
+              <a:shade val="50000"/>
+            </a:schemeClr>
+          </a:lnRef>
+          <a:fillRef idx="1">
+            <a:schemeClr val="accent1"/>
+          </a:fillRef>
+          <a:effectRef idx="0">
+            <a:schemeClr val="accent1"/>
+          </a:effectRef>
+          <a:fontRef idx="minor">
+            <a:schemeClr val="lt1"/>
+          </a:fontRef>
+        </p:style>
+        <p:txBody>
+          <a:bodyPr rtlCol="0" anchor="ctr"/>
+          <a:lstStyle/>
+          <a:p>
+            <a:pPr algn="ctr"/>
+            <a:endParaRPr lang="de-DE"/>
+          </a:p>
+        </p:txBody>
+      </p:sp>
+    </p:spTree>
+    <p:extLst>
+      <p:ext uri="{BB962C8B-B14F-4D97-AF65-F5344CB8AC3E}">
+        <p14:creationId xmlns:p14="http://schemas.microsoft.com/office/powerpoint/2010/main" val="3040662848"/>
+      </p:ext>
+    </p:extLst>
+  </p:cSld>
+  <p:clrMapOvr>
+    <a:masterClrMapping/>
+  </p:clrMapOvr>
+</p:sld>
+</file>
+
 <file path=ppt/slides/slide4.xml><?xml version="1.0" encoding="utf-8"?>
 <p:sld xmlns:a="http://schemas.openxmlformats.org/drawingml/2006/main" xmlns:r="http://schemas.openxmlformats.org/officeDocument/2006/relationships" xmlns:p="http://schemas.openxmlformats.org/presentationml/2006/main">
   <p:cSld>

</xml_diff>

<commit_message>
I bought Aseprite, now I can create sprites like a professional.
Recreated all ghost sprites.
Renamed "eyes_<dir>.png" to "eaten_<dir>.png"
</commit_message>
<xml_diff>
--- a/assets/textures.pptx
+++ b/assets/textures.pptx
@@ -35,6 +35,7 @@
     <p:sldId id="283" r:id="rId29"/>
     <p:sldId id="284" r:id="rId30"/>
     <p:sldId id="285" r:id="rId31"/>
+    <p:sldId id="286" r:id="rId32"/>
   </p:sldIdLst>
   <p:sldSz cx="12192000" cy="6858000"/>
   <p:notesSz cx="6858000" cy="9144000"/>
@@ -288,7 +289,7 @@
           <a:p>
             <a:fld id="{08F585A2-760E-46F2-B064-85F0DFCDA2A3}" type="datetimeFigureOut">
               <a:rPr lang="de-DE" smtClean="0"/>
-              <a:t>10.07.2022</a:t>
+              <a:t>11.07.2022</a:t>
             </a:fld>
             <a:endParaRPr lang="de-DE"/>
           </a:p>
@@ -486,7 +487,7 @@
           <a:p>
             <a:fld id="{08F585A2-760E-46F2-B064-85F0DFCDA2A3}" type="datetimeFigureOut">
               <a:rPr lang="de-DE" smtClean="0"/>
-              <a:t>10.07.2022</a:t>
+              <a:t>11.07.2022</a:t>
             </a:fld>
             <a:endParaRPr lang="de-DE"/>
           </a:p>
@@ -694,7 +695,7 @@
           <a:p>
             <a:fld id="{08F585A2-760E-46F2-B064-85F0DFCDA2A3}" type="datetimeFigureOut">
               <a:rPr lang="de-DE" smtClean="0"/>
-              <a:t>10.07.2022</a:t>
+              <a:t>11.07.2022</a:t>
             </a:fld>
             <a:endParaRPr lang="de-DE"/>
           </a:p>
@@ -892,7 +893,7 @@
           <a:p>
             <a:fld id="{08F585A2-760E-46F2-B064-85F0DFCDA2A3}" type="datetimeFigureOut">
               <a:rPr lang="de-DE" smtClean="0"/>
-              <a:t>10.07.2022</a:t>
+              <a:t>11.07.2022</a:t>
             </a:fld>
             <a:endParaRPr lang="de-DE"/>
           </a:p>
@@ -1167,7 +1168,7 @@
           <a:p>
             <a:fld id="{08F585A2-760E-46F2-B064-85F0DFCDA2A3}" type="datetimeFigureOut">
               <a:rPr lang="de-DE" smtClean="0"/>
-              <a:t>10.07.2022</a:t>
+              <a:t>11.07.2022</a:t>
             </a:fld>
             <a:endParaRPr lang="de-DE"/>
           </a:p>
@@ -1432,7 +1433,7 @@
           <a:p>
             <a:fld id="{08F585A2-760E-46F2-B064-85F0DFCDA2A3}" type="datetimeFigureOut">
               <a:rPr lang="de-DE" smtClean="0"/>
-              <a:t>10.07.2022</a:t>
+              <a:t>11.07.2022</a:t>
             </a:fld>
             <a:endParaRPr lang="de-DE"/>
           </a:p>
@@ -1844,7 +1845,7 @@
           <a:p>
             <a:fld id="{08F585A2-760E-46F2-B064-85F0DFCDA2A3}" type="datetimeFigureOut">
               <a:rPr lang="de-DE" smtClean="0"/>
-              <a:t>10.07.2022</a:t>
+              <a:t>11.07.2022</a:t>
             </a:fld>
             <a:endParaRPr lang="de-DE"/>
           </a:p>
@@ -1985,7 +1986,7 @@
           <a:p>
             <a:fld id="{08F585A2-760E-46F2-B064-85F0DFCDA2A3}" type="datetimeFigureOut">
               <a:rPr lang="de-DE" smtClean="0"/>
-              <a:t>10.07.2022</a:t>
+              <a:t>11.07.2022</a:t>
             </a:fld>
             <a:endParaRPr lang="de-DE"/>
           </a:p>
@@ -2098,7 +2099,7 @@
           <a:p>
             <a:fld id="{08F585A2-760E-46F2-B064-85F0DFCDA2A3}" type="datetimeFigureOut">
               <a:rPr lang="de-DE" smtClean="0"/>
-              <a:t>10.07.2022</a:t>
+              <a:t>11.07.2022</a:t>
             </a:fld>
             <a:endParaRPr lang="de-DE"/>
           </a:p>
@@ -2409,7 +2410,7 @@
           <a:p>
             <a:fld id="{08F585A2-760E-46F2-B064-85F0DFCDA2A3}" type="datetimeFigureOut">
               <a:rPr lang="de-DE" smtClean="0"/>
-              <a:t>10.07.2022</a:t>
+              <a:t>11.07.2022</a:t>
             </a:fld>
             <a:endParaRPr lang="de-DE"/>
           </a:p>
@@ -2697,7 +2698,7 @@
           <a:p>
             <a:fld id="{08F585A2-760E-46F2-B064-85F0DFCDA2A3}" type="datetimeFigureOut">
               <a:rPr lang="de-DE" smtClean="0"/>
-              <a:t>10.07.2022</a:t>
+              <a:t>11.07.2022</a:t>
             </a:fld>
             <a:endParaRPr lang="de-DE"/>
           </a:p>
@@ -2938,7 +2939,7 @@
           <a:p>
             <a:fld id="{08F585A2-760E-46F2-B064-85F0DFCDA2A3}" type="datetimeFigureOut">
               <a:rPr lang="de-DE" smtClean="0"/>
-              <a:t>10.07.2022</a:t>
+              <a:t>11.07.2022</a:t>
             </a:fld>
             <a:endParaRPr lang="de-DE"/>
           </a:p>
@@ -4241,8 +4242,8 @@
         </p:blipFill>
         <p:spPr>
           <a:xfrm>
-            <a:off x="9753044" y="2243622"/>
-            <a:ext cx="2438956" cy="2438956"/>
+            <a:off x="4358644" y="801743"/>
+            <a:ext cx="5115293" cy="5115293"/>
           </a:xfrm>
           <a:prstGeom prst="rect">
             <a:avLst/>
@@ -29733,7 +29734,9 @@
               <a:prstGeom prst="rect">
                 <a:avLst/>
               </a:prstGeom>
-              <a:grpFill/>
+              <a:solidFill>
+                <a:srgbClr val="0000F8"/>
+              </a:solidFill>
               <a:ln>
                 <a:noFill/>
               </a:ln>
@@ -29759,7 +29762,7 @@
               <a:lstStyle/>
               <a:p>
                 <a:pPr algn="ctr"/>
-                <a:endParaRPr lang="de-DE"/>
+                <a:endParaRPr lang="de-DE" dirty="0"/>
               </a:p>
             </p:txBody>
           </p:sp>
@@ -40426,6 +40429,72 @@
 </p:sld>
 </file>
 
+<file path=ppt/slides/slide31.xml><?xml version="1.0" encoding="utf-8"?>
+<p:sld xmlns:a="http://schemas.openxmlformats.org/drawingml/2006/main" xmlns:r="http://schemas.openxmlformats.org/officeDocument/2006/relationships" xmlns:p="http://schemas.openxmlformats.org/presentationml/2006/main">
+  <p:cSld>
+    <p:spTree>
+      <p:nvGrpSpPr>
+        <p:cNvPr id="1" name=""/>
+        <p:cNvGrpSpPr/>
+        <p:nvPr/>
+      </p:nvGrpSpPr>
+      <p:grpSpPr>
+        <a:xfrm>
+          <a:off x="0" y="0"/>
+          <a:ext cx="0" cy="0"/>
+          <a:chOff x="0" y="0"/>
+          <a:chExt cx="0" cy="0"/>
+        </a:xfrm>
+      </p:grpSpPr>
+      <p:pic>
+        <p:nvPicPr>
+          <p:cNvPr id="4" name="Grafik 3">
+            <a:extLst>
+              <a:ext uri="{FF2B5EF4-FFF2-40B4-BE49-F238E27FC236}">
+                <a16:creationId xmlns:a16="http://schemas.microsoft.com/office/drawing/2014/main" id="{A36DD8D0-BB99-C01A-F5D1-2CA553999F3C}"/>
+              </a:ext>
+            </a:extLst>
+          </p:cNvPr>
+          <p:cNvPicPr>
+            <a:picLocks noChangeAspect="1"/>
+          </p:cNvPicPr>
+          <p:nvPr/>
+        </p:nvPicPr>
+        <p:blipFill>
+          <a:blip r:embed="rId2">
+            <a:extLst>
+              <a:ext uri="{28A0092B-C50C-407E-A947-70E740481C1C}">
+                <a14:useLocalDpi xmlns:a14="http://schemas.microsoft.com/office/drawing/2010/main" val="0"/>
+              </a:ext>
+            </a:extLst>
+          </a:blip>
+          <a:stretch>
+            <a:fillRect/>
+          </a:stretch>
+        </p:blipFill>
+        <p:spPr>
+          <a:xfrm>
+            <a:off x="3219450" y="144593"/>
+            <a:ext cx="6568813" cy="6568813"/>
+          </a:xfrm>
+          <a:prstGeom prst="rect">
+            <a:avLst/>
+          </a:prstGeom>
+        </p:spPr>
+      </p:pic>
+    </p:spTree>
+    <p:extLst>
+      <p:ext uri="{BB962C8B-B14F-4D97-AF65-F5344CB8AC3E}">
+        <p14:creationId xmlns:p14="http://schemas.microsoft.com/office/powerpoint/2010/main" val="724460582"/>
+      </p:ext>
+    </p:extLst>
+  </p:cSld>
+  <p:clrMapOvr>
+    <a:masterClrMapping/>
+  </p:clrMapOvr>
+</p:sld>
+</file>
+
 <file path=ppt/slides/slide4.xml><?xml version="1.0" encoding="utf-8"?>
 <p:sld xmlns:a="http://schemas.openxmlformats.org/drawingml/2006/main" xmlns:r="http://schemas.openxmlformats.org/officeDocument/2006/relationships" xmlns:p="http://schemas.openxmlformats.org/presentationml/2006/main">
   <p:cSld>

</xml_diff>

<commit_message>
Recreated pacmans sprites and the wall sprites.
Moved ghost asesprite files in matching folder.
Ghosts and pacman are (again) a little bigger.
</commit_message>
<xml_diff>
--- a/assets/textures.pptx
+++ b/assets/textures.pptx
@@ -36,6 +36,7 @@
     <p:sldId id="284" r:id="rId30"/>
     <p:sldId id="285" r:id="rId31"/>
     <p:sldId id="286" r:id="rId32"/>
+    <p:sldId id="287" r:id="rId33"/>
   </p:sldIdLst>
   <p:sldSz cx="12192000" cy="6858000"/>
   <p:notesSz cx="6858000" cy="9144000"/>
@@ -289,7 +290,7 @@
           <a:p>
             <a:fld id="{08F585A2-760E-46F2-B064-85F0DFCDA2A3}" type="datetimeFigureOut">
               <a:rPr lang="de-DE" smtClean="0"/>
-              <a:t>11.07.2022</a:t>
+              <a:t>12.07.2022</a:t>
             </a:fld>
             <a:endParaRPr lang="de-DE"/>
           </a:p>
@@ -487,7 +488,7 @@
           <a:p>
             <a:fld id="{08F585A2-760E-46F2-B064-85F0DFCDA2A3}" type="datetimeFigureOut">
               <a:rPr lang="de-DE" smtClean="0"/>
-              <a:t>11.07.2022</a:t>
+              <a:t>12.07.2022</a:t>
             </a:fld>
             <a:endParaRPr lang="de-DE"/>
           </a:p>
@@ -695,7 +696,7 @@
           <a:p>
             <a:fld id="{08F585A2-760E-46F2-B064-85F0DFCDA2A3}" type="datetimeFigureOut">
               <a:rPr lang="de-DE" smtClean="0"/>
-              <a:t>11.07.2022</a:t>
+              <a:t>12.07.2022</a:t>
             </a:fld>
             <a:endParaRPr lang="de-DE"/>
           </a:p>
@@ -893,7 +894,7 @@
           <a:p>
             <a:fld id="{08F585A2-760E-46F2-B064-85F0DFCDA2A3}" type="datetimeFigureOut">
               <a:rPr lang="de-DE" smtClean="0"/>
-              <a:t>11.07.2022</a:t>
+              <a:t>12.07.2022</a:t>
             </a:fld>
             <a:endParaRPr lang="de-DE"/>
           </a:p>
@@ -1168,7 +1169,7 @@
           <a:p>
             <a:fld id="{08F585A2-760E-46F2-B064-85F0DFCDA2A3}" type="datetimeFigureOut">
               <a:rPr lang="de-DE" smtClean="0"/>
-              <a:t>11.07.2022</a:t>
+              <a:t>12.07.2022</a:t>
             </a:fld>
             <a:endParaRPr lang="de-DE"/>
           </a:p>
@@ -1433,7 +1434,7 @@
           <a:p>
             <a:fld id="{08F585A2-760E-46F2-B064-85F0DFCDA2A3}" type="datetimeFigureOut">
               <a:rPr lang="de-DE" smtClean="0"/>
-              <a:t>11.07.2022</a:t>
+              <a:t>12.07.2022</a:t>
             </a:fld>
             <a:endParaRPr lang="de-DE"/>
           </a:p>
@@ -1845,7 +1846,7 @@
           <a:p>
             <a:fld id="{08F585A2-760E-46F2-B064-85F0DFCDA2A3}" type="datetimeFigureOut">
               <a:rPr lang="de-DE" smtClean="0"/>
-              <a:t>11.07.2022</a:t>
+              <a:t>12.07.2022</a:t>
             </a:fld>
             <a:endParaRPr lang="de-DE"/>
           </a:p>
@@ -1986,7 +1987,7 @@
           <a:p>
             <a:fld id="{08F585A2-760E-46F2-B064-85F0DFCDA2A3}" type="datetimeFigureOut">
               <a:rPr lang="de-DE" smtClean="0"/>
-              <a:t>11.07.2022</a:t>
+              <a:t>12.07.2022</a:t>
             </a:fld>
             <a:endParaRPr lang="de-DE"/>
           </a:p>
@@ -2099,7 +2100,7 @@
           <a:p>
             <a:fld id="{08F585A2-760E-46F2-B064-85F0DFCDA2A3}" type="datetimeFigureOut">
               <a:rPr lang="de-DE" smtClean="0"/>
-              <a:t>11.07.2022</a:t>
+              <a:t>12.07.2022</a:t>
             </a:fld>
             <a:endParaRPr lang="de-DE"/>
           </a:p>
@@ -2410,7 +2411,7 @@
           <a:p>
             <a:fld id="{08F585A2-760E-46F2-B064-85F0DFCDA2A3}" type="datetimeFigureOut">
               <a:rPr lang="de-DE" smtClean="0"/>
-              <a:t>11.07.2022</a:t>
+              <a:t>12.07.2022</a:t>
             </a:fld>
             <a:endParaRPr lang="de-DE"/>
           </a:p>
@@ -2698,7 +2699,7 @@
           <a:p>
             <a:fld id="{08F585A2-760E-46F2-B064-85F0DFCDA2A3}" type="datetimeFigureOut">
               <a:rPr lang="de-DE" smtClean="0"/>
-              <a:t>11.07.2022</a:t>
+              <a:t>12.07.2022</a:t>
             </a:fld>
             <a:endParaRPr lang="de-DE"/>
           </a:p>
@@ -2939,7 +2940,7 @@
           <a:p>
             <a:fld id="{08F585A2-760E-46F2-B064-85F0DFCDA2A3}" type="datetimeFigureOut">
               <a:rPr lang="de-DE" smtClean="0"/>
-              <a:t>11.07.2022</a:t>
+              <a:t>12.07.2022</a:t>
             </a:fld>
             <a:endParaRPr lang="de-DE"/>
           </a:p>
@@ -4242,7 +4243,7 @@
         </p:blipFill>
         <p:spPr>
           <a:xfrm>
-            <a:off x="4358644" y="801743"/>
+            <a:off x="4922272" y="887336"/>
             <a:ext cx="5115293" cy="5115293"/>
           </a:xfrm>
           <a:prstGeom prst="rect">
@@ -37476,7 +37477,7 @@
         </p:blipFill>
         <p:spPr>
           <a:xfrm>
-            <a:off x="8865612" y="3866"/>
+            <a:off x="6961693" y="93866"/>
             <a:ext cx="5640963" cy="1893334"/>
           </a:xfrm>
           <a:prstGeom prst="rect">
@@ -40495,6 +40496,121 @@
 </p:sld>
 </file>
 
+<file path=ppt/slides/slide32.xml><?xml version="1.0" encoding="utf-8"?>
+<p:sld xmlns:a="http://schemas.openxmlformats.org/drawingml/2006/main" xmlns:r="http://schemas.openxmlformats.org/officeDocument/2006/relationships" xmlns:p="http://schemas.openxmlformats.org/presentationml/2006/main">
+  <p:cSld>
+    <p:spTree>
+      <p:nvGrpSpPr>
+        <p:cNvPr id="1" name=""/>
+        <p:cNvGrpSpPr/>
+        <p:nvPr/>
+      </p:nvGrpSpPr>
+      <p:grpSpPr>
+        <a:xfrm>
+          <a:off x="0" y="0"/>
+          <a:ext cx="0" cy="0"/>
+          <a:chOff x="0" y="0"/>
+          <a:chExt cx="0" cy="0"/>
+        </a:xfrm>
+      </p:grpSpPr>
+      <p:pic>
+        <p:nvPicPr>
+          <p:cNvPr id="5" name="Grafik 4">
+            <a:extLst>
+              <a:ext uri="{FF2B5EF4-FFF2-40B4-BE49-F238E27FC236}">
+                <a16:creationId xmlns:a16="http://schemas.microsoft.com/office/drawing/2014/main" id="{5074BF54-2DAC-9663-71AF-69F255B9D082}"/>
+              </a:ext>
+            </a:extLst>
+          </p:cNvPr>
+          <p:cNvPicPr>
+            <a:picLocks noChangeAspect="1"/>
+          </p:cNvPicPr>
+          <p:nvPr/>
+        </p:nvPicPr>
+        <p:blipFill>
+          <a:blip r:embed="rId2">
+            <a:extLst>
+              <a:ext uri="{28A0092B-C50C-407E-A947-70E740481C1C}">
+                <a14:useLocalDpi xmlns:a14="http://schemas.microsoft.com/office/drawing/2010/main" val="0"/>
+              </a:ext>
+            </a:extLst>
+          </a:blip>
+          <a:stretch>
+            <a:fillRect/>
+          </a:stretch>
+        </p:blipFill>
+        <p:spPr>
+          <a:xfrm>
+            <a:off x="3080886" y="1652423"/>
+            <a:ext cx="6477904" cy="2362530"/>
+          </a:xfrm>
+          <a:prstGeom prst="rect">
+            <a:avLst/>
+          </a:prstGeom>
+        </p:spPr>
+      </p:pic>
+      <p:sp>
+        <p:nvSpPr>
+          <p:cNvPr id="6" name="Rechteck 5">
+            <a:extLst>
+              <a:ext uri="{FF2B5EF4-FFF2-40B4-BE49-F238E27FC236}">
+                <a16:creationId xmlns:a16="http://schemas.microsoft.com/office/drawing/2014/main" id="{A655E516-5802-C310-1AEC-46966B598EE6}"/>
+              </a:ext>
+            </a:extLst>
+          </p:cNvPr>
+          <p:cNvSpPr/>
+          <p:nvPr/>
+        </p:nvSpPr>
+        <p:spPr>
+          <a:xfrm>
+            <a:off x="4038600" y="4357688"/>
+            <a:ext cx="890588" cy="381000"/>
+          </a:xfrm>
+          <a:prstGeom prst="rect">
+            <a:avLst/>
+          </a:prstGeom>
+          <a:solidFill>
+            <a:srgbClr val="1E1EE9"/>
+          </a:solidFill>
+        </p:spPr>
+        <p:style>
+          <a:lnRef idx="2">
+            <a:schemeClr val="accent1">
+              <a:shade val="50000"/>
+            </a:schemeClr>
+          </a:lnRef>
+          <a:fillRef idx="1">
+            <a:schemeClr val="accent1"/>
+          </a:fillRef>
+          <a:effectRef idx="0">
+            <a:schemeClr val="accent1"/>
+          </a:effectRef>
+          <a:fontRef idx="minor">
+            <a:schemeClr val="lt1"/>
+          </a:fontRef>
+        </p:style>
+        <p:txBody>
+          <a:bodyPr rtlCol="0" anchor="ctr"/>
+          <a:lstStyle/>
+          <a:p>
+            <a:pPr algn="ctr"/>
+            <a:endParaRPr lang="de-DE"/>
+          </a:p>
+        </p:txBody>
+      </p:sp>
+    </p:spTree>
+    <p:extLst>
+      <p:ext uri="{BB962C8B-B14F-4D97-AF65-F5344CB8AC3E}">
+        <p14:creationId xmlns:p14="http://schemas.microsoft.com/office/powerpoint/2010/main" val="308730753"/>
+      </p:ext>
+    </p:extLst>
+  </p:cSld>
+  <p:clrMapOvr>
+    <a:masterClrMapping/>
+  </p:clrMapOvr>
+</p:sld>
+</file>
+
 <file path=ppt/slides/slide4.xml><?xml version="1.0" encoding="utf-8"?>
 <p:sld xmlns:a="http://schemas.openxmlformats.org/drawingml/2006/main" xmlns:r="http://schemas.openxmlformats.org/officeDocument/2006/relationships" xmlns:p="http://schemas.openxmlformats.org/presentationml/2006/main">
   <p:cSld>

</xml_diff>